<commit_message>
Update presentation from meeting feedback
</commit_message>
<xml_diff>
--- a/AWS DeepRacer Presentation.pptx
+++ b/AWS DeepRacer Presentation.pptx
@@ -27,23 +27,25 @@
     <p:sldId id="272" r:id="rId22"/>
     <p:sldId id="273" r:id="rId23"/>
     <p:sldId id="274" r:id="rId24"/>
+    <p:sldId id="275" r:id="rId25"/>
+    <p:sldId id="276" r:id="rId26"/>
   </p:sldIdLst>
   <p:sldSz cy="5143500" cx="9144000"/>
   <p:notesSz cx="6858000" cy="9144000"/>
   <p:embeddedFontLst>
     <p:embeddedFont>
       <p:font typeface="Montserrat"/>
-      <p:regular r:id="rId25"/>
-      <p:bold r:id="rId26"/>
-      <p:italic r:id="rId27"/>
-      <p:boldItalic r:id="rId28"/>
+      <p:regular r:id="rId27"/>
+      <p:bold r:id="rId28"/>
+      <p:italic r:id="rId29"/>
+      <p:boldItalic r:id="rId30"/>
     </p:embeddedFont>
     <p:embeddedFont>
       <p:font typeface="Lato"/>
-      <p:regular r:id="rId29"/>
-      <p:bold r:id="rId30"/>
-      <p:italic r:id="rId31"/>
-      <p:boldItalic r:id="rId32"/>
+      <p:regular r:id="rId31"/>
+      <p:bold r:id="rId32"/>
+      <p:italic r:id="rId33"/>
+      <p:boldItalic r:id="rId34"/>
     </p:embeddedFont>
   </p:embeddedFontLst>
   <p:defaultTextStyle>
@@ -824,7 +826,7 @@
   <p:cSld>
     <p:spTree>
       <p:nvGrpSpPr>
-        <p:cNvPr id="188" name="Shape 188"/>
+        <p:cNvPr id="187" name="Shape 187"/>
         <p:cNvGrpSpPr/>
         <p:nvPr/>
       </p:nvGrpSpPr>
@@ -838,7 +840,7 @@
       </p:grpSpPr>
       <p:sp>
         <p:nvSpPr>
-          <p:cNvPr id="189" name="Google Shape;189;gec05b96b1f_0_152:notes"/>
+          <p:cNvPr id="188" name="Google Shape;188;gec05b96b1f_0_209:notes"/>
           <p:cNvSpPr/>
           <p:nvPr>
             <p:ph idx="2" type="sldImg"/>
@@ -873,7 +875,7 @@
       </p:sp>
       <p:sp>
         <p:nvSpPr>
-          <p:cNvPr id="190" name="Google Shape;190;gec05b96b1f_0_152:notes"/>
+          <p:cNvPr id="189" name="Google Shape;189;gec05b96b1f_0_209:notes"/>
           <p:cNvSpPr txBox="1"/>
           <p:nvPr>
             <p:ph idx="1" type="body"/>
@@ -923,7 +925,7 @@
   <p:cSld>
     <p:spTree>
       <p:nvGrpSpPr>
-        <p:cNvPr id="194" name="Shape 194"/>
+        <p:cNvPr id="193" name="Shape 193"/>
         <p:cNvGrpSpPr/>
         <p:nvPr/>
       </p:nvGrpSpPr>
@@ -937,7 +939,7 @@
       </p:grpSpPr>
       <p:sp>
         <p:nvSpPr>
-          <p:cNvPr id="195" name="Google Shape;195;gec05b96b1f_0_158:notes"/>
+          <p:cNvPr id="194" name="Google Shape;194;gec05b96b1f_0_220:notes"/>
           <p:cNvSpPr/>
           <p:nvPr>
             <p:ph idx="2" type="sldImg"/>
@@ -972,7 +974,7 @@
       </p:sp>
       <p:sp>
         <p:nvSpPr>
-          <p:cNvPr id="196" name="Google Shape;196;gec05b96b1f_0_158:notes"/>
+          <p:cNvPr id="195" name="Google Shape;195;gec05b96b1f_0_220:notes"/>
           <p:cNvSpPr txBox="1"/>
           <p:nvPr>
             <p:ph idx="1" type="body"/>
@@ -1022,7 +1024,7 @@
   <p:cSld>
     <p:spTree>
       <p:nvGrpSpPr>
-        <p:cNvPr id="202" name="Shape 202"/>
+        <p:cNvPr id="200" name="Shape 200"/>
         <p:cNvGrpSpPr/>
         <p:nvPr/>
       </p:nvGrpSpPr>
@@ -1036,7 +1038,7 @@
       </p:grpSpPr>
       <p:sp>
         <p:nvSpPr>
-          <p:cNvPr id="203" name="Google Shape;203;gec05b96b1f_0_174:notes"/>
+          <p:cNvPr id="201" name="Google Shape;201;gec05b96b1f_0_152:notes"/>
           <p:cNvSpPr/>
           <p:nvPr>
             <p:ph idx="2" type="sldImg"/>
@@ -1071,7 +1073,7 @@
       </p:sp>
       <p:sp>
         <p:nvSpPr>
-          <p:cNvPr id="204" name="Google Shape;204;gec05b96b1f_0_174:notes"/>
+          <p:cNvPr id="202" name="Google Shape;202;gec05b96b1f_0_152:notes"/>
           <p:cNvSpPr txBox="1"/>
           <p:nvPr>
             <p:ph idx="1" type="body"/>
@@ -1121,7 +1123,7 @@
   <p:cSld>
     <p:spTree>
       <p:nvGrpSpPr>
-        <p:cNvPr id="210" name="Shape 210"/>
+        <p:cNvPr id="206" name="Shape 206"/>
         <p:cNvGrpSpPr/>
         <p:nvPr/>
       </p:nvGrpSpPr>
@@ -1135,7 +1137,7 @@
       </p:grpSpPr>
       <p:sp>
         <p:nvSpPr>
-          <p:cNvPr id="211" name="Google Shape;211;gec05b96b1f_0_182:notes"/>
+          <p:cNvPr id="207" name="Google Shape;207;gec05b96b1f_0_158:notes"/>
           <p:cNvSpPr/>
           <p:nvPr>
             <p:ph idx="2" type="sldImg"/>
@@ -1170,7 +1172,7 @@
       </p:sp>
       <p:sp>
         <p:nvSpPr>
-          <p:cNvPr id="212" name="Google Shape;212;gec05b96b1f_0_182:notes"/>
+          <p:cNvPr id="208" name="Google Shape;208;gec05b96b1f_0_158:notes"/>
           <p:cNvSpPr txBox="1"/>
           <p:nvPr>
             <p:ph idx="1" type="body"/>
@@ -1220,7 +1222,7 @@
   <p:cSld>
     <p:spTree>
       <p:nvGrpSpPr>
-        <p:cNvPr id="218" name="Shape 218"/>
+        <p:cNvPr id="214" name="Shape 214"/>
         <p:cNvGrpSpPr/>
         <p:nvPr/>
       </p:nvGrpSpPr>
@@ -1234,7 +1236,7 @@
       </p:grpSpPr>
       <p:sp>
         <p:nvSpPr>
-          <p:cNvPr id="219" name="Google Shape;219;gec05b96b1f_0_243:notes"/>
+          <p:cNvPr id="215" name="Google Shape;215;gec05b96b1f_0_174:notes"/>
           <p:cNvSpPr/>
           <p:nvPr>
             <p:ph idx="2" type="sldImg"/>
@@ -1269,7 +1271,7 @@
       </p:sp>
       <p:sp>
         <p:nvSpPr>
-          <p:cNvPr id="220" name="Google Shape;220;gec05b96b1f_0_243:notes"/>
+          <p:cNvPr id="216" name="Google Shape;216;gec05b96b1f_0_174:notes"/>
           <p:cNvSpPr txBox="1"/>
           <p:nvPr>
             <p:ph idx="1" type="body"/>
@@ -1319,7 +1321,7 @@
   <p:cSld>
     <p:spTree>
       <p:nvGrpSpPr>
-        <p:cNvPr id="225" name="Shape 225"/>
+        <p:cNvPr id="222" name="Shape 222"/>
         <p:cNvGrpSpPr/>
         <p:nvPr/>
       </p:nvGrpSpPr>
@@ -1333,7 +1335,7 @@
       </p:grpSpPr>
       <p:sp>
         <p:nvSpPr>
-          <p:cNvPr id="226" name="Google Shape;226;gec05b96b1f_0_146:notes"/>
+          <p:cNvPr id="223" name="Google Shape;223;gec05b96b1f_0_182:notes"/>
           <p:cNvSpPr/>
           <p:nvPr>
             <p:ph idx="2" type="sldImg"/>
@@ -1368,7 +1370,7 @@
       </p:sp>
       <p:sp>
         <p:nvSpPr>
-          <p:cNvPr id="227" name="Google Shape;227;gec05b96b1f_0_146:notes"/>
+          <p:cNvPr id="224" name="Google Shape;224;gec05b96b1f_0_182:notes"/>
           <p:cNvSpPr txBox="1"/>
           <p:nvPr>
             <p:ph idx="1" type="body"/>
@@ -1418,7 +1420,7 @@
   <p:cSld>
     <p:spTree>
       <p:nvGrpSpPr>
-        <p:cNvPr id="231" name="Shape 231"/>
+        <p:cNvPr id="230" name="Shape 230"/>
         <p:cNvGrpSpPr/>
         <p:nvPr/>
       </p:nvGrpSpPr>
@@ -1432,7 +1434,7 @@
       </p:grpSpPr>
       <p:sp>
         <p:nvSpPr>
-          <p:cNvPr id="232" name="Google Shape;232;gec05b96b1f_0_165:notes"/>
+          <p:cNvPr id="231" name="Google Shape;231;gec05b96b1f_0_243:notes"/>
           <p:cNvSpPr/>
           <p:nvPr>
             <p:ph idx="2" type="sldImg"/>
@@ -1467,7 +1469,7 @@
       </p:sp>
       <p:sp>
         <p:nvSpPr>
-          <p:cNvPr id="233" name="Google Shape;233;gec05b96b1f_0_165:notes"/>
+          <p:cNvPr id="232" name="Google Shape;232;gec05b96b1f_0_243:notes"/>
           <p:cNvSpPr txBox="1"/>
           <p:nvPr>
             <p:ph idx="1" type="body"/>
@@ -1517,7 +1519,7 @@
   <p:cSld>
     <p:spTree>
       <p:nvGrpSpPr>
-        <p:cNvPr id="238" name="Shape 238"/>
+        <p:cNvPr id="237" name="Shape 237"/>
         <p:cNvGrpSpPr/>
         <p:nvPr/>
       </p:nvGrpSpPr>
@@ -1531,7 +1533,7 @@
       </p:grpSpPr>
       <p:sp>
         <p:nvSpPr>
-          <p:cNvPr id="239" name="Google Shape;239;gec05b96b1f_0_130:notes"/>
+          <p:cNvPr id="238" name="Google Shape;238;gec05b96b1f_0_146:notes"/>
           <p:cNvSpPr/>
           <p:nvPr>
             <p:ph idx="2" type="sldImg"/>
@@ -1566,7 +1568,7 @@
       </p:sp>
       <p:sp>
         <p:nvSpPr>
-          <p:cNvPr id="240" name="Google Shape;240;gec05b96b1f_0_130:notes"/>
+          <p:cNvPr id="239" name="Google Shape;239;gec05b96b1f_0_146:notes"/>
           <p:cNvSpPr txBox="1"/>
           <p:nvPr>
             <p:ph idx="1" type="body"/>
@@ -1616,7 +1618,7 @@
   <p:cSld>
     <p:spTree>
       <p:nvGrpSpPr>
-        <p:cNvPr id="244" name="Shape 244"/>
+        <p:cNvPr id="243" name="Shape 243"/>
         <p:cNvGrpSpPr/>
         <p:nvPr/>
       </p:nvGrpSpPr>
@@ -1630,7 +1632,7 @@
       </p:grpSpPr>
       <p:sp>
         <p:nvSpPr>
-          <p:cNvPr id="245" name="Google Shape;245;gec05b96b1f_0_135:notes"/>
+          <p:cNvPr id="244" name="Google Shape;244;gec05b96b1f_0_165:notes"/>
           <p:cNvSpPr/>
           <p:nvPr>
             <p:ph idx="2" type="sldImg"/>
@@ -1665,7 +1667,7 @@
       </p:sp>
       <p:sp>
         <p:nvSpPr>
-          <p:cNvPr id="246" name="Google Shape;246;gec05b96b1f_0_135:notes"/>
+          <p:cNvPr id="245" name="Google Shape;245;gec05b96b1f_0_165:notes"/>
           <p:cNvSpPr txBox="1"/>
           <p:nvPr>
             <p:ph idx="1" type="body"/>
@@ -1729,7 +1731,7 @@
       </p:grpSpPr>
       <p:sp>
         <p:nvSpPr>
-          <p:cNvPr id="251" name="Google Shape;251;gec05b96b1f_0_199:notes"/>
+          <p:cNvPr id="251" name="Google Shape;251;gec05b96b1f_0_130:notes"/>
           <p:cNvSpPr/>
           <p:nvPr>
             <p:ph idx="2" type="sldImg"/>
@@ -1764,7 +1766,7 @@
       </p:sp>
       <p:sp>
         <p:nvSpPr>
-          <p:cNvPr id="252" name="Google Shape;252;gec05b96b1f_0_199:notes"/>
+          <p:cNvPr id="252" name="Google Shape;252;gec05b96b1f_0_130:notes"/>
           <p:cNvSpPr txBox="1"/>
           <p:nvPr>
             <p:ph idx="1" type="body"/>
@@ -1908,12 +1910,12 @@
 </p:notes>
 </file>
 
-<file path=ppt/notesSlides/notesSlide3.xml><?xml version="1.0" encoding="utf-8"?>
+<file path=ppt/notesSlides/notesSlide20.xml><?xml version="1.0" encoding="utf-8"?>
 <p:notes xmlns:a="http://schemas.openxmlformats.org/drawingml/2006/main" xmlns:r="http://schemas.openxmlformats.org/officeDocument/2006/relationships" xmlns:mc="http://schemas.openxmlformats.org/markup-compatibility/2006" xmlns:mv="urn:schemas-microsoft-com:mac:vml" xmlns:p="http://schemas.openxmlformats.org/presentationml/2006/main" xmlns:c="http://schemas.openxmlformats.org/drawingml/2006/chart" xmlns:dgm="http://schemas.openxmlformats.org/drawingml/2006/diagram" xmlns:o="urn:schemas-microsoft-com:office:office" xmlns:v="urn:schemas-microsoft-com:vml" xmlns:pvml="urn:schemas-microsoft-com:office:powerpoint" xmlns:com="http://schemas.openxmlformats.org/drawingml/2006/compatibility" xmlns:p14="http://schemas.microsoft.com/office/powerpoint/2010/main" xmlns:p15="http://schemas.microsoft.com/office/powerpoint/2012/main" xmlns:ahyp="http://schemas.microsoft.com/office/drawing/2018/hyperlinkcolor" showMasterPhAnim="0" showMasterSp="0">
   <p:cSld>
     <p:spTree>
       <p:nvGrpSpPr>
-        <p:cNvPr id="142" name="Shape 142"/>
+        <p:cNvPr id="256" name="Shape 256"/>
         <p:cNvGrpSpPr/>
         <p:nvPr/>
       </p:nvGrpSpPr>
@@ -1927,7 +1929,7 @@
       </p:grpSpPr>
       <p:sp>
         <p:nvSpPr>
-          <p:cNvPr id="143" name="Google Shape;143;gec05b96b1f_0_140:notes"/>
+          <p:cNvPr id="257" name="Google Shape;257;gec05b96b1f_0_135:notes"/>
           <p:cNvSpPr/>
           <p:nvPr>
             <p:ph idx="2" type="sldImg"/>
@@ -1962,7 +1964,7 @@
       </p:sp>
       <p:sp>
         <p:nvSpPr>
-          <p:cNvPr id="144" name="Google Shape;144;gec05b96b1f_0_140:notes"/>
+          <p:cNvPr id="258" name="Google Shape;258;gec05b96b1f_0_135:notes"/>
           <p:cNvSpPr txBox="1"/>
           <p:nvPr>
             <p:ph idx="1" type="body"/>
@@ -2007,12 +2009,12 @@
 </p:notes>
 </file>
 
-<file path=ppt/notesSlides/notesSlide4.xml><?xml version="1.0" encoding="utf-8"?>
+<file path=ppt/notesSlides/notesSlide21.xml><?xml version="1.0" encoding="utf-8"?>
 <p:notes xmlns:a="http://schemas.openxmlformats.org/drawingml/2006/main" xmlns:r="http://schemas.openxmlformats.org/officeDocument/2006/relationships" xmlns:mc="http://schemas.openxmlformats.org/markup-compatibility/2006" xmlns:mv="urn:schemas-microsoft-com:mac:vml" xmlns:p="http://schemas.openxmlformats.org/presentationml/2006/main" xmlns:c="http://schemas.openxmlformats.org/drawingml/2006/chart" xmlns:dgm="http://schemas.openxmlformats.org/drawingml/2006/diagram" xmlns:o="urn:schemas-microsoft-com:office:office" xmlns:v="urn:schemas-microsoft-com:vml" xmlns:pvml="urn:schemas-microsoft-com:office:powerpoint" xmlns:com="http://schemas.openxmlformats.org/drawingml/2006/compatibility" xmlns:p14="http://schemas.microsoft.com/office/powerpoint/2010/main" xmlns:p15="http://schemas.microsoft.com/office/powerpoint/2012/main" xmlns:ahyp="http://schemas.microsoft.com/office/drawing/2018/hyperlinkcolor" showMasterPhAnim="0" showMasterSp="0">
   <p:cSld>
     <p:spTree>
       <p:nvGrpSpPr>
-        <p:cNvPr id="149" name="Shape 149"/>
+        <p:cNvPr id="262" name="Shape 262"/>
         <p:cNvGrpSpPr/>
         <p:nvPr/>
       </p:nvGrpSpPr>
@@ -2026,7 +2028,7 @@
       </p:grpSpPr>
       <p:sp>
         <p:nvSpPr>
-          <p:cNvPr id="150" name="Google Shape;150;gec05b96b1f_0_204:notes"/>
+          <p:cNvPr id="263" name="Google Shape;263;gec05b96b1f_0_199:notes"/>
           <p:cNvSpPr/>
           <p:nvPr>
             <p:ph idx="2" type="sldImg"/>
@@ -2061,7 +2063,7 @@
       </p:sp>
       <p:sp>
         <p:nvSpPr>
-          <p:cNvPr id="151" name="Google Shape;151;gec05b96b1f_0_204:notes"/>
+          <p:cNvPr id="264" name="Google Shape;264;gec05b96b1f_0_199:notes"/>
           <p:cNvSpPr txBox="1"/>
           <p:nvPr>
             <p:ph idx="1" type="body"/>
@@ -2106,12 +2108,12 @@
 </p:notes>
 </file>
 
-<file path=ppt/notesSlides/notesSlide5.xml><?xml version="1.0" encoding="utf-8"?>
+<file path=ppt/notesSlides/notesSlide3.xml><?xml version="1.0" encoding="utf-8"?>
 <p:notes xmlns:a="http://schemas.openxmlformats.org/drawingml/2006/main" xmlns:r="http://schemas.openxmlformats.org/officeDocument/2006/relationships" xmlns:mc="http://schemas.openxmlformats.org/markup-compatibility/2006" xmlns:mv="urn:schemas-microsoft-com:mac:vml" xmlns:p="http://schemas.openxmlformats.org/presentationml/2006/main" xmlns:c="http://schemas.openxmlformats.org/drawingml/2006/chart" xmlns:dgm="http://schemas.openxmlformats.org/drawingml/2006/diagram" xmlns:o="urn:schemas-microsoft-com:office:office" xmlns:v="urn:schemas-microsoft-com:vml" xmlns:pvml="urn:schemas-microsoft-com:office:powerpoint" xmlns:com="http://schemas.openxmlformats.org/drawingml/2006/compatibility" xmlns:p14="http://schemas.microsoft.com/office/powerpoint/2010/main" xmlns:p15="http://schemas.microsoft.com/office/powerpoint/2012/main" xmlns:ahyp="http://schemas.microsoft.com/office/drawing/2018/hyperlinkcolor" showMasterPhAnim="0" showMasterSp="0">
   <p:cSld>
     <p:spTree>
       <p:nvGrpSpPr>
-        <p:cNvPr id="155" name="Shape 155"/>
+        <p:cNvPr id="142" name="Shape 142"/>
         <p:cNvGrpSpPr/>
         <p:nvPr/>
       </p:nvGrpSpPr>
@@ -2125,7 +2127,7 @@
       </p:grpSpPr>
       <p:sp>
         <p:nvSpPr>
-          <p:cNvPr id="156" name="Google Shape;156;gec05b96b1f_0_228:notes"/>
+          <p:cNvPr id="143" name="Google Shape;143;gecf485258e_0_6:notes"/>
           <p:cNvSpPr/>
           <p:nvPr>
             <p:ph idx="2" type="sldImg"/>
@@ -2160,7 +2162,7 @@
       </p:sp>
       <p:sp>
         <p:nvSpPr>
-          <p:cNvPr id="157" name="Google Shape;157;gec05b96b1f_0_228:notes"/>
+          <p:cNvPr id="144" name="Google Shape;144;gecf485258e_0_6:notes"/>
           <p:cNvSpPr txBox="1"/>
           <p:nvPr>
             <p:ph idx="1" type="body"/>
@@ -2205,12 +2207,12 @@
 </p:notes>
 </file>
 
-<file path=ppt/notesSlides/notesSlide6.xml><?xml version="1.0" encoding="utf-8"?>
+<file path=ppt/notesSlides/notesSlide4.xml><?xml version="1.0" encoding="utf-8"?>
 <p:notes xmlns:a="http://schemas.openxmlformats.org/drawingml/2006/main" xmlns:r="http://schemas.openxmlformats.org/officeDocument/2006/relationships" xmlns:mc="http://schemas.openxmlformats.org/markup-compatibility/2006" xmlns:mv="urn:schemas-microsoft-com:mac:vml" xmlns:p="http://schemas.openxmlformats.org/presentationml/2006/main" xmlns:c="http://schemas.openxmlformats.org/drawingml/2006/chart" xmlns:dgm="http://schemas.openxmlformats.org/drawingml/2006/diagram" xmlns:o="urn:schemas-microsoft-com:office:office" xmlns:v="urn:schemas-microsoft-com:vml" xmlns:pvml="urn:schemas-microsoft-com:office:powerpoint" xmlns:com="http://schemas.openxmlformats.org/drawingml/2006/compatibility" xmlns:p14="http://schemas.microsoft.com/office/powerpoint/2010/main" xmlns:p15="http://schemas.microsoft.com/office/powerpoint/2012/main" xmlns:ahyp="http://schemas.microsoft.com/office/drawing/2018/hyperlinkcolor" showMasterPhAnim="0" showMasterSp="0">
   <p:cSld>
     <p:spTree>
       <p:nvGrpSpPr>
-        <p:cNvPr id="162" name="Shape 162"/>
+        <p:cNvPr id="148" name="Shape 148"/>
         <p:cNvGrpSpPr/>
         <p:nvPr/>
       </p:nvGrpSpPr>
@@ -2224,7 +2226,7 @@
       </p:grpSpPr>
       <p:sp>
         <p:nvSpPr>
-          <p:cNvPr id="163" name="Google Shape;163;gec05b96b1f_0_214:notes"/>
+          <p:cNvPr id="149" name="Google Shape;149;gecf485258e_0_0:notes"/>
           <p:cNvSpPr/>
           <p:nvPr>
             <p:ph idx="2" type="sldImg"/>
@@ -2259,7 +2261,7 @@
       </p:sp>
       <p:sp>
         <p:nvSpPr>
-          <p:cNvPr id="164" name="Google Shape;164;gec05b96b1f_0_214:notes"/>
+          <p:cNvPr id="150" name="Google Shape;150;gecf485258e_0_0:notes"/>
           <p:cNvSpPr txBox="1"/>
           <p:nvPr>
             <p:ph idx="1" type="body"/>
@@ -2304,12 +2306,12 @@
 </p:notes>
 </file>
 
-<file path=ppt/notesSlides/notesSlide7.xml><?xml version="1.0" encoding="utf-8"?>
+<file path=ppt/notesSlides/notesSlide5.xml><?xml version="1.0" encoding="utf-8"?>
 <p:notes xmlns:a="http://schemas.openxmlformats.org/drawingml/2006/main" xmlns:r="http://schemas.openxmlformats.org/officeDocument/2006/relationships" xmlns:mc="http://schemas.openxmlformats.org/markup-compatibility/2006" xmlns:mv="urn:schemas-microsoft-com:mac:vml" xmlns:p="http://schemas.openxmlformats.org/presentationml/2006/main" xmlns:c="http://schemas.openxmlformats.org/drawingml/2006/chart" xmlns:dgm="http://schemas.openxmlformats.org/drawingml/2006/diagram" xmlns:o="urn:schemas-microsoft-com:office:office" xmlns:v="urn:schemas-microsoft-com:vml" xmlns:pvml="urn:schemas-microsoft-com:office:powerpoint" xmlns:com="http://schemas.openxmlformats.org/drawingml/2006/compatibility" xmlns:p14="http://schemas.microsoft.com/office/powerpoint/2010/main" xmlns:p15="http://schemas.microsoft.com/office/powerpoint/2012/main" xmlns:ahyp="http://schemas.microsoft.com/office/drawing/2018/hyperlinkcolor" showMasterPhAnim="0" showMasterSp="0">
   <p:cSld>
     <p:spTree>
       <p:nvGrpSpPr>
-        <p:cNvPr id="169" name="Shape 169"/>
+        <p:cNvPr id="154" name="Shape 154"/>
         <p:cNvGrpSpPr/>
         <p:nvPr/>
       </p:nvGrpSpPr>
@@ -2323,7 +2325,7 @@
       </p:grpSpPr>
       <p:sp>
         <p:nvSpPr>
-          <p:cNvPr id="170" name="Google Shape;170;gec05b96b1f_0_193:notes"/>
+          <p:cNvPr id="155" name="Google Shape;155;gec05b96b1f_0_140:notes"/>
           <p:cNvSpPr/>
           <p:nvPr>
             <p:ph idx="2" type="sldImg"/>
@@ -2358,7 +2360,7 @@
       </p:sp>
       <p:sp>
         <p:nvSpPr>
-          <p:cNvPr id="171" name="Google Shape;171;gec05b96b1f_0_193:notes"/>
+          <p:cNvPr id="156" name="Google Shape;156;gec05b96b1f_0_140:notes"/>
           <p:cNvSpPr txBox="1"/>
           <p:nvPr>
             <p:ph idx="1" type="body"/>
@@ -2403,12 +2405,12 @@
 </p:notes>
 </file>
 
-<file path=ppt/notesSlides/notesSlide8.xml><?xml version="1.0" encoding="utf-8"?>
+<file path=ppt/notesSlides/notesSlide6.xml><?xml version="1.0" encoding="utf-8"?>
 <p:notes xmlns:a="http://schemas.openxmlformats.org/drawingml/2006/main" xmlns:r="http://schemas.openxmlformats.org/officeDocument/2006/relationships" xmlns:mc="http://schemas.openxmlformats.org/markup-compatibility/2006" xmlns:mv="urn:schemas-microsoft-com:mac:vml" xmlns:p="http://schemas.openxmlformats.org/presentationml/2006/main" xmlns:c="http://schemas.openxmlformats.org/drawingml/2006/chart" xmlns:dgm="http://schemas.openxmlformats.org/drawingml/2006/diagram" xmlns:o="urn:schemas-microsoft-com:office:office" xmlns:v="urn:schemas-microsoft-com:vml" xmlns:pvml="urn:schemas-microsoft-com:office:powerpoint" xmlns:com="http://schemas.openxmlformats.org/drawingml/2006/compatibility" xmlns:p14="http://schemas.microsoft.com/office/powerpoint/2010/main" xmlns:p15="http://schemas.microsoft.com/office/powerpoint/2012/main" xmlns:ahyp="http://schemas.microsoft.com/office/drawing/2018/hyperlinkcolor" showMasterPhAnim="0" showMasterSp="0">
   <p:cSld>
     <p:spTree>
       <p:nvGrpSpPr>
-        <p:cNvPr id="175" name="Shape 175"/>
+        <p:cNvPr id="161" name="Shape 161"/>
         <p:cNvGrpSpPr/>
         <p:nvPr/>
       </p:nvGrpSpPr>
@@ -2422,7 +2424,7 @@
       </p:grpSpPr>
       <p:sp>
         <p:nvSpPr>
-          <p:cNvPr id="176" name="Google Shape;176;gec05b96b1f_0_209:notes"/>
+          <p:cNvPr id="162" name="Google Shape;162;gec05b96b1f_0_204:notes"/>
           <p:cNvSpPr/>
           <p:nvPr>
             <p:ph idx="2" type="sldImg"/>
@@ -2457,7 +2459,205 @@
       </p:sp>
       <p:sp>
         <p:nvSpPr>
-          <p:cNvPr id="177" name="Google Shape;177;gec05b96b1f_0_209:notes"/>
+          <p:cNvPr id="163" name="Google Shape;163;gec05b96b1f_0_204:notes"/>
+          <p:cNvSpPr txBox="1"/>
+          <p:nvPr>
+            <p:ph idx="1" type="body"/>
+          </p:nvPr>
+        </p:nvSpPr>
+        <p:spPr>
+          <a:xfrm>
+            <a:off x="685800" y="4343400"/>
+            <a:ext cx="5486400" cy="4114800"/>
+          </a:xfrm>
+          <a:prstGeom prst="rect">
+            <a:avLst/>
+          </a:prstGeom>
+        </p:spPr>
+        <p:txBody>
+          <a:bodyPr anchorCtr="0" anchor="t" bIns="91425" lIns="91425" spcFirstLastPara="1" rIns="91425" wrap="square" tIns="91425">
+            <a:noAutofit/>
+          </a:bodyPr>
+          <a:lstStyle/>
+          <a:p>
+            <a:pPr indent="0" lvl="0" marL="0" rtl="0" algn="l">
+              <a:spcBef>
+                <a:spcPts val="0"/>
+              </a:spcBef>
+              <a:spcAft>
+                <a:spcPts val="0"/>
+              </a:spcAft>
+              <a:buNone/>
+            </a:pPr>
+            <a:r>
+              <a:t/>
+            </a:r>
+            <a:endParaRPr/>
+          </a:p>
+        </p:txBody>
+      </p:sp>
+    </p:spTree>
+  </p:cSld>
+  <p:clrMapOvr>
+    <a:masterClrMapping/>
+  </p:clrMapOvr>
+</p:notes>
+</file>
+
+<file path=ppt/notesSlides/notesSlide7.xml><?xml version="1.0" encoding="utf-8"?>
+<p:notes xmlns:a="http://schemas.openxmlformats.org/drawingml/2006/main" xmlns:r="http://schemas.openxmlformats.org/officeDocument/2006/relationships" xmlns:mc="http://schemas.openxmlformats.org/markup-compatibility/2006" xmlns:mv="urn:schemas-microsoft-com:mac:vml" xmlns:p="http://schemas.openxmlformats.org/presentationml/2006/main" xmlns:c="http://schemas.openxmlformats.org/drawingml/2006/chart" xmlns:dgm="http://schemas.openxmlformats.org/drawingml/2006/diagram" xmlns:o="urn:schemas-microsoft-com:office:office" xmlns:v="urn:schemas-microsoft-com:vml" xmlns:pvml="urn:schemas-microsoft-com:office:powerpoint" xmlns:com="http://schemas.openxmlformats.org/drawingml/2006/compatibility" xmlns:p14="http://schemas.microsoft.com/office/powerpoint/2010/main" xmlns:p15="http://schemas.microsoft.com/office/powerpoint/2012/main" xmlns:ahyp="http://schemas.microsoft.com/office/drawing/2018/hyperlinkcolor" showMasterPhAnim="0" showMasterSp="0">
+  <p:cSld>
+    <p:spTree>
+      <p:nvGrpSpPr>
+        <p:cNvPr id="167" name="Shape 167"/>
+        <p:cNvGrpSpPr/>
+        <p:nvPr/>
+      </p:nvGrpSpPr>
+      <p:grpSpPr>
+        <a:xfrm>
+          <a:off x="0" y="0"/>
+          <a:ext cx="0" cy="0"/>
+          <a:chOff x="0" y="0"/>
+          <a:chExt cx="0" cy="0"/>
+        </a:xfrm>
+      </p:grpSpPr>
+      <p:sp>
+        <p:nvSpPr>
+          <p:cNvPr id="168" name="Google Shape;168;gec05b96b1f_0_228:notes"/>
+          <p:cNvSpPr/>
+          <p:nvPr>
+            <p:ph idx="2" type="sldImg"/>
+          </p:nvPr>
+        </p:nvSpPr>
+        <p:spPr>
+          <a:xfrm>
+            <a:off x="381300" y="685800"/>
+            <a:ext cx="6096000" cy="3429000"/>
+          </a:xfrm>
+          <a:custGeom>
+            <a:rect b="b" l="l" r="r" t="t"/>
+            <a:pathLst>
+              <a:path extrusionOk="0" h="120000" w="120000">
+                <a:moveTo>
+                  <a:pt x="0" y="0"/>
+                </a:moveTo>
+                <a:lnTo>
+                  <a:pt x="120000" y="0"/>
+                </a:lnTo>
+                <a:lnTo>
+                  <a:pt x="120000" y="120000"/>
+                </a:lnTo>
+                <a:lnTo>
+                  <a:pt x="0" y="120000"/>
+                </a:lnTo>
+                <a:close/>
+              </a:path>
+            </a:pathLst>
+          </a:custGeom>
+        </p:spPr>
+      </p:sp>
+      <p:sp>
+        <p:nvSpPr>
+          <p:cNvPr id="169" name="Google Shape;169;gec05b96b1f_0_228:notes"/>
+          <p:cNvSpPr txBox="1"/>
+          <p:nvPr>
+            <p:ph idx="1" type="body"/>
+          </p:nvPr>
+        </p:nvSpPr>
+        <p:spPr>
+          <a:xfrm>
+            <a:off x="685800" y="4343400"/>
+            <a:ext cx="5486400" cy="4114800"/>
+          </a:xfrm>
+          <a:prstGeom prst="rect">
+            <a:avLst/>
+          </a:prstGeom>
+        </p:spPr>
+        <p:txBody>
+          <a:bodyPr anchorCtr="0" anchor="t" bIns="91425" lIns="91425" spcFirstLastPara="1" rIns="91425" wrap="square" tIns="91425">
+            <a:noAutofit/>
+          </a:bodyPr>
+          <a:lstStyle/>
+          <a:p>
+            <a:pPr indent="0" lvl="0" marL="0" rtl="0" algn="l">
+              <a:spcBef>
+                <a:spcPts val="0"/>
+              </a:spcBef>
+              <a:spcAft>
+                <a:spcPts val="0"/>
+              </a:spcAft>
+              <a:buNone/>
+            </a:pPr>
+            <a:r>
+              <a:t/>
+            </a:r>
+            <a:endParaRPr/>
+          </a:p>
+        </p:txBody>
+      </p:sp>
+    </p:spTree>
+  </p:cSld>
+  <p:clrMapOvr>
+    <a:masterClrMapping/>
+  </p:clrMapOvr>
+</p:notes>
+</file>
+
+<file path=ppt/notesSlides/notesSlide8.xml><?xml version="1.0" encoding="utf-8"?>
+<p:notes xmlns:a="http://schemas.openxmlformats.org/drawingml/2006/main" xmlns:r="http://schemas.openxmlformats.org/officeDocument/2006/relationships" xmlns:mc="http://schemas.openxmlformats.org/markup-compatibility/2006" xmlns:mv="urn:schemas-microsoft-com:mac:vml" xmlns:p="http://schemas.openxmlformats.org/presentationml/2006/main" xmlns:c="http://schemas.openxmlformats.org/drawingml/2006/chart" xmlns:dgm="http://schemas.openxmlformats.org/drawingml/2006/diagram" xmlns:o="urn:schemas-microsoft-com:office:office" xmlns:v="urn:schemas-microsoft-com:vml" xmlns:pvml="urn:schemas-microsoft-com:office:powerpoint" xmlns:com="http://schemas.openxmlformats.org/drawingml/2006/compatibility" xmlns:p14="http://schemas.microsoft.com/office/powerpoint/2010/main" xmlns:p15="http://schemas.microsoft.com/office/powerpoint/2012/main" xmlns:ahyp="http://schemas.microsoft.com/office/drawing/2018/hyperlinkcolor" showMasterPhAnim="0" showMasterSp="0">
+  <p:cSld>
+    <p:spTree>
+      <p:nvGrpSpPr>
+        <p:cNvPr id="174" name="Shape 174"/>
+        <p:cNvGrpSpPr/>
+        <p:nvPr/>
+      </p:nvGrpSpPr>
+      <p:grpSpPr>
+        <a:xfrm>
+          <a:off x="0" y="0"/>
+          <a:ext cx="0" cy="0"/>
+          <a:chOff x="0" y="0"/>
+          <a:chExt cx="0" cy="0"/>
+        </a:xfrm>
+      </p:grpSpPr>
+      <p:sp>
+        <p:nvSpPr>
+          <p:cNvPr id="175" name="Google Shape;175;gec05b96b1f_0_214:notes"/>
+          <p:cNvSpPr/>
+          <p:nvPr>
+            <p:ph idx="2" type="sldImg"/>
+          </p:nvPr>
+        </p:nvSpPr>
+        <p:spPr>
+          <a:xfrm>
+            <a:off x="381300" y="685800"/>
+            <a:ext cx="6096000" cy="3429000"/>
+          </a:xfrm>
+          <a:custGeom>
+            <a:rect b="b" l="l" r="r" t="t"/>
+            <a:pathLst>
+              <a:path extrusionOk="0" h="120000" w="120000">
+                <a:moveTo>
+                  <a:pt x="0" y="0"/>
+                </a:moveTo>
+                <a:lnTo>
+                  <a:pt x="120000" y="0"/>
+                </a:lnTo>
+                <a:lnTo>
+                  <a:pt x="120000" y="120000"/>
+                </a:lnTo>
+                <a:lnTo>
+                  <a:pt x="0" y="120000"/>
+                </a:lnTo>
+                <a:close/>
+              </a:path>
+            </a:pathLst>
+          </a:custGeom>
+        </p:spPr>
+      </p:sp>
+      <p:sp>
+        <p:nvSpPr>
+          <p:cNvPr id="176" name="Google Shape;176;gec05b96b1f_0_214:notes"/>
           <p:cNvSpPr txBox="1"/>
           <p:nvPr>
             <p:ph idx="1" type="body"/>
@@ -2521,7 +2721,7 @@
       </p:grpSpPr>
       <p:sp>
         <p:nvSpPr>
-          <p:cNvPr id="182" name="Google Shape;182;gec05b96b1f_0_220:notes"/>
+          <p:cNvPr id="182" name="Google Shape;182;gec05b96b1f_0_193:notes"/>
           <p:cNvSpPr/>
           <p:nvPr>
             <p:ph idx="2" type="sldImg"/>
@@ -2556,7 +2756,7 @@
       </p:sp>
       <p:sp>
         <p:nvSpPr>
-          <p:cNvPr id="183" name="Google Shape;183;gec05b96b1f_0_220:notes"/>
+          <p:cNvPr id="183" name="Google Shape;183;gec05b96b1f_0_193:notes"/>
           <p:cNvSpPr txBox="1"/>
           <p:nvPr>
             <p:ph idx="1" type="body"/>
@@ -10910,7 +11110,7 @@
   <p:cSld>
     <p:spTree>
       <p:nvGrpSpPr>
-        <p:cNvPr id="191" name="Shape 191"/>
+        <p:cNvPr id="190" name="Shape 190"/>
         <p:cNvGrpSpPr/>
         <p:nvPr/>
       </p:nvGrpSpPr>
@@ -10924,7 +11124,498 @@
       </p:grpSpPr>
       <p:sp>
         <p:nvSpPr>
+          <p:cNvPr id="191" name="Google Shape;191;p22"/>
+          <p:cNvSpPr txBox="1"/>
+          <p:nvPr>
+            <p:ph type="title"/>
+          </p:nvPr>
+        </p:nvSpPr>
+        <p:spPr>
+          <a:xfrm>
+            <a:off x="1297500" y="393750"/>
+            <a:ext cx="7038900" cy="914100"/>
+          </a:xfrm>
+          <a:prstGeom prst="rect">
+            <a:avLst/>
+          </a:prstGeom>
+        </p:spPr>
+        <p:txBody>
+          <a:bodyPr anchorCtr="0" anchor="t" bIns="91425" lIns="91425" spcFirstLastPara="1" rIns="91425" wrap="square" tIns="91425">
+            <a:normAutofit/>
+          </a:bodyPr>
+          <a:lstStyle/>
+          <a:p>
+            <a:pPr indent="0" lvl="0" marL="0" rtl="0" algn="l">
+              <a:spcBef>
+                <a:spcPts val="0"/>
+              </a:spcBef>
+              <a:spcAft>
+                <a:spcPts val="0"/>
+              </a:spcAft>
+              <a:buNone/>
+            </a:pPr>
+            <a:r>
+              <a:rPr lang="en" sz="3000"/>
+              <a:t>Reward Functions</a:t>
+            </a:r>
+            <a:endParaRPr sz="3000"/>
+          </a:p>
+        </p:txBody>
+      </p:sp>
+      <p:sp>
+        <p:nvSpPr>
           <p:cNvPr id="192" name="Google Shape;192;p22"/>
+          <p:cNvSpPr txBox="1"/>
+          <p:nvPr>
+            <p:ph idx="1" type="body"/>
+          </p:nvPr>
+        </p:nvSpPr>
+        <p:spPr>
+          <a:xfrm>
+            <a:off x="1297500" y="1567550"/>
+            <a:ext cx="7038900" cy="2911200"/>
+          </a:xfrm>
+          <a:prstGeom prst="rect">
+            <a:avLst/>
+          </a:prstGeom>
+        </p:spPr>
+        <p:txBody>
+          <a:bodyPr anchorCtr="0" anchor="t" bIns="91425" lIns="91425" spcFirstLastPara="1" rIns="91425" wrap="square" tIns="91425">
+            <a:normAutofit/>
+          </a:bodyPr>
+          <a:lstStyle/>
+          <a:p>
+            <a:pPr indent="-342900" lvl="0" marL="457200" rtl="0" algn="l">
+              <a:spcBef>
+                <a:spcPts val="0"/>
+              </a:spcBef>
+              <a:spcAft>
+                <a:spcPts val="0"/>
+              </a:spcAft>
+              <a:buSzPts val="1800"/>
+              <a:buChar char="●"/>
+            </a:pPr>
+            <a:r>
+              <a:rPr lang="en" sz="1800"/>
+              <a:t>Lambda functions written in Python</a:t>
+            </a:r>
+            <a:endParaRPr sz="1800"/>
+          </a:p>
+          <a:p>
+            <a:pPr indent="-342900" lvl="0" marL="457200" rtl="0" algn="l">
+              <a:spcBef>
+                <a:spcPts val="0"/>
+              </a:spcBef>
+              <a:spcAft>
+                <a:spcPts val="0"/>
+              </a:spcAft>
+              <a:buSzPts val="1800"/>
+              <a:buChar char="●"/>
+            </a:pPr>
+            <a:r>
+              <a:rPr lang="en" sz="1800"/>
+              <a:t>Used several to train the different models</a:t>
+            </a:r>
+            <a:endParaRPr sz="1800"/>
+          </a:p>
+          <a:p>
+            <a:pPr indent="-342900" lvl="0" marL="457200" rtl="0" algn="l">
+              <a:spcBef>
+                <a:spcPts val="0"/>
+              </a:spcBef>
+              <a:spcAft>
+                <a:spcPts val="0"/>
+              </a:spcAft>
+              <a:buSzPts val="1800"/>
+              <a:buChar char="●"/>
+            </a:pPr>
+            <a:r>
+              <a:rPr lang="en" sz="1800"/>
+              <a:t>The best performing model combined multiple examples</a:t>
+            </a:r>
+            <a:endParaRPr sz="1800"/>
+          </a:p>
+        </p:txBody>
+      </p:sp>
+    </p:spTree>
+  </p:cSld>
+  <p:clrMapOvr>
+    <a:masterClrMapping/>
+  </p:clrMapOvr>
+</p:sld>
+</file>
+
+<file path=ppt/slides/slide11.xml><?xml version="1.0" encoding="utf-8"?>
+<p:sld xmlns:a="http://schemas.openxmlformats.org/drawingml/2006/main" xmlns:r="http://schemas.openxmlformats.org/officeDocument/2006/relationships" xmlns:mc="http://schemas.openxmlformats.org/markup-compatibility/2006" xmlns:mv="urn:schemas-microsoft-com:mac:vml" xmlns:p="http://schemas.openxmlformats.org/presentationml/2006/main" xmlns:c="http://schemas.openxmlformats.org/drawingml/2006/chart" xmlns:dgm="http://schemas.openxmlformats.org/drawingml/2006/diagram" xmlns:o="urn:schemas-microsoft-com:office:office" xmlns:v="urn:schemas-microsoft-com:vml" xmlns:pvml="urn:schemas-microsoft-com:office:powerpoint" xmlns:com="http://schemas.openxmlformats.org/drawingml/2006/compatibility" xmlns:p14="http://schemas.microsoft.com/office/powerpoint/2010/main" xmlns:p15="http://schemas.microsoft.com/office/powerpoint/2012/main" xmlns:ahyp="http://schemas.microsoft.com/office/drawing/2018/hyperlinkcolor">
+  <p:cSld>
+    <p:spTree>
+      <p:nvGrpSpPr>
+        <p:cNvPr id="196" name="Shape 196"/>
+        <p:cNvGrpSpPr/>
+        <p:nvPr/>
+      </p:nvGrpSpPr>
+      <p:grpSpPr>
+        <a:xfrm>
+          <a:off x="0" y="0"/>
+          <a:ext cx="0" cy="0"/>
+          <a:chOff x="0" y="0"/>
+          <a:chExt cx="0" cy="0"/>
+        </a:xfrm>
+      </p:grpSpPr>
+      <p:sp>
+        <p:nvSpPr>
+          <p:cNvPr id="197" name="Google Shape;197;p23"/>
+          <p:cNvSpPr txBox="1"/>
+          <p:nvPr>
+            <p:ph type="title"/>
+          </p:nvPr>
+        </p:nvSpPr>
+        <p:spPr>
+          <a:xfrm>
+            <a:off x="1297500" y="393750"/>
+            <a:ext cx="7038900" cy="914100"/>
+          </a:xfrm>
+          <a:prstGeom prst="rect">
+            <a:avLst/>
+          </a:prstGeom>
+        </p:spPr>
+        <p:txBody>
+          <a:bodyPr anchorCtr="0" anchor="t" bIns="91425" lIns="91425" spcFirstLastPara="1" rIns="91425" wrap="square" tIns="91425">
+            <a:normAutofit/>
+          </a:bodyPr>
+          <a:lstStyle/>
+          <a:p>
+            <a:pPr indent="0" lvl="0" marL="0" rtl="0" algn="l">
+              <a:spcBef>
+                <a:spcPts val="0"/>
+              </a:spcBef>
+              <a:spcAft>
+                <a:spcPts val="0"/>
+              </a:spcAft>
+              <a:buNone/>
+            </a:pPr>
+            <a:r>
+              <a:rPr lang="en" sz="3000"/>
+              <a:t>Input Parameters</a:t>
+            </a:r>
+            <a:endParaRPr sz="3000"/>
+          </a:p>
+        </p:txBody>
+      </p:sp>
+      <p:sp>
+        <p:nvSpPr>
+          <p:cNvPr id="198" name="Google Shape;198;p23"/>
+          <p:cNvSpPr txBox="1"/>
+          <p:nvPr>
+            <p:ph idx="1" type="body"/>
+          </p:nvPr>
+        </p:nvSpPr>
+        <p:spPr>
+          <a:xfrm>
+            <a:off x="1297500" y="1567550"/>
+            <a:ext cx="3403200" cy="2911200"/>
+          </a:xfrm>
+          <a:prstGeom prst="rect">
+            <a:avLst/>
+          </a:prstGeom>
+        </p:spPr>
+        <p:txBody>
+          <a:bodyPr anchorCtr="0" anchor="t" bIns="91425" lIns="91425" spcFirstLastPara="1" rIns="91425" wrap="square" tIns="91425">
+            <a:normAutofit/>
+          </a:bodyPr>
+          <a:lstStyle/>
+          <a:p>
+            <a:pPr indent="-342900" lvl="0" marL="457200" rtl="0" algn="l">
+              <a:spcBef>
+                <a:spcPts val="0"/>
+              </a:spcBef>
+              <a:spcAft>
+                <a:spcPts val="0"/>
+              </a:spcAft>
+              <a:buSzPts val="1800"/>
+              <a:buChar char="●"/>
+            </a:pPr>
+            <a:r>
+              <a:rPr lang="en" sz="1800"/>
+              <a:t>all_wheels_on_track</a:t>
+            </a:r>
+            <a:endParaRPr sz="1800"/>
+          </a:p>
+          <a:p>
+            <a:pPr indent="-342900" lvl="0" marL="457200" rtl="0" algn="l">
+              <a:spcBef>
+                <a:spcPts val="0"/>
+              </a:spcBef>
+              <a:spcAft>
+                <a:spcPts val="0"/>
+              </a:spcAft>
+              <a:buSzPts val="1800"/>
+              <a:buChar char="●"/>
+            </a:pPr>
+            <a:r>
+              <a:rPr lang="en" sz="1800"/>
+              <a:t>closest_objects</a:t>
+            </a:r>
+            <a:endParaRPr sz="1800"/>
+          </a:p>
+          <a:p>
+            <a:pPr indent="-342900" lvl="0" marL="457200" rtl="0" algn="l">
+              <a:spcBef>
+                <a:spcPts val="0"/>
+              </a:spcBef>
+              <a:spcAft>
+                <a:spcPts val="0"/>
+              </a:spcAft>
+              <a:buSzPts val="1800"/>
+              <a:buChar char="●"/>
+            </a:pPr>
+            <a:r>
+              <a:rPr lang="en" sz="1800"/>
+              <a:t>distance_from_center</a:t>
+            </a:r>
+            <a:endParaRPr sz="1800"/>
+          </a:p>
+          <a:p>
+            <a:pPr indent="-342900" lvl="0" marL="457200" rtl="0" algn="l">
+              <a:spcBef>
+                <a:spcPts val="0"/>
+              </a:spcBef>
+              <a:spcAft>
+                <a:spcPts val="0"/>
+              </a:spcAft>
+              <a:buSzPts val="1800"/>
+              <a:buChar char="●"/>
+            </a:pPr>
+            <a:r>
+              <a:rPr lang="en" sz="1800"/>
+              <a:t>heading</a:t>
+            </a:r>
+            <a:endParaRPr sz="1800"/>
+          </a:p>
+          <a:p>
+            <a:pPr indent="-342900" lvl="0" marL="457200" rtl="0" algn="l">
+              <a:spcBef>
+                <a:spcPts val="0"/>
+              </a:spcBef>
+              <a:spcAft>
+                <a:spcPts val="0"/>
+              </a:spcAft>
+              <a:buSzPts val="1800"/>
+              <a:buChar char="●"/>
+            </a:pPr>
+            <a:r>
+              <a:rPr lang="en" sz="1800"/>
+              <a:t>is_left_of_center</a:t>
+            </a:r>
+            <a:endParaRPr sz="1800"/>
+          </a:p>
+          <a:p>
+            <a:pPr indent="-342900" lvl="0" marL="457200" rtl="0" algn="l">
+              <a:spcBef>
+                <a:spcPts val="0"/>
+              </a:spcBef>
+              <a:spcAft>
+                <a:spcPts val="0"/>
+              </a:spcAft>
+              <a:buSzPts val="1800"/>
+              <a:buChar char="●"/>
+            </a:pPr>
+            <a:r>
+              <a:rPr lang="en" sz="1800"/>
+              <a:t>is_reversed</a:t>
+            </a:r>
+            <a:endParaRPr sz="1800"/>
+          </a:p>
+          <a:p>
+            <a:pPr indent="-342900" lvl="0" marL="457200" rtl="0" algn="l">
+              <a:spcBef>
+                <a:spcPts val="0"/>
+              </a:spcBef>
+              <a:spcAft>
+                <a:spcPts val="0"/>
+              </a:spcAft>
+              <a:buSzPts val="1800"/>
+              <a:buChar char="●"/>
+            </a:pPr>
+            <a:r>
+              <a:rPr lang="en" sz="1800"/>
+              <a:t>objects_location</a:t>
+            </a:r>
+            <a:endParaRPr sz="1800"/>
+          </a:p>
+        </p:txBody>
+      </p:sp>
+      <p:sp>
+        <p:nvSpPr>
+          <p:cNvPr id="199" name="Google Shape;199;p23"/>
+          <p:cNvSpPr txBox="1"/>
+          <p:nvPr>
+            <p:ph idx="2" type="body"/>
+          </p:nvPr>
+        </p:nvSpPr>
+        <p:spPr>
+          <a:xfrm>
+            <a:off x="4933221" y="1567550"/>
+            <a:ext cx="3403200" cy="2911200"/>
+          </a:xfrm>
+          <a:prstGeom prst="rect">
+            <a:avLst/>
+          </a:prstGeom>
+        </p:spPr>
+        <p:txBody>
+          <a:bodyPr anchorCtr="0" anchor="t" bIns="91425" lIns="91425" spcFirstLastPara="1" rIns="91425" wrap="square" tIns="91425">
+            <a:normAutofit/>
+          </a:bodyPr>
+          <a:lstStyle/>
+          <a:p>
+            <a:pPr indent="-342900" lvl="0" marL="457200" rtl="0" algn="l">
+              <a:spcBef>
+                <a:spcPts val="0"/>
+              </a:spcBef>
+              <a:spcAft>
+                <a:spcPts val="0"/>
+              </a:spcAft>
+              <a:buSzPts val="1800"/>
+              <a:buChar char="●"/>
+            </a:pPr>
+            <a:r>
+              <a:rPr lang="en" sz="1800"/>
+              <a:t>objects_left_of_center</a:t>
+            </a:r>
+            <a:endParaRPr sz="1800"/>
+          </a:p>
+          <a:p>
+            <a:pPr indent="-342900" lvl="0" marL="457200" rtl="0" algn="l">
+              <a:spcBef>
+                <a:spcPts val="0"/>
+              </a:spcBef>
+              <a:spcAft>
+                <a:spcPts val="0"/>
+              </a:spcAft>
+              <a:buSzPts val="1800"/>
+              <a:buChar char="●"/>
+            </a:pPr>
+            <a:r>
+              <a:rPr lang="en" sz="1800"/>
+              <a:t>progress</a:t>
+            </a:r>
+            <a:endParaRPr sz="1800"/>
+          </a:p>
+          <a:p>
+            <a:pPr indent="-342900" lvl="0" marL="457200" rtl="0" algn="l">
+              <a:spcBef>
+                <a:spcPts val="0"/>
+              </a:spcBef>
+              <a:spcAft>
+                <a:spcPts val="0"/>
+              </a:spcAft>
+              <a:buSzPts val="1800"/>
+              <a:buChar char="●"/>
+            </a:pPr>
+            <a:r>
+              <a:rPr lang="en" sz="1800"/>
+              <a:t>steering_angle</a:t>
+            </a:r>
+            <a:endParaRPr sz="1800"/>
+          </a:p>
+          <a:p>
+            <a:pPr indent="-342900" lvl="0" marL="457200" rtl="0" algn="l">
+              <a:spcBef>
+                <a:spcPts val="0"/>
+              </a:spcBef>
+              <a:spcAft>
+                <a:spcPts val="0"/>
+              </a:spcAft>
+              <a:buSzPts val="1800"/>
+              <a:buChar char="●"/>
+            </a:pPr>
+            <a:r>
+              <a:rPr lang="en" sz="1800"/>
+              <a:t>track_width</a:t>
+            </a:r>
+            <a:endParaRPr sz="1800"/>
+          </a:p>
+          <a:p>
+            <a:pPr indent="-342900" lvl="0" marL="457200" rtl="0" algn="l">
+              <a:spcBef>
+                <a:spcPts val="0"/>
+              </a:spcBef>
+              <a:spcAft>
+                <a:spcPts val="0"/>
+              </a:spcAft>
+              <a:buSzPts val="1800"/>
+              <a:buChar char="●"/>
+            </a:pPr>
+            <a:r>
+              <a:rPr lang="en" sz="1800"/>
+              <a:t>waypoints</a:t>
+            </a:r>
+            <a:endParaRPr sz="1800"/>
+          </a:p>
+          <a:p>
+            <a:pPr indent="-342900" lvl="0" marL="457200" rtl="0" algn="l">
+              <a:spcBef>
+                <a:spcPts val="0"/>
+              </a:spcBef>
+              <a:spcAft>
+                <a:spcPts val="0"/>
+              </a:spcAft>
+              <a:buSzPts val="1800"/>
+              <a:buChar char="●"/>
+            </a:pPr>
+            <a:r>
+              <a:rPr lang="en" sz="1800"/>
+              <a:t>x</a:t>
+            </a:r>
+            <a:endParaRPr sz="1800"/>
+          </a:p>
+          <a:p>
+            <a:pPr indent="-342900" lvl="0" marL="457200" rtl="0" algn="l">
+              <a:spcBef>
+                <a:spcPts val="0"/>
+              </a:spcBef>
+              <a:spcAft>
+                <a:spcPts val="0"/>
+              </a:spcAft>
+              <a:buSzPts val="1800"/>
+              <a:buChar char="●"/>
+            </a:pPr>
+            <a:r>
+              <a:rPr lang="en" sz="1800"/>
+              <a:t>y</a:t>
+            </a:r>
+            <a:endParaRPr sz="1800"/>
+          </a:p>
+        </p:txBody>
+      </p:sp>
+    </p:spTree>
+  </p:cSld>
+  <p:clrMapOvr>
+    <a:masterClrMapping/>
+  </p:clrMapOvr>
+</p:sld>
+</file>
+
+<file path=ppt/slides/slide12.xml><?xml version="1.0" encoding="utf-8"?>
+<p:sld xmlns:a="http://schemas.openxmlformats.org/drawingml/2006/main" xmlns:r="http://schemas.openxmlformats.org/officeDocument/2006/relationships" xmlns:mc="http://schemas.openxmlformats.org/markup-compatibility/2006" xmlns:mv="urn:schemas-microsoft-com:mac:vml" xmlns:p="http://schemas.openxmlformats.org/presentationml/2006/main" xmlns:c="http://schemas.openxmlformats.org/drawingml/2006/chart" xmlns:dgm="http://schemas.openxmlformats.org/drawingml/2006/diagram" xmlns:o="urn:schemas-microsoft-com:office:office" xmlns:v="urn:schemas-microsoft-com:vml" xmlns:pvml="urn:schemas-microsoft-com:office:powerpoint" xmlns:com="http://schemas.openxmlformats.org/drawingml/2006/compatibility" xmlns:p14="http://schemas.microsoft.com/office/powerpoint/2010/main" xmlns:p15="http://schemas.microsoft.com/office/powerpoint/2012/main" xmlns:ahyp="http://schemas.microsoft.com/office/drawing/2018/hyperlinkcolor">
+  <p:cSld>
+    <p:spTree>
+      <p:nvGrpSpPr>
+        <p:cNvPr id="203" name="Shape 203"/>
+        <p:cNvGrpSpPr/>
+        <p:nvPr/>
+      </p:nvGrpSpPr>
+      <p:grpSpPr>
+        <a:xfrm>
+          <a:off x="0" y="0"/>
+          <a:ext cx="0" cy="0"/>
+          <a:chOff x="0" y="0"/>
+          <a:chExt cx="0" cy="0"/>
+        </a:xfrm>
+      </p:grpSpPr>
+      <p:sp>
+        <p:nvSpPr>
+          <p:cNvPr id="204" name="Google Shape;204;p24"/>
           <p:cNvSpPr txBox="1"/>
           <p:nvPr>
             <p:ph type="title"/>
@@ -10964,7 +11655,7 @@
       </p:sp>
       <p:pic>
         <p:nvPicPr>
-          <p:cNvPr id="193" name="Google Shape;193;p22"/>
+          <p:cNvPr id="205" name="Google Shape;205;p24"/>
           <p:cNvPicPr preferRelativeResize="0"/>
           <p:nvPr/>
         </p:nvPicPr>
@@ -10998,12 +11689,12 @@
 </p:sld>
 </file>
 
-<file path=ppt/slides/slide11.xml><?xml version="1.0" encoding="utf-8"?>
+<file path=ppt/slides/slide13.xml><?xml version="1.0" encoding="utf-8"?>
 <p:sld xmlns:a="http://schemas.openxmlformats.org/drawingml/2006/main" xmlns:r="http://schemas.openxmlformats.org/officeDocument/2006/relationships" xmlns:mc="http://schemas.openxmlformats.org/markup-compatibility/2006" xmlns:mv="urn:schemas-microsoft-com:mac:vml" xmlns:p="http://schemas.openxmlformats.org/presentationml/2006/main" xmlns:c="http://schemas.openxmlformats.org/drawingml/2006/chart" xmlns:dgm="http://schemas.openxmlformats.org/drawingml/2006/diagram" xmlns:o="urn:schemas-microsoft-com:office:office" xmlns:v="urn:schemas-microsoft-com:vml" xmlns:pvml="urn:schemas-microsoft-com:office:powerpoint" xmlns:com="http://schemas.openxmlformats.org/drawingml/2006/compatibility" xmlns:p14="http://schemas.microsoft.com/office/powerpoint/2010/main" xmlns:p15="http://schemas.microsoft.com/office/powerpoint/2012/main" xmlns:ahyp="http://schemas.microsoft.com/office/drawing/2018/hyperlinkcolor">
   <p:cSld>
     <p:spTree>
       <p:nvGrpSpPr>
-        <p:cNvPr id="197" name="Shape 197"/>
+        <p:cNvPr id="209" name="Shape 209"/>
         <p:cNvGrpSpPr/>
         <p:nvPr/>
       </p:nvGrpSpPr>
@@ -11017,7 +11708,7 @@
       </p:grpSpPr>
       <p:sp>
         <p:nvSpPr>
-          <p:cNvPr id="198" name="Google Shape;198;p23"/>
+          <p:cNvPr id="210" name="Google Shape;210;p25"/>
           <p:cNvSpPr txBox="1"/>
           <p:nvPr>
             <p:ph type="title"/>
@@ -11057,7 +11748,7 @@
       </p:sp>
       <p:pic>
         <p:nvPicPr>
-          <p:cNvPr id="199" name="Google Shape;199;p23"/>
+          <p:cNvPr id="211" name="Google Shape;211;p25"/>
           <p:cNvPicPr preferRelativeResize="0"/>
           <p:nvPr/>
         </p:nvPicPr>
@@ -11085,7 +11776,7 @@
       </p:pic>
       <p:pic>
         <p:nvPicPr>
-          <p:cNvPr id="200" name="Google Shape;200;p23"/>
+          <p:cNvPr id="212" name="Google Shape;212;p25"/>
           <p:cNvPicPr preferRelativeResize="0"/>
           <p:nvPr/>
         </p:nvPicPr>
@@ -11113,7 +11804,7 @@
       </p:pic>
       <p:pic>
         <p:nvPicPr>
-          <p:cNvPr id="201" name="Google Shape;201;p23"/>
+          <p:cNvPr id="213" name="Google Shape;213;p25"/>
           <p:cNvPicPr preferRelativeResize="0"/>
           <p:nvPr/>
         </p:nvPicPr>
@@ -11147,12 +11838,12 @@
 </p:sld>
 </file>
 
-<file path=ppt/slides/slide12.xml><?xml version="1.0" encoding="utf-8"?>
+<file path=ppt/slides/slide14.xml><?xml version="1.0" encoding="utf-8"?>
 <p:sld xmlns:a="http://schemas.openxmlformats.org/drawingml/2006/main" xmlns:r="http://schemas.openxmlformats.org/officeDocument/2006/relationships" xmlns:mc="http://schemas.openxmlformats.org/markup-compatibility/2006" xmlns:mv="urn:schemas-microsoft-com:mac:vml" xmlns:p="http://schemas.openxmlformats.org/presentationml/2006/main" xmlns:c="http://schemas.openxmlformats.org/drawingml/2006/chart" xmlns:dgm="http://schemas.openxmlformats.org/drawingml/2006/diagram" xmlns:o="urn:schemas-microsoft-com:office:office" xmlns:v="urn:schemas-microsoft-com:vml" xmlns:pvml="urn:schemas-microsoft-com:office:powerpoint" xmlns:com="http://schemas.openxmlformats.org/drawingml/2006/compatibility" xmlns:p14="http://schemas.microsoft.com/office/powerpoint/2010/main" xmlns:p15="http://schemas.microsoft.com/office/powerpoint/2012/main" xmlns:ahyp="http://schemas.microsoft.com/office/drawing/2018/hyperlinkcolor">
   <p:cSld>
     <p:spTree>
       <p:nvGrpSpPr>
-        <p:cNvPr id="205" name="Shape 205"/>
+        <p:cNvPr id="217" name="Shape 217"/>
         <p:cNvGrpSpPr/>
         <p:nvPr/>
       </p:nvGrpSpPr>
@@ -11166,7 +11857,7 @@
       </p:grpSpPr>
       <p:sp>
         <p:nvSpPr>
-          <p:cNvPr id="206" name="Google Shape;206;p24"/>
+          <p:cNvPr id="218" name="Google Shape;218;p26"/>
           <p:cNvSpPr txBox="1"/>
           <p:nvPr>
             <p:ph type="title"/>
@@ -11210,7 +11901,7 @@
       </p:sp>
       <p:pic>
         <p:nvPicPr>
-          <p:cNvPr id="207" name="Google Shape;207;p24"/>
+          <p:cNvPr id="219" name="Google Shape;219;p26"/>
           <p:cNvPicPr preferRelativeResize="0"/>
           <p:nvPr/>
         </p:nvPicPr>
@@ -11238,7 +11929,7 @@
       </p:pic>
       <p:pic>
         <p:nvPicPr>
-          <p:cNvPr id="208" name="Google Shape;208;p24"/>
+          <p:cNvPr id="220" name="Google Shape;220;p26"/>
           <p:cNvPicPr preferRelativeResize="0"/>
           <p:nvPr/>
         </p:nvPicPr>
@@ -11266,7 +11957,7 @@
       </p:pic>
       <p:pic>
         <p:nvPicPr>
-          <p:cNvPr id="209" name="Google Shape;209;p24"/>
+          <p:cNvPr id="221" name="Google Shape;221;p26"/>
           <p:cNvPicPr preferRelativeResize="0"/>
           <p:nvPr/>
         </p:nvPicPr>
@@ -11300,12 +11991,12 @@
 </p:sld>
 </file>
 
-<file path=ppt/slides/slide13.xml><?xml version="1.0" encoding="utf-8"?>
+<file path=ppt/slides/slide15.xml><?xml version="1.0" encoding="utf-8"?>
 <p:sld xmlns:a="http://schemas.openxmlformats.org/drawingml/2006/main" xmlns:r="http://schemas.openxmlformats.org/officeDocument/2006/relationships" xmlns:mc="http://schemas.openxmlformats.org/markup-compatibility/2006" xmlns:mv="urn:schemas-microsoft-com:mac:vml" xmlns:p="http://schemas.openxmlformats.org/presentationml/2006/main" xmlns:c="http://schemas.openxmlformats.org/drawingml/2006/chart" xmlns:dgm="http://schemas.openxmlformats.org/drawingml/2006/diagram" xmlns:o="urn:schemas-microsoft-com:office:office" xmlns:v="urn:schemas-microsoft-com:vml" xmlns:pvml="urn:schemas-microsoft-com:office:powerpoint" xmlns:com="http://schemas.openxmlformats.org/drawingml/2006/compatibility" xmlns:p14="http://schemas.microsoft.com/office/powerpoint/2010/main" xmlns:p15="http://schemas.microsoft.com/office/powerpoint/2012/main" xmlns:ahyp="http://schemas.microsoft.com/office/drawing/2018/hyperlinkcolor">
   <p:cSld>
     <p:spTree>
       <p:nvGrpSpPr>
-        <p:cNvPr id="213" name="Shape 213"/>
+        <p:cNvPr id="225" name="Shape 225"/>
         <p:cNvGrpSpPr/>
         <p:nvPr/>
       </p:nvGrpSpPr>
@@ -11319,7 +12010,7 @@
       </p:grpSpPr>
       <p:sp>
         <p:nvSpPr>
-          <p:cNvPr id="214" name="Google Shape;214;p25"/>
+          <p:cNvPr id="226" name="Google Shape;226;p27"/>
           <p:cNvSpPr txBox="1"/>
           <p:nvPr>
             <p:ph type="title"/>
@@ -11367,7 +12058,7 @@
       </p:sp>
       <p:pic>
         <p:nvPicPr>
-          <p:cNvPr id="215" name="Google Shape;215;p25"/>
+          <p:cNvPr id="227" name="Google Shape;227;p27"/>
           <p:cNvPicPr preferRelativeResize="0"/>
           <p:nvPr/>
         </p:nvPicPr>
@@ -11395,7 +12086,7 @@
       </p:pic>
       <p:pic>
         <p:nvPicPr>
-          <p:cNvPr id="216" name="Google Shape;216;p25"/>
+          <p:cNvPr id="228" name="Google Shape;228;p27"/>
           <p:cNvPicPr preferRelativeResize="0"/>
           <p:nvPr/>
         </p:nvPicPr>
@@ -11423,7 +12114,7 @@
       </p:pic>
       <p:pic>
         <p:nvPicPr>
-          <p:cNvPr id="217" name="Google Shape;217;p25"/>
+          <p:cNvPr id="229" name="Google Shape;229;p27"/>
           <p:cNvPicPr preferRelativeResize="0"/>
           <p:nvPr/>
         </p:nvPicPr>
@@ -11457,12 +12148,12 @@
 </p:sld>
 </file>
 
-<file path=ppt/slides/slide14.xml><?xml version="1.0" encoding="utf-8"?>
+<file path=ppt/slides/slide16.xml><?xml version="1.0" encoding="utf-8"?>
 <p:sld xmlns:a="http://schemas.openxmlformats.org/drawingml/2006/main" xmlns:r="http://schemas.openxmlformats.org/officeDocument/2006/relationships" xmlns:mc="http://schemas.openxmlformats.org/markup-compatibility/2006" xmlns:mv="urn:schemas-microsoft-com:mac:vml" xmlns:p="http://schemas.openxmlformats.org/presentationml/2006/main" xmlns:c="http://schemas.openxmlformats.org/drawingml/2006/chart" xmlns:dgm="http://schemas.openxmlformats.org/drawingml/2006/diagram" xmlns:o="urn:schemas-microsoft-com:office:office" xmlns:v="urn:schemas-microsoft-com:vml" xmlns:pvml="urn:schemas-microsoft-com:office:powerpoint" xmlns:com="http://schemas.openxmlformats.org/drawingml/2006/compatibility" xmlns:p14="http://schemas.microsoft.com/office/powerpoint/2010/main" xmlns:p15="http://schemas.microsoft.com/office/powerpoint/2012/main" xmlns:ahyp="http://schemas.microsoft.com/office/drawing/2018/hyperlinkcolor">
   <p:cSld>
     <p:spTree>
       <p:nvGrpSpPr>
-        <p:cNvPr id="221" name="Shape 221"/>
+        <p:cNvPr id="233" name="Shape 233"/>
         <p:cNvGrpSpPr/>
         <p:nvPr/>
       </p:nvGrpSpPr>
@@ -11476,7 +12167,7 @@
       </p:grpSpPr>
       <p:sp>
         <p:nvSpPr>
-          <p:cNvPr id="222" name="Google Shape;222;p26"/>
+          <p:cNvPr id="234" name="Google Shape;234;p28"/>
           <p:cNvSpPr txBox="1"/>
           <p:nvPr>
             <p:ph type="title"/>
@@ -11520,7 +12211,7 @@
       </p:sp>
       <p:sp>
         <p:nvSpPr>
-          <p:cNvPr id="223" name="Google Shape;223;p26"/>
+          <p:cNvPr id="235" name="Google Shape;235;p28"/>
           <p:cNvSpPr txBox="1"/>
           <p:nvPr>
             <p:ph idx="1" type="body"/>
@@ -11646,7 +12337,7 @@
       </p:sp>
       <p:pic>
         <p:nvPicPr>
-          <p:cNvPr id="224" name="Google Shape;224;p26"/>
+          <p:cNvPr id="236" name="Google Shape;236;p28"/>
           <p:cNvPicPr preferRelativeResize="0"/>
           <p:nvPr/>
         </p:nvPicPr>
@@ -11680,12 +12371,12 @@
 </p:sld>
 </file>
 
-<file path=ppt/slides/slide15.xml><?xml version="1.0" encoding="utf-8"?>
+<file path=ppt/slides/slide17.xml><?xml version="1.0" encoding="utf-8"?>
 <p:sld xmlns:a="http://schemas.openxmlformats.org/drawingml/2006/main" xmlns:r="http://schemas.openxmlformats.org/officeDocument/2006/relationships" xmlns:mc="http://schemas.openxmlformats.org/markup-compatibility/2006" xmlns:mv="urn:schemas-microsoft-com:mac:vml" xmlns:p="http://schemas.openxmlformats.org/presentationml/2006/main" xmlns:c="http://schemas.openxmlformats.org/drawingml/2006/chart" xmlns:dgm="http://schemas.openxmlformats.org/drawingml/2006/diagram" xmlns:o="urn:schemas-microsoft-com:office:office" xmlns:v="urn:schemas-microsoft-com:vml" xmlns:pvml="urn:schemas-microsoft-com:office:powerpoint" xmlns:com="http://schemas.openxmlformats.org/drawingml/2006/compatibility" xmlns:p14="http://schemas.microsoft.com/office/powerpoint/2010/main" xmlns:p15="http://schemas.microsoft.com/office/powerpoint/2012/main" xmlns:ahyp="http://schemas.microsoft.com/office/drawing/2018/hyperlinkcolor">
   <p:cSld>
     <p:spTree>
       <p:nvGrpSpPr>
-        <p:cNvPr id="228" name="Shape 228"/>
+        <p:cNvPr id="240" name="Shape 240"/>
         <p:cNvGrpSpPr/>
         <p:nvPr/>
       </p:nvGrpSpPr>
@@ -11699,7 +12390,7 @@
       </p:grpSpPr>
       <p:sp>
         <p:nvSpPr>
-          <p:cNvPr id="229" name="Google Shape;229;p27"/>
+          <p:cNvPr id="241" name="Google Shape;241;p29"/>
           <p:cNvSpPr txBox="1"/>
           <p:nvPr>
             <p:ph type="title"/>
@@ -11739,7 +12430,7 @@
       </p:sp>
       <p:pic>
         <p:nvPicPr>
-          <p:cNvPr id="230" name="Google Shape;230;p27"/>
+          <p:cNvPr id="242" name="Google Shape;242;p29"/>
           <p:cNvPicPr preferRelativeResize="0"/>
           <p:nvPr/>
         </p:nvPicPr>
@@ -11773,12 +12464,12 @@
 </p:sld>
 </file>
 
-<file path=ppt/slides/slide16.xml><?xml version="1.0" encoding="utf-8"?>
+<file path=ppt/slides/slide18.xml><?xml version="1.0" encoding="utf-8"?>
 <p:sld xmlns:a="http://schemas.openxmlformats.org/drawingml/2006/main" xmlns:r="http://schemas.openxmlformats.org/officeDocument/2006/relationships" xmlns:mc="http://schemas.openxmlformats.org/markup-compatibility/2006" xmlns:mv="urn:schemas-microsoft-com:mac:vml" xmlns:p="http://schemas.openxmlformats.org/presentationml/2006/main" xmlns:c="http://schemas.openxmlformats.org/drawingml/2006/chart" xmlns:dgm="http://schemas.openxmlformats.org/drawingml/2006/diagram" xmlns:o="urn:schemas-microsoft-com:office:office" xmlns:v="urn:schemas-microsoft-com:vml" xmlns:pvml="urn:schemas-microsoft-com:office:powerpoint" xmlns:com="http://schemas.openxmlformats.org/drawingml/2006/compatibility" xmlns:p14="http://schemas.microsoft.com/office/powerpoint/2010/main" xmlns:p15="http://schemas.microsoft.com/office/powerpoint/2012/main" xmlns:ahyp="http://schemas.microsoft.com/office/drawing/2018/hyperlinkcolor">
   <p:cSld>
     <p:spTree>
       <p:nvGrpSpPr>
-        <p:cNvPr id="234" name="Shape 234"/>
+        <p:cNvPr id="246" name="Shape 246"/>
         <p:cNvGrpSpPr/>
         <p:nvPr/>
       </p:nvGrpSpPr>
@@ -11792,7 +12483,7 @@
       </p:grpSpPr>
       <p:sp>
         <p:nvSpPr>
-          <p:cNvPr id="235" name="Google Shape;235;p28"/>
+          <p:cNvPr id="247" name="Google Shape;247;p30"/>
           <p:cNvSpPr txBox="1"/>
           <p:nvPr>
             <p:ph type="title"/>
@@ -11832,7 +12523,7 @@
       </p:sp>
       <p:pic>
         <p:nvPicPr>
-          <p:cNvPr id="236" name="Google Shape;236;p28"/>
+          <p:cNvPr id="248" name="Google Shape;248;p30"/>
           <p:cNvPicPr preferRelativeResize="0"/>
           <p:nvPr/>
         </p:nvPicPr>
@@ -11860,7 +12551,7 @@
       </p:pic>
       <p:sp>
         <p:nvSpPr>
-          <p:cNvPr id="237" name="Google Shape;237;p28"/>
+          <p:cNvPr id="249" name="Google Shape;249;p30"/>
           <p:cNvSpPr txBox="1"/>
           <p:nvPr/>
         </p:nvSpPr>
@@ -11961,428 +12652,6 @@
               <a:cs typeface="Lato"/>
               <a:sym typeface="Lato"/>
             </a:endParaRPr>
-          </a:p>
-        </p:txBody>
-      </p:sp>
-    </p:spTree>
-  </p:cSld>
-  <p:clrMapOvr>
-    <a:masterClrMapping/>
-  </p:clrMapOvr>
-</p:sld>
-</file>
-
-<file path=ppt/slides/slide17.xml><?xml version="1.0" encoding="utf-8"?>
-<p:sld xmlns:a="http://schemas.openxmlformats.org/drawingml/2006/main" xmlns:r="http://schemas.openxmlformats.org/officeDocument/2006/relationships" xmlns:mc="http://schemas.openxmlformats.org/markup-compatibility/2006" xmlns:mv="urn:schemas-microsoft-com:mac:vml" xmlns:p="http://schemas.openxmlformats.org/presentationml/2006/main" xmlns:c="http://schemas.openxmlformats.org/drawingml/2006/chart" xmlns:dgm="http://schemas.openxmlformats.org/drawingml/2006/diagram" xmlns:o="urn:schemas-microsoft-com:office:office" xmlns:v="urn:schemas-microsoft-com:vml" xmlns:pvml="urn:schemas-microsoft-com:office:powerpoint" xmlns:com="http://schemas.openxmlformats.org/drawingml/2006/compatibility" xmlns:p14="http://schemas.microsoft.com/office/powerpoint/2010/main" xmlns:p15="http://schemas.microsoft.com/office/powerpoint/2012/main" xmlns:ahyp="http://schemas.microsoft.com/office/drawing/2018/hyperlinkcolor">
-  <p:cSld>
-    <p:spTree>
-      <p:nvGrpSpPr>
-        <p:cNvPr id="241" name="Shape 241"/>
-        <p:cNvGrpSpPr/>
-        <p:nvPr/>
-      </p:nvGrpSpPr>
-      <p:grpSpPr>
-        <a:xfrm>
-          <a:off x="0" y="0"/>
-          <a:ext cx="0" cy="0"/>
-          <a:chOff x="0" y="0"/>
-          <a:chExt cx="0" cy="0"/>
-        </a:xfrm>
-      </p:grpSpPr>
-      <p:sp>
-        <p:nvSpPr>
-          <p:cNvPr id="242" name="Google Shape;242;p29"/>
-          <p:cNvSpPr txBox="1"/>
-          <p:nvPr>
-            <p:ph type="title"/>
-          </p:nvPr>
-        </p:nvSpPr>
-        <p:spPr>
-          <a:xfrm>
-            <a:off x="1297500" y="393750"/>
-            <a:ext cx="7038900" cy="914100"/>
-          </a:xfrm>
-          <a:prstGeom prst="rect">
-            <a:avLst/>
-          </a:prstGeom>
-        </p:spPr>
-        <p:txBody>
-          <a:bodyPr anchorCtr="0" anchor="t" bIns="91425" lIns="91425" spcFirstLastPara="1" rIns="91425" wrap="square" tIns="91425">
-            <a:normAutofit/>
-          </a:bodyPr>
-          <a:lstStyle/>
-          <a:p>
-            <a:pPr indent="0" lvl="0" marL="0" rtl="0" algn="l">
-              <a:spcBef>
-                <a:spcPts val="0"/>
-              </a:spcBef>
-              <a:spcAft>
-                <a:spcPts val="0"/>
-              </a:spcAft>
-              <a:buNone/>
-            </a:pPr>
-            <a:r>
-              <a:rPr lang="en" sz="3000"/>
-              <a:t>Conclusion</a:t>
-            </a:r>
-            <a:endParaRPr sz="3000"/>
-          </a:p>
-        </p:txBody>
-      </p:sp>
-      <p:sp>
-        <p:nvSpPr>
-          <p:cNvPr id="243" name="Google Shape;243;p29"/>
-          <p:cNvSpPr txBox="1"/>
-          <p:nvPr>
-            <p:ph idx="1" type="body"/>
-          </p:nvPr>
-        </p:nvSpPr>
-        <p:spPr>
-          <a:xfrm>
-            <a:off x="1297500" y="1273775"/>
-            <a:ext cx="7038900" cy="3204900"/>
-          </a:xfrm>
-          <a:prstGeom prst="rect">
-            <a:avLst/>
-          </a:prstGeom>
-        </p:spPr>
-        <p:txBody>
-          <a:bodyPr anchorCtr="0" anchor="t" bIns="91425" lIns="91425" spcFirstLastPara="1" rIns="91425" wrap="square" tIns="91425">
-            <a:normAutofit/>
-          </a:bodyPr>
-          <a:lstStyle/>
-          <a:p>
-            <a:pPr indent="-342900" lvl="0" marL="457200" rtl="0" algn="l">
-              <a:spcBef>
-                <a:spcPts val="0"/>
-              </a:spcBef>
-              <a:spcAft>
-                <a:spcPts val="0"/>
-              </a:spcAft>
-              <a:buSzPts val="1800"/>
-              <a:buChar char="●"/>
-            </a:pPr>
-            <a:r>
-              <a:rPr lang="en" sz="1800"/>
-              <a:t>4 models passed evaluation (3 laps without crashing)</a:t>
-            </a:r>
-            <a:endParaRPr sz="1800"/>
-          </a:p>
-          <a:p>
-            <a:pPr indent="-342900" lvl="1" marL="914400" rtl="0" algn="l">
-              <a:spcBef>
-                <a:spcPts val="0"/>
-              </a:spcBef>
-              <a:spcAft>
-                <a:spcPts val="0"/>
-              </a:spcAft>
-              <a:buSzPts val="1800"/>
-              <a:buChar char="○"/>
-            </a:pPr>
-            <a:r>
-              <a:rPr lang="en" sz="1800"/>
-              <a:t>2 in time trials</a:t>
-            </a:r>
-            <a:endParaRPr sz="1800"/>
-          </a:p>
-          <a:p>
-            <a:pPr indent="-342900" lvl="1" marL="914400" rtl="0" algn="l">
-              <a:spcBef>
-                <a:spcPts val="0"/>
-              </a:spcBef>
-              <a:spcAft>
-                <a:spcPts val="0"/>
-              </a:spcAft>
-              <a:buSzPts val="1800"/>
-              <a:buChar char="○"/>
-            </a:pPr>
-            <a:r>
-              <a:rPr lang="en" sz="1800"/>
-              <a:t>2 in object avoidance with 2 fixed objects</a:t>
-            </a:r>
-            <a:endParaRPr sz="1800"/>
-          </a:p>
-          <a:p>
-            <a:pPr indent="-342900" lvl="0" marL="457200" rtl="0" algn="l">
-              <a:spcBef>
-                <a:spcPts val="0"/>
-              </a:spcBef>
-              <a:spcAft>
-                <a:spcPts val="0"/>
-              </a:spcAft>
-              <a:buSzPts val="1800"/>
-              <a:buChar char="●"/>
-            </a:pPr>
-            <a:r>
-              <a:rPr lang="en" sz="1800"/>
-              <a:t>Only 29% of project’s budget was used</a:t>
-            </a:r>
-            <a:endParaRPr sz="1800"/>
-          </a:p>
-          <a:p>
-            <a:pPr indent="-342900" lvl="0" marL="457200" rtl="0" algn="l">
-              <a:spcBef>
-                <a:spcPts val="0"/>
-              </a:spcBef>
-              <a:spcAft>
-                <a:spcPts val="0"/>
-              </a:spcAft>
-              <a:buSzPts val="1800"/>
-              <a:buChar char="●"/>
-            </a:pPr>
-            <a:r>
-              <a:rPr lang="en" sz="1800"/>
-              <a:t>Important Setup</a:t>
-            </a:r>
-            <a:endParaRPr sz="1800"/>
-          </a:p>
-          <a:p>
-            <a:pPr indent="-342900" lvl="1" marL="914400" rtl="0" algn="l">
-              <a:spcBef>
-                <a:spcPts val="0"/>
-              </a:spcBef>
-              <a:spcAft>
-                <a:spcPts val="0"/>
-              </a:spcAft>
-              <a:buSzPts val="1800"/>
-              <a:buChar char="○"/>
-            </a:pPr>
-            <a:r>
-              <a:rPr lang="en" sz="1800"/>
-              <a:t>Discount factor for hyperparameters</a:t>
-            </a:r>
-            <a:endParaRPr sz="1800"/>
-          </a:p>
-          <a:p>
-            <a:pPr indent="-342900" lvl="1" marL="914400" rtl="0" algn="l">
-              <a:spcBef>
-                <a:spcPts val="0"/>
-              </a:spcBef>
-              <a:spcAft>
-                <a:spcPts val="0"/>
-              </a:spcAft>
-              <a:buSzPts val="1800"/>
-              <a:buChar char="○"/>
-            </a:pPr>
-            <a:r>
-              <a:rPr lang="en" sz="1800"/>
-              <a:t>Stereo camera for sensors</a:t>
-            </a:r>
-            <a:endParaRPr sz="1800"/>
-          </a:p>
-          <a:p>
-            <a:pPr indent="-342900" lvl="1" marL="914400" rtl="0" algn="l">
-              <a:spcBef>
-                <a:spcPts val="0"/>
-              </a:spcBef>
-              <a:spcAft>
-                <a:spcPts val="0"/>
-              </a:spcAft>
-              <a:buSzPts val="1800"/>
-              <a:buChar char="○"/>
-            </a:pPr>
-            <a:r>
-              <a:rPr lang="en" sz="1800"/>
-              <a:t>Waypoints and objects_location for parameters</a:t>
-            </a:r>
-            <a:endParaRPr sz="1800"/>
-          </a:p>
-          <a:p>
-            <a:pPr indent="0" lvl="0" marL="0" rtl="0" algn="l">
-              <a:spcBef>
-                <a:spcPts val="1200"/>
-              </a:spcBef>
-              <a:spcAft>
-                <a:spcPts val="1200"/>
-              </a:spcAft>
-              <a:buNone/>
-            </a:pPr>
-            <a:r>
-              <a:t/>
-            </a:r>
-            <a:endParaRPr sz="1800"/>
-          </a:p>
-        </p:txBody>
-      </p:sp>
-    </p:spTree>
-  </p:cSld>
-  <p:clrMapOvr>
-    <a:masterClrMapping/>
-  </p:clrMapOvr>
-</p:sld>
-</file>
-
-<file path=ppt/slides/slide18.xml><?xml version="1.0" encoding="utf-8"?>
-<p:sld xmlns:a="http://schemas.openxmlformats.org/drawingml/2006/main" xmlns:r="http://schemas.openxmlformats.org/officeDocument/2006/relationships" xmlns:mc="http://schemas.openxmlformats.org/markup-compatibility/2006" xmlns:mv="urn:schemas-microsoft-com:mac:vml" xmlns:p="http://schemas.openxmlformats.org/presentationml/2006/main" xmlns:c="http://schemas.openxmlformats.org/drawingml/2006/chart" xmlns:dgm="http://schemas.openxmlformats.org/drawingml/2006/diagram" xmlns:o="urn:schemas-microsoft-com:office:office" xmlns:v="urn:schemas-microsoft-com:vml" xmlns:pvml="urn:schemas-microsoft-com:office:powerpoint" xmlns:com="http://schemas.openxmlformats.org/drawingml/2006/compatibility" xmlns:p14="http://schemas.microsoft.com/office/powerpoint/2010/main" xmlns:p15="http://schemas.microsoft.com/office/powerpoint/2012/main" xmlns:ahyp="http://schemas.microsoft.com/office/drawing/2018/hyperlinkcolor">
-  <p:cSld>
-    <p:spTree>
-      <p:nvGrpSpPr>
-        <p:cNvPr id="247" name="Shape 247"/>
-        <p:cNvGrpSpPr/>
-        <p:nvPr/>
-      </p:nvGrpSpPr>
-      <p:grpSpPr>
-        <a:xfrm>
-          <a:off x="0" y="0"/>
-          <a:ext cx="0" cy="0"/>
-          <a:chOff x="0" y="0"/>
-          <a:chExt cx="0" cy="0"/>
-        </a:xfrm>
-      </p:grpSpPr>
-      <p:sp>
-        <p:nvSpPr>
-          <p:cNvPr id="248" name="Google Shape;248;p30"/>
-          <p:cNvSpPr txBox="1"/>
-          <p:nvPr>
-            <p:ph type="title"/>
-          </p:nvPr>
-        </p:nvSpPr>
-        <p:spPr>
-          <a:xfrm>
-            <a:off x="1297500" y="393750"/>
-            <a:ext cx="7038900" cy="914100"/>
-          </a:xfrm>
-          <a:prstGeom prst="rect">
-            <a:avLst/>
-          </a:prstGeom>
-        </p:spPr>
-        <p:txBody>
-          <a:bodyPr anchorCtr="0" anchor="t" bIns="91425" lIns="91425" spcFirstLastPara="1" rIns="91425" wrap="square" tIns="91425">
-            <a:normAutofit/>
-          </a:bodyPr>
-          <a:lstStyle/>
-          <a:p>
-            <a:pPr indent="0" lvl="0" marL="0" rtl="0" algn="l">
-              <a:spcBef>
-                <a:spcPts val="0"/>
-              </a:spcBef>
-              <a:spcAft>
-                <a:spcPts val="0"/>
-              </a:spcAft>
-              <a:buNone/>
-            </a:pPr>
-            <a:r>
-              <a:rPr lang="en" sz="3000"/>
-              <a:t>Next Steps</a:t>
-            </a:r>
-            <a:endParaRPr sz="3000"/>
-          </a:p>
-        </p:txBody>
-      </p:sp>
-      <p:sp>
-        <p:nvSpPr>
-          <p:cNvPr id="249" name="Google Shape;249;p30"/>
-          <p:cNvSpPr txBox="1"/>
-          <p:nvPr>
-            <p:ph idx="1" type="body"/>
-          </p:nvPr>
-        </p:nvSpPr>
-        <p:spPr>
-          <a:xfrm>
-            <a:off x="1297500" y="1567550"/>
-            <a:ext cx="7038900" cy="2911200"/>
-          </a:xfrm>
-          <a:prstGeom prst="rect">
-            <a:avLst/>
-          </a:prstGeom>
-        </p:spPr>
-        <p:txBody>
-          <a:bodyPr anchorCtr="0" anchor="t" bIns="91425" lIns="91425" spcFirstLastPara="1" rIns="91425" wrap="square" tIns="91425">
-            <a:normAutofit/>
-          </a:bodyPr>
-          <a:lstStyle/>
-          <a:p>
-            <a:pPr indent="-342900" lvl="0" marL="457200" rtl="0" algn="l">
-              <a:spcBef>
-                <a:spcPts val="0"/>
-              </a:spcBef>
-              <a:spcAft>
-                <a:spcPts val="0"/>
-              </a:spcAft>
-              <a:buSzPts val="1800"/>
-              <a:buChar char="-"/>
-            </a:pPr>
-            <a:r>
-              <a:rPr lang="en" sz="1800"/>
-              <a:t>Setup environments with lower training costs</a:t>
-            </a:r>
-            <a:endParaRPr sz="1800"/>
-          </a:p>
-          <a:p>
-            <a:pPr indent="-342900" lvl="1" marL="914400" rtl="0" algn="l">
-              <a:spcBef>
-                <a:spcPts val="0"/>
-              </a:spcBef>
-              <a:spcAft>
-                <a:spcPts val="0"/>
-              </a:spcAft>
-              <a:buSzPts val="1800"/>
-              <a:buChar char="-"/>
-            </a:pPr>
-            <a:r>
-              <a:rPr lang="en" sz="1800"/>
-              <a:t>Local setup</a:t>
-            </a:r>
-            <a:endParaRPr sz="1800"/>
-          </a:p>
-          <a:p>
-            <a:pPr indent="-342900" lvl="1" marL="914400" rtl="0" algn="l">
-              <a:spcBef>
-                <a:spcPts val="0"/>
-              </a:spcBef>
-              <a:spcAft>
-                <a:spcPts val="0"/>
-              </a:spcAft>
-              <a:buSzPts val="1800"/>
-              <a:buChar char="-"/>
-            </a:pPr>
-            <a:r>
-              <a:rPr lang="en" sz="1800"/>
-              <a:t>Using individual AWS services and spot pricing</a:t>
-            </a:r>
-            <a:endParaRPr sz="1800"/>
-          </a:p>
-          <a:p>
-            <a:pPr indent="-342900" lvl="0" marL="457200" rtl="0" algn="l">
-              <a:spcBef>
-                <a:spcPts val="0"/>
-              </a:spcBef>
-              <a:spcAft>
-                <a:spcPts val="0"/>
-              </a:spcAft>
-              <a:buSzPts val="1800"/>
-              <a:buChar char="-"/>
-            </a:pPr>
-            <a:r>
-              <a:rPr lang="en" sz="1800"/>
-              <a:t>Create optimal waypoints for left and right lanes</a:t>
-            </a:r>
-            <a:endParaRPr sz="1800"/>
-          </a:p>
-          <a:p>
-            <a:pPr indent="-342900" lvl="0" marL="457200" rtl="0" algn="l">
-              <a:spcBef>
-                <a:spcPts val="0"/>
-              </a:spcBef>
-              <a:spcAft>
-                <a:spcPts val="0"/>
-              </a:spcAft>
-              <a:buSzPts val="1800"/>
-              <a:buChar char="-"/>
-            </a:pPr>
-            <a:r>
-              <a:rPr lang="en" sz="1800"/>
-              <a:t>Evaluate </a:t>
-            </a:r>
-            <a:r>
-              <a:rPr lang="en" sz="1800"/>
-              <a:t>more scenarios</a:t>
-            </a:r>
-            <a:r>
-              <a:rPr lang="en" sz="1800"/>
-              <a:t> after longer training times</a:t>
-            </a:r>
-            <a:endParaRPr sz="1800"/>
           </a:p>
         </p:txBody>
       </p:sp>
@@ -12445,7 +12714,7 @@
             </a:pPr>
             <a:r>
               <a:rPr lang="en" sz="3000"/>
-              <a:t>Questions?</a:t>
+              <a:t>Conclusion</a:t>
             </a:r>
             <a:endParaRPr sz="3000"/>
           </a:p>
@@ -12461,8 +12730,8 @@
         </p:nvSpPr>
         <p:spPr>
           <a:xfrm>
-            <a:off x="1297500" y="1567550"/>
-            <a:ext cx="7038900" cy="2911200"/>
+            <a:off x="1297500" y="1273775"/>
+            <a:ext cx="7038900" cy="3204900"/>
           </a:xfrm>
           <a:prstGeom prst="rect">
             <a:avLst/>
@@ -12474,18 +12743,138 @@
           </a:bodyPr>
           <a:lstStyle/>
           <a:p>
-            <a:pPr indent="0" lvl="0" marL="0" rtl="0" algn="l">
-              <a:spcBef>
-                <a:spcPts val="0"/>
-              </a:spcBef>
-              <a:spcAft>
-                <a:spcPts val="0"/>
-              </a:spcAft>
-              <a:buNone/>
+            <a:pPr indent="-342900" lvl="0" marL="457200" rtl="0" algn="l">
+              <a:spcBef>
+                <a:spcPts val="0"/>
+              </a:spcBef>
+              <a:spcAft>
+                <a:spcPts val="0"/>
+              </a:spcAft>
+              <a:buSzPts val="1800"/>
+              <a:buChar char="●"/>
             </a:pPr>
             <a:r>
               <a:rPr lang="en" sz="1800"/>
-              <a:t>References:</a:t>
+              <a:t>4 models passed evaluation (3 laps without crashing)</a:t>
+            </a:r>
+            <a:endParaRPr sz="1800"/>
+          </a:p>
+          <a:p>
+            <a:pPr indent="-342900" lvl="1" marL="914400" rtl="0" algn="l">
+              <a:spcBef>
+                <a:spcPts val="0"/>
+              </a:spcBef>
+              <a:spcAft>
+                <a:spcPts val="0"/>
+              </a:spcAft>
+              <a:buSzPts val="1800"/>
+              <a:buChar char="○"/>
+            </a:pPr>
+            <a:r>
+              <a:rPr lang="en" sz="1800"/>
+              <a:t>2 in time trials</a:t>
+            </a:r>
+            <a:endParaRPr sz="1800"/>
+          </a:p>
+          <a:p>
+            <a:pPr indent="-342900" lvl="1" marL="914400" rtl="0" algn="l">
+              <a:spcBef>
+                <a:spcPts val="0"/>
+              </a:spcBef>
+              <a:spcAft>
+                <a:spcPts val="0"/>
+              </a:spcAft>
+              <a:buSzPts val="1800"/>
+              <a:buChar char="○"/>
+            </a:pPr>
+            <a:r>
+              <a:rPr lang="en" sz="1800"/>
+              <a:t>2 in object avoidance with 2 fixed objects</a:t>
+            </a:r>
+            <a:endParaRPr sz="1800"/>
+          </a:p>
+          <a:p>
+            <a:pPr indent="-342900" lvl="0" marL="457200" rtl="0" algn="l">
+              <a:spcBef>
+                <a:spcPts val="0"/>
+              </a:spcBef>
+              <a:spcAft>
+                <a:spcPts val="0"/>
+              </a:spcAft>
+              <a:buSzPts val="1800"/>
+              <a:buChar char="●"/>
+            </a:pPr>
+            <a:r>
+              <a:rPr lang="en" sz="1800"/>
+              <a:t>Only 29% of project’s budget was used</a:t>
+            </a:r>
+            <a:endParaRPr sz="1800"/>
+          </a:p>
+          <a:p>
+            <a:pPr indent="-342900" lvl="0" marL="457200" rtl="0" algn="l">
+              <a:spcBef>
+                <a:spcPts val="0"/>
+              </a:spcBef>
+              <a:spcAft>
+                <a:spcPts val="0"/>
+              </a:spcAft>
+              <a:buSzPts val="1800"/>
+              <a:buChar char="●"/>
+            </a:pPr>
+            <a:r>
+              <a:rPr lang="en" sz="1800"/>
+              <a:t>Important Setup</a:t>
+            </a:r>
+            <a:endParaRPr sz="1800"/>
+          </a:p>
+          <a:p>
+            <a:pPr indent="-342900" lvl="1" marL="914400" rtl="0" algn="l">
+              <a:spcBef>
+                <a:spcPts val="0"/>
+              </a:spcBef>
+              <a:spcAft>
+                <a:spcPts val="0"/>
+              </a:spcAft>
+              <a:buSzPts val="1800"/>
+              <a:buChar char="○"/>
+            </a:pPr>
+            <a:r>
+              <a:rPr lang="en" sz="1800"/>
+              <a:t>Discount factor for hyperparameters</a:t>
+            </a:r>
+            <a:endParaRPr sz="1800"/>
+          </a:p>
+          <a:p>
+            <a:pPr indent="-342900" lvl="1" marL="914400" rtl="0" algn="l">
+              <a:spcBef>
+                <a:spcPts val="0"/>
+              </a:spcBef>
+              <a:spcAft>
+                <a:spcPts val="0"/>
+              </a:spcAft>
+              <a:buSzPts val="1800"/>
+              <a:buChar char="○"/>
+            </a:pPr>
+            <a:r>
+              <a:rPr lang="en" sz="1800"/>
+              <a:t>Stereo camera for sensors</a:t>
+            </a:r>
+            <a:endParaRPr sz="1800"/>
+          </a:p>
+          <a:p>
+            <a:pPr indent="-342900" lvl="1" marL="914400" rtl="0" algn="l">
+              <a:spcBef>
+                <a:spcPts val="0"/>
+              </a:spcBef>
+              <a:spcAft>
+                <a:spcPts val="0"/>
+              </a:spcAft>
+              <a:buSzPts val="1800"/>
+              <a:buChar char="○"/>
+            </a:pPr>
+            <a:r>
+              <a:rPr lang="en" sz="1800"/>
+              <a:t>Waypoints and objects_location for parameters</a:t>
             </a:r>
             <a:endParaRPr sz="1800"/>
           </a:p>
@@ -12495,86 +12884,14 @@
                 <a:spcPts val="1200"/>
               </a:spcBef>
               <a:spcAft>
-                <a:spcPts val="0"/>
+                <a:spcPts val="1200"/>
               </a:spcAft>
               <a:buNone/>
             </a:pPr>
             <a:r>
-              <a:rPr lang="en" sz="1400"/>
-              <a:t>AWS (2021). </a:t>
+              <a:t/>
             </a:r>
-            <a:r>
-              <a:rPr lang="en" sz="1400" u="sng">
-                <a:solidFill>
-                  <a:schemeClr val="hlink"/>
-                </a:solidFill>
-                <a:hlinkClick r:id="rId3"/>
-              </a:rPr>
-              <a:t>AWS DeepRacer Developer Guide</a:t>
-            </a:r>
-            <a:r>
-              <a:rPr lang="en" sz="1400"/>
-              <a:t>.</a:t>
-            </a:r>
-            <a:endParaRPr sz="1400"/>
-          </a:p>
-          <a:p>
-            <a:pPr indent="0" lvl="0" marL="0" rtl="0" algn="l">
-              <a:spcBef>
-                <a:spcPts val="1200"/>
-              </a:spcBef>
-              <a:spcAft>
-                <a:spcPts val="0"/>
-              </a:spcAft>
-              <a:buNone/>
-            </a:pPr>
-            <a:r>
-              <a:rPr lang="en" sz="1400"/>
-              <a:t>AWS (2021). </a:t>
-            </a:r>
-            <a:r>
-              <a:rPr lang="en" sz="1400" u="sng">
-                <a:solidFill>
-                  <a:schemeClr val="hlink"/>
-                </a:solidFill>
-                <a:hlinkClick r:id="rId4"/>
-              </a:rPr>
-              <a:t>Input Parameters of the AWS DeepRacer Reward Function</a:t>
-            </a:r>
-            <a:r>
-              <a:rPr lang="en" sz="1400"/>
-              <a:t>.</a:t>
-            </a:r>
-            <a:endParaRPr sz="1400"/>
-          </a:p>
-          <a:p>
-            <a:pPr indent="0" lvl="0" marL="0" rtl="0" algn="l">
-              <a:spcBef>
-                <a:spcPts val="1200"/>
-              </a:spcBef>
-              <a:spcAft>
-                <a:spcPts val="1200"/>
-              </a:spcAft>
-              <a:buNone/>
-            </a:pPr>
-            <a:r>
-              <a:rPr lang="en" sz="1400"/>
-              <a:t>Kesha Williams (2020). </a:t>
-            </a:r>
-            <a:r>
-              <a:rPr lang="en" sz="1400" u="sng">
-                <a:solidFill>
-                  <a:schemeClr val="hlink"/>
-                </a:solidFill>
-                <a:hlinkClick r:id="rId5"/>
-              </a:rPr>
-              <a:t>Get rolling with machine learning on AWS DeepRacer</a:t>
-            </a:r>
-            <a:r>
-              <a:rPr lang="en" sz="1400"/>
-              <a:t>.</a:t>
-            </a:r>
-            <a:endParaRPr sz="1400"/>
+            <a:endParaRPr sz="1800"/>
           </a:p>
         </p:txBody>
       </p:sp>
@@ -12781,6 +13098,380 @@
 </p:sld>
 </file>
 
+<file path=ppt/slides/slide20.xml><?xml version="1.0" encoding="utf-8"?>
+<p:sld xmlns:a="http://schemas.openxmlformats.org/drawingml/2006/main" xmlns:r="http://schemas.openxmlformats.org/officeDocument/2006/relationships" xmlns:mc="http://schemas.openxmlformats.org/markup-compatibility/2006" xmlns:mv="urn:schemas-microsoft-com:mac:vml" xmlns:p="http://schemas.openxmlformats.org/presentationml/2006/main" xmlns:c="http://schemas.openxmlformats.org/drawingml/2006/chart" xmlns:dgm="http://schemas.openxmlformats.org/drawingml/2006/diagram" xmlns:o="urn:schemas-microsoft-com:office:office" xmlns:v="urn:schemas-microsoft-com:vml" xmlns:pvml="urn:schemas-microsoft-com:office:powerpoint" xmlns:com="http://schemas.openxmlformats.org/drawingml/2006/compatibility" xmlns:p14="http://schemas.microsoft.com/office/powerpoint/2010/main" xmlns:p15="http://schemas.microsoft.com/office/powerpoint/2012/main" xmlns:ahyp="http://schemas.microsoft.com/office/drawing/2018/hyperlinkcolor">
+  <p:cSld>
+    <p:spTree>
+      <p:nvGrpSpPr>
+        <p:cNvPr id="259" name="Shape 259"/>
+        <p:cNvGrpSpPr/>
+        <p:nvPr/>
+      </p:nvGrpSpPr>
+      <p:grpSpPr>
+        <a:xfrm>
+          <a:off x="0" y="0"/>
+          <a:ext cx="0" cy="0"/>
+          <a:chOff x="0" y="0"/>
+          <a:chExt cx="0" cy="0"/>
+        </a:xfrm>
+      </p:grpSpPr>
+      <p:sp>
+        <p:nvSpPr>
+          <p:cNvPr id="260" name="Google Shape;260;p32"/>
+          <p:cNvSpPr txBox="1"/>
+          <p:nvPr>
+            <p:ph type="title"/>
+          </p:nvPr>
+        </p:nvSpPr>
+        <p:spPr>
+          <a:xfrm>
+            <a:off x="1297500" y="393750"/>
+            <a:ext cx="7038900" cy="914100"/>
+          </a:xfrm>
+          <a:prstGeom prst="rect">
+            <a:avLst/>
+          </a:prstGeom>
+        </p:spPr>
+        <p:txBody>
+          <a:bodyPr anchorCtr="0" anchor="t" bIns="91425" lIns="91425" spcFirstLastPara="1" rIns="91425" wrap="square" tIns="91425">
+            <a:normAutofit/>
+          </a:bodyPr>
+          <a:lstStyle/>
+          <a:p>
+            <a:pPr indent="0" lvl="0" marL="0" rtl="0" algn="l">
+              <a:spcBef>
+                <a:spcPts val="0"/>
+              </a:spcBef>
+              <a:spcAft>
+                <a:spcPts val="0"/>
+              </a:spcAft>
+              <a:buNone/>
+            </a:pPr>
+            <a:r>
+              <a:rPr lang="en" sz="3000"/>
+              <a:t>Next Steps</a:t>
+            </a:r>
+            <a:endParaRPr sz="3000"/>
+          </a:p>
+        </p:txBody>
+      </p:sp>
+      <p:sp>
+        <p:nvSpPr>
+          <p:cNvPr id="261" name="Google Shape;261;p32"/>
+          <p:cNvSpPr txBox="1"/>
+          <p:nvPr>
+            <p:ph idx="1" type="body"/>
+          </p:nvPr>
+        </p:nvSpPr>
+        <p:spPr>
+          <a:xfrm>
+            <a:off x="1297500" y="1567550"/>
+            <a:ext cx="7038900" cy="2911200"/>
+          </a:xfrm>
+          <a:prstGeom prst="rect">
+            <a:avLst/>
+          </a:prstGeom>
+        </p:spPr>
+        <p:txBody>
+          <a:bodyPr anchorCtr="0" anchor="t" bIns="91425" lIns="91425" spcFirstLastPara="1" rIns="91425" wrap="square" tIns="91425">
+            <a:normAutofit/>
+          </a:bodyPr>
+          <a:lstStyle/>
+          <a:p>
+            <a:pPr indent="-342900" lvl="0" marL="457200" rtl="0" algn="l">
+              <a:spcBef>
+                <a:spcPts val="0"/>
+              </a:spcBef>
+              <a:spcAft>
+                <a:spcPts val="0"/>
+              </a:spcAft>
+              <a:buSzPts val="1800"/>
+              <a:buChar char="-"/>
+            </a:pPr>
+            <a:r>
+              <a:rPr lang="en" sz="1800"/>
+              <a:t>Setup environments with lower training costs</a:t>
+            </a:r>
+            <a:endParaRPr sz="1800"/>
+          </a:p>
+          <a:p>
+            <a:pPr indent="-342900" lvl="1" marL="914400" rtl="0" algn="l">
+              <a:spcBef>
+                <a:spcPts val="0"/>
+              </a:spcBef>
+              <a:spcAft>
+                <a:spcPts val="0"/>
+              </a:spcAft>
+              <a:buSzPts val="1800"/>
+              <a:buChar char="-"/>
+            </a:pPr>
+            <a:r>
+              <a:rPr lang="en" sz="1800"/>
+              <a:t>Local setup</a:t>
+            </a:r>
+            <a:endParaRPr sz="1800"/>
+          </a:p>
+          <a:p>
+            <a:pPr indent="-342900" lvl="1" marL="914400" rtl="0" algn="l">
+              <a:spcBef>
+                <a:spcPts val="0"/>
+              </a:spcBef>
+              <a:spcAft>
+                <a:spcPts val="0"/>
+              </a:spcAft>
+              <a:buSzPts val="1800"/>
+              <a:buChar char="-"/>
+            </a:pPr>
+            <a:r>
+              <a:rPr lang="en" sz="1800"/>
+              <a:t>Using individual AWS services and spot pricing</a:t>
+            </a:r>
+            <a:endParaRPr sz="1800"/>
+          </a:p>
+          <a:p>
+            <a:pPr indent="-342900" lvl="0" marL="457200" rtl="0" algn="l">
+              <a:spcBef>
+                <a:spcPts val="0"/>
+              </a:spcBef>
+              <a:spcAft>
+                <a:spcPts val="0"/>
+              </a:spcAft>
+              <a:buSzPts val="1800"/>
+              <a:buChar char="-"/>
+            </a:pPr>
+            <a:r>
+              <a:rPr lang="en" sz="1800"/>
+              <a:t>Create optimal waypoints for left and right lanes</a:t>
+            </a:r>
+            <a:endParaRPr sz="1800"/>
+          </a:p>
+          <a:p>
+            <a:pPr indent="-342900" lvl="0" marL="457200" rtl="0" algn="l">
+              <a:spcBef>
+                <a:spcPts val="0"/>
+              </a:spcBef>
+              <a:spcAft>
+                <a:spcPts val="0"/>
+              </a:spcAft>
+              <a:buSzPts val="1800"/>
+              <a:buChar char="-"/>
+            </a:pPr>
+            <a:r>
+              <a:rPr lang="en" sz="1800"/>
+              <a:t>Evaluate </a:t>
+            </a:r>
+            <a:r>
+              <a:rPr lang="en" sz="1800"/>
+              <a:t>more scenarios</a:t>
+            </a:r>
+            <a:r>
+              <a:rPr lang="en" sz="1800"/>
+              <a:t> after longer training times</a:t>
+            </a:r>
+            <a:endParaRPr sz="1800"/>
+          </a:p>
+        </p:txBody>
+      </p:sp>
+    </p:spTree>
+  </p:cSld>
+  <p:clrMapOvr>
+    <a:masterClrMapping/>
+  </p:clrMapOvr>
+</p:sld>
+</file>
+
+<file path=ppt/slides/slide21.xml><?xml version="1.0" encoding="utf-8"?>
+<p:sld xmlns:a="http://schemas.openxmlformats.org/drawingml/2006/main" xmlns:r="http://schemas.openxmlformats.org/officeDocument/2006/relationships" xmlns:mc="http://schemas.openxmlformats.org/markup-compatibility/2006" xmlns:mv="urn:schemas-microsoft-com:mac:vml" xmlns:p="http://schemas.openxmlformats.org/presentationml/2006/main" xmlns:c="http://schemas.openxmlformats.org/drawingml/2006/chart" xmlns:dgm="http://schemas.openxmlformats.org/drawingml/2006/diagram" xmlns:o="urn:schemas-microsoft-com:office:office" xmlns:v="urn:schemas-microsoft-com:vml" xmlns:pvml="urn:schemas-microsoft-com:office:powerpoint" xmlns:com="http://schemas.openxmlformats.org/drawingml/2006/compatibility" xmlns:p14="http://schemas.microsoft.com/office/powerpoint/2010/main" xmlns:p15="http://schemas.microsoft.com/office/powerpoint/2012/main" xmlns:ahyp="http://schemas.microsoft.com/office/drawing/2018/hyperlinkcolor">
+  <p:cSld>
+    <p:spTree>
+      <p:nvGrpSpPr>
+        <p:cNvPr id="265" name="Shape 265"/>
+        <p:cNvGrpSpPr/>
+        <p:nvPr/>
+      </p:nvGrpSpPr>
+      <p:grpSpPr>
+        <a:xfrm>
+          <a:off x="0" y="0"/>
+          <a:ext cx="0" cy="0"/>
+          <a:chOff x="0" y="0"/>
+          <a:chExt cx="0" cy="0"/>
+        </a:xfrm>
+      </p:grpSpPr>
+      <p:sp>
+        <p:nvSpPr>
+          <p:cNvPr id="266" name="Google Shape;266;p33"/>
+          <p:cNvSpPr txBox="1"/>
+          <p:nvPr>
+            <p:ph type="title"/>
+          </p:nvPr>
+        </p:nvSpPr>
+        <p:spPr>
+          <a:xfrm>
+            <a:off x="1297500" y="393750"/>
+            <a:ext cx="7038900" cy="914100"/>
+          </a:xfrm>
+          <a:prstGeom prst="rect">
+            <a:avLst/>
+          </a:prstGeom>
+        </p:spPr>
+        <p:txBody>
+          <a:bodyPr anchorCtr="0" anchor="t" bIns="91425" lIns="91425" spcFirstLastPara="1" rIns="91425" wrap="square" tIns="91425">
+            <a:normAutofit/>
+          </a:bodyPr>
+          <a:lstStyle/>
+          <a:p>
+            <a:pPr indent="0" lvl="0" marL="0" rtl="0" algn="l">
+              <a:spcBef>
+                <a:spcPts val="0"/>
+              </a:spcBef>
+              <a:spcAft>
+                <a:spcPts val="0"/>
+              </a:spcAft>
+              <a:buNone/>
+            </a:pPr>
+            <a:r>
+              <a:rPr lang="en" sz="3000"/>
+              <a:t>Questions?</a:t>
+            </a:r>
+            <a:endParaRPr sz="3000"/>
+          </a:p>
+        </p:txBody>
+      </p:sp>
+      <p:sp>
+        <p:nvSpPr>
+          <p:cNvPr id="267" name="Google Shape;267;p33"/>
+          <p:cNvSpPr txBox="1"/>
+          <p:nvPr>
+            <p:ph idx="1" type="body"/>
+          </p:nvPr>
+        </p:nvSpPr>
+        <p:spPr>
+          <a:xfrm>
+            <a:off x="1297500" y="1567550"/>
+            <a:ext cx="7038900" cy="2911200"/>
+          </a:xfrm>
+          <a:prstGeom prst="rect">
+            <a:avLst/>
+          </a:prstGeom>
+        </p:spPr>
+        <p:txBody>
+          <a:bodyPr anchorCtr="0" anchor="t" bIns="91425" lIns="91425" spcFirstLastPara="1" rIns="91425" wrap="square" tIns="91425">
+            <a:normAutofit/>
+          </a:bodyPr>
+          <a:lstStyle/>
+          <a:p>
+            <a:pPr indent="0" lvl="0" marL="0" rtl="0" algn="l">
+              <a:spcBef>
+                <a:spcPts val="0"/>
+              </a:spcBef>
+              <a:spcAft>
+                <a:spcPts val="0"/>
+              </a:spcAft>
+              <a:buNone/>
+            </a:pPr>
+            <a:r>
+              <a:rPr lang="en" sz="1800"/>
+              <a:t>References:</a:t>
+            </a:r>
+            <a:endParaRPr sz="1800"/>
+          </a:p>
+          <a:p>
+            <a:pPr indent="0" lvl="0" marL="0" rtl="0" algn="l">
+              <a:spcBef>
+                <a:spcPts val="1200"/>
+              </a:spcBef>
+              <a:spcAft>
+                <a:spcPts val="0"/>
+              </a:spcAft>
+              <a:buNone/>
+            </a:pPr>
+            <a:r>
+              <a:rPr lang="en" sz="1400"/>
+              <a:t>AWS (2021). </a:t>
+            </a:r>
+            <a:r>
+              <a:rPr lang="en" sz="1400" u="sng">
+                <a:solidFill>
+                  <a:schemeClr val="hlink"/>
+                </a:solidFill>
+                <a:hlinkClick r:id="rId3"/>
+              </a:rPr>
+              <a:t>AWS DeepRacer Developer Guide</a:t>
+            </a:r>
+            <a:r>
+              <a:rPr lang="en" sz="1400"/>
+              <a:t>.</a:t>
+            </a:r>
+            <a:endParaRPr sz="1400"/>
+          </a:p>
+          <a:p>
+            <a:pPr indent="0" lvl="0" marL="0" rtl="0" algn="l">
+              <a:spcBef>
+                <a:spcPts val="1200"/>
+              </a:spcBef>
+              <a:spcAft>
+                <a:spcPts val="0"/>
+              </a:spcAft>
+              <a:buNone/>
+            </a:pPr>
+            <a:r>
+              <a:rPr lang="en" sz="1400"/>
+              <a:t>AWS (2021). </a:t>
+            </a:r>
+            <a:r>
+              <a:rPr lang="en" sz="1400" u="sng">
+                <a:solidFill>
+                  <a:schemeClr val="hlink"/>
+                </a:solidFill>
+                <a:hlinkClick r:id="rId4"/>
+              </a:rPr>
+              <a:t>Input Parameters of the AWS DeepRacer Reward Function</a:t>
+            </a:r>
+            <a:r>
+              <a:rPr lang="en" sz="1400"/>
+              <a:t>.</a:t>
+            </a:r>
+            <a:endParaRPr sz="1400"/>
+          </a:p>
+          <a:p>
+            <a:pPr indent="0" lvl="0" marL="0" rtl="0" algn="l">
+              <a:spcBef>
+                <a:spcPts val="1200"/>
+              </a:spcBef>
+              <a:spcAft>
+                <a:spcPts val="1200"/>
+              </a:spcAft>
+              <a:buNone/>
+            </a:pPr>
+            <a:r>
+              <a:rPr lang="en" sz="1400"/>
+              <a:t>Kesha Williams (2020). </a:t>
+            </a:r>
+            <a:r>
+              <a:rPr lang="en" sz="1400" u="sng">
+                <a:solidFill>
+                  <a:schemeClr val="hlink"/>
+                </a:solidFill>
+                <a:hlinkClick r:id="rId5"/>
+              </a:rPr>
+              <a:t>Get rolling with machine learning on AWS DeepRacer</a:t>
+            </a:r>
+            <a:r>
+              <a:rPr lang="en" sz="1400"/>
+              <a:t>.</a:t>
+            </a:r>
+            <a:endParaRPr sz="1400"/>
+          </a:p>
+        </p:txBody>
+      </p:sp>
+    </p:spTree>
+  </p:cSld>
+  <p:clrMapOvr>
+    <a:masterClrMapping/>
+  </p:clrMapOvr>
+</p:sld>
+</file>
+
 <file path=ppt/slides/slide3.xml><?xml version="1.0" encoding="utf-8"?>
 <p:sld xmlns:a="http://schemas.openxmlformats.org/drawingml/2006/main" xmlns:r="http://schemas.openxmlformats.org/officeDocument/2006/relationships" xmlns:mc="http://schemas.openxmlformats.org/markup-compatibility/2006" xmlns:mv="urn:schemas-microsoft-com:mac:vml" xmlns:p="http://schemas.openxmlformats.org/presentationml/2006/main" xmlns:c="http://schemas.openxmlformats.org/drawingml/2006/chart" xmlns:dgm="http://schemas.openxmlformats.org/drawingml/2006/diagram" xmlns:o="urn:schemas-microsoft-com:office:office" xmlns:v="urn:schemas-microsoft-com:vml" xmlns:pvml="urn:schemas-microsoft-com:office:powerpoint" xmlns:com="http://schemas.openxmlformats.org/drawingml/2006/compatibility" xmlns:p14="http://schemas.microsoft.com/office/powerpoint/2010/main" xmlns:p15="http://schemas.microsoft.com/office/powerpoint/2012/main" xmlns:ahyp="http://schemas.microsoft.com/office/drawing/2018/hyperlinkcolor">
   <p:cSld>
@@ -12832,6 +13523,337 @@
             </a:pPr>
             <a:r>
               <a:rPr lang="en" sz="3000"/>
+              <a:t>AWS DeepRacer</a:t>
+            </a:r>
+            <a:endParaRPr sz="3000"/>
+          </a:p>
+        </p:txBody>
+      </p:sp>
+      <p:sp>
+        <p:nvSpPr>
+          <p:cNvPr id="147" name="Google Shape;147;p15"/>
+          <p:cNvSpPr txBox="1"/>
+          <p:nvPr>
+            <p:ph idx="1" type="body"/>
+          </p:nvPr>
+        </p:nvSpPr>
+        <p:spPr>
+          <a:xfrm>
+            <a:off x="1297500" y="1567550"/>
+            <a:ext cx="7038900" cy="2911200"/>
+          </a:xfrm>
+          <a:prstGeom prst="rect">
+            <a:avLst/>
+          </a:prstGeom>
+        </p:spPr>
+        <p:txBody>
+          <a:bodyPr anchorCtr="0" anchor="t" bIns="91425" lIns="91425" spcFirstLastPara="1" rIns="91425" wrap="square" tIns="91425">
+            <a:normAutofit/>
+          </a:bodyPr>
+          <a:lstStyle/>
+          <a:p>
+            <a:pPr indent="-342900" lvl="0" marL="457200" rtl="0" algn="l">
+              <a:spcBef>
+                <a:spcPts val="0"/>
+              </a:spcBef>
+              <a:spcAft>
+                <a:spcPts val="0"/>
+              </a:spcAft>
+              <a:buSzPts val="1800"/>
+              <a:buChar char="●"/>
+            </a:pPr>
+            <a:r>
+              <a:rPr lang="en" sz="1800"/>
+              <a:t>System to explore reinforcement learning and to build autonomous driving applications.</a:t>
+            </a:r>
+            <a:endParaRPr sz="1800"/>
+          </a:p>
+          <a:p>
+            <a:pPr indent="-342900" lvl="0" marL="457200" rtl="0" algn="l">
+              <a:spcBef>
+                <a:spcPts val="0"/>
+              </a:spcBef>
+              <a:spcAft>
+                <a:spcPts val="0"/>
+              </a:spcAft>
+              <a:buSzPts val="1800"/>
+              <a:buChar char="●"/>
+            </a:pPr>
+            <a:r>
+              <a:rPr lang="en" sz="1800"/>
+              <a:t>Consists of:</a:t>
+            </a:r>
+            <a:endParaRPr sz="1800"/>
+          </a:p>
+          <a:p>
+            <a:pPr indent="-342900" lvl="1" marL="914400" rtl="0" algn="l">
+              <a:spcBef>
+                <a:spcPts val="0"/>
+              </a:spcBef>
+              <a:spcAft>
+                <a:spcPts val="0"/>
+              </a:spcAft>
+              <a:buSzPts val="1800"/>
+              <a:buChar char="○"/>
+            </a:pPr>
+            <a:r>
+              <a:rPr lang="en" sz="1800"/>
+              <a:t>AWS DeepRacer Console</a:t>
+            </a:r>
+            <a:endParaRPr sz="1800"/>
+          </a:p>
+          <a:p>
+            <a:pPr indent="-342900" lvl="1" marL="914400" rtl="0" algn="l">
+              <a:spcBef>
+                <a:spcPts val="0"/>
+              </a:spcBef>
+              <a:spcAft>
+                <a:spcPts val="0"/>
+              </a:spcAft>
+              <a:buSzPts val="1800"/>
+              <a:buChar char="○"/>
+            </a:pPr>
+            <a:r>
+              <a:rPr lang="en" sz="1800"/>
+              <a:t>AWS DeepRacer Vehicle</a:t>
+            </a:r>
+            <a:endParaRPr sz="1800"/>
+          </a:p>
+          <a:p>
+            <a:pPr indent="-342900" lvl="1" marL="914400" rtl="0" algn="l">
+              <a:spcBef>
+                <a:spcPts val="0"/>
+              </a:spcBef>
+              <a:spcAft>
+                <a:spcPts val="0"/>
+              </a:spcAft>
+              <a:buSzPts val="1800"/>
+              <a:buChar char="○"/>
+            </a:pPr>
+            <a:r>
+              <a:rPr lang="en" sz="1800"/>
+              <a:t>AWS DeepRacer League</a:t>
+            </a:r>
+            <a:endParaRPr sz="1800"/>
+          </a:p>
+        </p:txBody>
+      </p:sp>
+    </p:spTree>
+  </p:cSld>
+  <p:clrMapOvr>
+    <a:masterClrMapping/>
+  </p:clrMapOvr>
+</p:sld>
+</file>
+
+<file path=ppt/slides/slide4.xml><?xml version="1.0" encoding="utf-8"?>
+<p:sld xmlns:a="http://schemas.openxmlformats.org/drawingml/2006/main" xmlns:r="http://schemas.openxmlformats.org/officeDocument/2006/relationships" xmlns:mc="http://schemas.openxmlformats.org/markup-compatibility/2006" xmlns:mv="urn:schemas-microsoft-com:mac:vml" xmlns:p="http://schemas.openxmlformats.org/presentationml/2006/main" xmlns:c="http://schemas.openxmlformats.org/drawingml/2006/chart" xmlns:dgm="http://schemas.openxmlformats.org/drawingml/2006/diagram" xmlns:o="urn:schemas-microsoft-com:office:office" xmlns:v="urn:schemas-microsoft-com:vml" xmlns:pvml="urn:schemas-microsoft-com:office:powerpoint" xmlns:com="http://schemas.openxmlformats.org/drawingml/2006/compatibility" xmlns:p14="http://schemas.microsoft.com/office/powerpoint/2010/main" xmlns:p15="http://schemas.microsoft.com/office/powerpoint/2012/main" xmlns:ahyp="http://schemas.microsoft.com/office/drawing/2018/hyperlinkcolor">
+  <p:cSld>
+    <p:spTree>
+      <p:nvGrpSpPr>
+        <p:cNvPr id="151" name="Shape 151"/>
+        <p:cNvGrpSpPr/>
+        <p:nvPr/>
+      </p:nvGrpSpPr>
+      <p:grpSpPr>
+        <a:xfrm>
+          <a:off x="0" y="0"/>
+          <a:ext cx="0" cy="0"/>
+          <a:chOff x="0" y="0"/>
+          <a:chExt cx="0" cy="0"/>
+        </a:xfrm>
+      </p:grpSpPr>
+      <p:sp>
+        <p:nvSpPr>
+          <p:cNvPr id="152" name="Google Shape;152;p16"/>
+          <p:cNvSpPr txBox="1"/>
+          <p:nvPr>
+            <p:ph type="title"/>
+          </p:nvPr>
+        </p:nvSpPr>
+        <p:spPr>
+          <a:xfrm>
+            <a:off x="1297500" y="393750"/>
+            <a:ext cx="7038900" cy="914100"/>
+          </a:xfrm>
+          <a:prstGeom prst="rect">
+            <a:avLst/>
+          </a:prstGeom>
+        </p:spPr>
+        <p:txBody>
+          <a:bodyPr anchorCtr="0" anchor="t" bIns="91425" lIns="91425" spcFirstLastPara="1" rIns="91425" wrap="square" tIns="91425">
+            <a:normAutofit/>
+          </a:bodyPr>
+          <a:lstStyle/>
+          <a:p>
+            <a:pPr indent="0" lvl="0" marL="0" rtl="0" algn="l">
+              <a:spcBef>
+                <a:spcPts val="0"/>
+              </a:spcBef>
+              <a:spcAft>
+                <a:spcPts val="0"/>
+              </a:spcAft>
+              <a:buNone/>
+            </a:pPr>
+            <a:r>
+              <a:rPr lang="en" sz="3000"/>
+              <a:t>AWS DeepRacer Console</a:t>
+            </a:r>
+            <a:endParaRPr sz="3000"/>
+          </a:p>
+        </p:txBody>
+      </p:sp>
+      <p:sp>
+        <p:nvSpPr>
+          <p:cNvPr id="153" name="Google Shape;153;p16"/>
+          <p:cNvSpPr txBox="1"/>
+          <p:nvPr>
+            <p:ph idx="1" type="body"/>
+          </p:nvPr>
+        </p:nvSpPr>
+        <p:spPr>
+          <a:xfrm>
+            <a:off x="1297500" y="1567550"/>
+            <a:ext cx="7038900" cy="2911200"/>
+          </a:xfrm>
+          <a:prstGeom prst="rect">
+            <a:avLst/>
+          </a:prstGeom>
+        </p:spPr>
+        <p:txBody>
+          <a:bodyPr anchorCtr="0" anchor="t" bIns="91425" lIns="91425" spcFirstLastPara="1" rIns="91425" wrap="square" tIns="91425">
+            <a:normAutofit/>
+          </a:bodyPr>
+          <a:lstStyle/>
+          <a:p>
+            <a:pPr indent="-342900" lvl="0" marL="457200" rtl="0" algn="l">
+              <a:spcBef>
+                <a:spcPts val="0"/>
+              </a:spcBef>
+              <a:spcAft>
+                <a:spcPts val="0"/>
+              </a:spcAft>
+              <a:buSzPts val="1800"/>
+              <a:buChar char="-"/>
+            </a:pPr>
+            <a:r>
+              <a:rPr lang="en" sz="1800"/>
+              <a:t>Graphical user interface.</a:t>
+            </a:r>
+            <a:endParaRPr sz="1800"/>
+          </a:p>
+          <a:p>
+            <a:pPr indent="-342900" lvl="0" marL="457200" rtl="0" algn="l">
+              <a:spcBef>
+                <a:spcPts val="0"/>
+              </a:spcBef>
+              <a:spcAft>
+                <a:spcPts val="0"/>
+              </a:spcAft>
+              <a:buSzPts val="1800"/>
+              <a:buChar char="-"/>
+            </a:pPr>
+            <a:r>
+              <a:rPr lang="en" sz="1800"/>
+              <a:t>Train a reinforcement learning model with a specified reward function, optimization algorithm, environment, and hyperparameters.</a:t>
+            </a:r>
+            <a:endParaRPr sz="1800"/>
+          </a:p>
+          <a:p>
+            <a:pPr indent="-342900" lvl="0" marL="457200" rtl="0" algn="l">
+              <a:spcBef>
+                <a:spcPts val="0"/>
+              </a:spcBef>
+              <a:spcAft>
+                <a:spcPts val="0"/>
+              </a:spcAft>
+              <a:buSzPts val="1800"/>
+              <a:buChar char="-"/>
+            </a:pPr>
+            <a:r>
+              <a:rPr lang="en" sz="1800"/>
+              <a:t>Choose a simulated track to train and evaluate a model by using SageMaker and AWS RoboMaker.</a:t>
+            </a:r>
+            <a:endParaRPr sz="1800"/>
+          </a:p>
+          <a:p>
+            <a:pPr indent="-342900" lvl="0" marL="457200" rtl="0" algn="l">
+              <a:spcBef>
+                <a:spcPts val="0"/>
+              </a:spcBef>
+              <a:spcAft>
+                <a:spcPts val="0"/>
+              </a:spcAft>
+              <a:buSzPts val="1800"/>
+              <a:buChar char="-"/>
+            </a:pPr>
+            <a:r>
+              <a:rPr lang="en" sz="1800"/>
+              <a:t>Clone a trained model to optimize your model's performance.</a:t>
+            </a:r>
+            <a:endParaRPr sz="1800"/>
+          </a:p>
+        </p:txBody>
+      </p:sp>
+    </p:spTree>
+  </p:cSld>
+  <p:clrMapOvr>
+    <a:masterClrMapping/>
+  </p:clrMapOvr>
+</p:sld>
+</file>
+
+<file path=ppt/slides/slide5.xml><?xml version="1.0" encoding="utf-8"?>
+<p:sld xmlns:a="http://schemas.openxmlformats.org/drawingml/2006/main" xmlns:r="http://schemas.openxmlformats.org/officeDocument/2006/relationships" xmlns:mc="http://schemas.openxmlformats.org/markup-compatibility/2006" xmlns:mv="urn:schemas-microsoft-com:mac:vml" xmlns:p="http://schemas.openxmlformats.org/presentationml/2006/main" xmlns:c="http://schemas.openxmlformats.org/drawingml/2006/chart" xmlns:dgm="http://schemas.openxmlformats.org/drawingml/2006/diagram" xmlns:o="urn:schemas-microsoft-com:office:office" xmlns:v="urn:schemas-microsoft-com:vml" xmlns:pvml="urn:schemas-microsoft-com:office:powerpoint" xmlns:com="http://schemas.openxmlformats.org/drawingml/2006/compatibility" xmlns:p14="http://schemas.microsoft.com/office/powerpoint/2010/main" xmlns:p15="http://schemas.microsoft.com/office/powerpoint/2012/main" xmlns:ahyp="http://schemas.microsoft.com/office/drawing/2018/hyperlinkcolor">
+  <p:cSld>
+    <p:spTree>
+      <p:nvGrpSpPr>
+        <p:cNvPr id="157" name="Shape 157"/>
+        <p:cNvGrpSpPr/>
+        <p:nvPr/>
+      </p:nvGrpSpPr>
+      <p:grpSpPr>
+        <a:xfrm>
+          <a:off x="0" y="0"/>
+          <a:ext cx="0" cy="0"/>
+          <a:chOff x="0" y="0"/>
+          <a:chExt cx="0" cy="0"/>
+        </a:xfrm>
+      </p:grpSpPr>
+      <p:sp>
+        <p:nvSpPr>
+          <p:cNvPr id="158" name="Google Shape;158;p17"/>
+          <p:cNvSpPr txBox="1"/>
+          <p:nvPr>
+            <p:ph type="title"/>
+          </p:nvPr>
+        </p:nvSpPr>
+        <p:spPr>
+          <a:xfrm>
+            <a:off x="1297500" y="393750"/>
+            <a:ext cx="7038900" cy="914100"/>
+          </a:xfrm>
+          <a:prstGeom prst="rect">
+            <a:avLst/>
+          </a:prstGeom>
+        </p:spPr>
+        <p:txBody>
+          <a:bodyPr anchorCtr="0" anchor="t" bIns="91425" lIns="91425" spcFirstLastPara="1" rIns="91425" wrap="square" tIns="91425">
+            <a:normAutofit/>
+          </a:bodyPr>
+          <a:lstStyle/>
+          <a:p>
+            <a:pPr indent="0" lvl="0" marL="0" rtl="0" algn="l">
+              <a:spcBef>
+                <a:spcPts val="0"/>
+              </a:spcBef>
+              <a:spcAft>
+                <a:spcPts val="0"/>
+              </a:spcAft>
+              <a:buNone/>
+            </a:pPr>
+            <a:r>
+              <a:rPr lang="en" sz="3000"/>
               <a:t>AWS DeepRacer </a:t>
             </a:r>
             <a:r>
@@ -12844,7 +13866,7 @@
       </p:sp>
       <p:pic>
         <p:nvPicPr>
-          <p:cNvPr id="147" name="Google Shape;147;p15"/>
+          <p:cNvPr id="159" name="Google Shape;159;p17"/>
           <p:cNvPicPr preferRelativeResize="0"/>
           <p:nvPr/>
         </p:nvPicPr>
@@ -12872,7 +13894,7 @@
       </p:pic>
       <p:sp>
         <p:nvSpPr>
-          <p:cNvPr id="148" name="Google Shape;148;p15"/>
+          <p:cNvPr id="160" name="Google Shape;160;p17"/>
           <p:cNvSpPr txBox="1"/>
           <p:nvPr>
             <p:ph idx="1" type="body"/>
@@ -12970,12 +13992,12 @@
 </p:sld>
 </file>
 
-<file path=ppt/slides/slide4.xml><?xml version="1.0" encoding="utf-8"?>
+<file path=ppt/slides/slide6.xml><?xml version="1.0" encoding="utf-8"?>
 <p:sld xmlns:a="http://schemas.openxmlformats.org/drawingml/2006/main" xmlns:r="http://schemas.openxmlformats.org/officeDocument/2006/relationships" xmlns:mc="http://schemas.openxmlformats.org/markup-compatibility/2006" xmlns:mv="urn:schemas-microsoft-com:mac:vml" xmlns:p="http://schemas.openxmlformats.org/presentationml/2006/main" xmlns:c="http://schemas.openxmlformats.org/drawingml/2006/chart" xmlns:dgm="http://schemas.openxmlformats.org/drawingml/2006/diagram" xmlns:o="urn:schemas-microsoft-com:office:office" xmlns:v="urn:schemas-microsoft-com:vml" xmlns:pvml="urn:schemas-microsoft-com:office:powerpoint" xmlns:com="http://schemas.openxmlformats.org/drawingml/2006/compatibility" xmlns:p14="http://schemas.microsoft.com/office/powerpoint/2010/main" xmlns:p15="http://schemas.microsoft.com/office/powerpoint/2012/main" xmlns:ahyp="http://schemas.microsoft.com/office/drawing/2018/hyperlinkcolor">
   <p:cSld>
     <p:spTree>
       <p:nvGrpSpPr>
-        <p:cNvPr id="152" name="Shape 152"/>
+        <p:cNvPr id="164" name="Shape 164"/>
         <p:cNvGrpSpPr/>
         <p:nvPr/>
       </p:nvGrpSpPr>
@@ -12989,7 +14011,7 @@
       </p:grpSpPr>
       <p:sp>
         <p:nvSpPr>
-          <p:cNvPr id="153" name="Google Shape;153;p16"/>
+          <p:cNvPr id="165" name="Google Shape;165;p18"/>
           <p:cNvSpPr txBox="1"/>
           <p:nvPr>
             <p:ph type="title"/>
@@ -13029,7 +14051,7 @@
       </p:sp>
       <p:sp>
         <p:nvSpPr>
-          <p:cNvPr id="154" name="Google Shape;154;p16"/>
+          <p:cNvPr id="166" name="Google Shape;166;p18"/>
           <p:cNvSpPr txBox="1"/>
           <p:nvPr>
             <p:ph idx="1" type="body"/>
@@ -13161,12 +14183,12 @@
 </p:sld>
 </file>
 
-<file path=ppt/slides/slide5.xml><?xml version="1.0" encoding="utf-8"?>
+<file path=ppt/slides/slide7.xml><?xml version="1.0" encoding="utf-8"?>
 <p:sld xmlns:a="http://schemas.openxmlformats.org/drawingml/2006/main" xmlns:r="http://schemas.openxmlformats.org/officeDocument/2006/relationships" xmlns:mc="http://schemas.openxmlformats.org/markup-compatibility/2006" xmlns:mv="urn:schemas-microsoft-com:mac:vml" xmlns:p="http://schemas.openxmlformats.org/presentationml/2006/main" xmlns:c="http://schemas.openxmlformats.org/drawingml/2006/chart" xmlns:dgm="http://schemas.openxmlformats.org/drawingml/2006/diagram" xmlns:o="urn:schemas-microsoft-com:office:office" xmlns:v="urn:schemas-microsoft-com:vml" xmlns:pvml="urn:schemas-microsoft-com:office:powerpoint" xmlns:com="http://schemas.openxmlformats.org/drawingml/2006/compatibility" xmlns:p14="http://schemas.microsoft.com/office/powerpoint/2010/main" xmlns:p15="http://schemas.microsoft.com/office/powerpoint/2012/main" xmlns:ahyp="http://schemas.microsoft.com/office/drawing/2018/hyperlinkcolor">
   <p:cSld>
     <p:spTree>
       <p:nvGrpSpPr>
-        <p:cNvPr id="158" name="Shape 158"/>
+        <p:cNvPr id="170" name="Shape 170"/>
         <p:cNvGrpSpPr/>
         <p:nvPr/>
       </p:nvGrpSpPr>
@@ -13180,7 +14202,7 @@
       </p:grpSpPr>
       <p:sp>
         <p:nvSpPr>
-          <p:cNvPr id="159" name="Google Shape;159;p17"/>
+          <p:cNvPr id="171" name="Google Shape;171;p19"/>
           <p:cNvSpPr txBox="1"/>
           <p:nvPr>
             <p:ph type="title"/>
@@ -13220,7 +14242,7 @@
       </p:sp>
       <p:sp>
         <p:nvSpPr>
-          <p:cNvPr id="160" name="Google Shape;160;p17"/>
+          <p:cNvPr id="172" name="Google Shape;172;p19"/>
           <p:cNvSpPr txBox="1"/>
           <p:nvPr>
             <p:ph idx="1" type="body"/>
@@ -13278,7 +14300,7 @@
       </p:sp>
       <p:pic>
         <p:nvPicPr>
-          <p:cNvPr id="161" name="Google Shape;161;p17"/>
+          <p:cNvPr id="173" name="Google Shape;173;p19"/>
           <p:cNvPicPr preferRelativeResize="0"/>
           <p:nvPr/>
         </p:nvPicPr>
@@ -13312,12 +14334,12 @@
 </p:sld>
 </file>
 
-<file path=ppt/slides/slide6.xml><?xml version="1.0" encoding="utf-8"?>
+<file path=ppt/slides/slide8.xml><?xml version="1.0" encoding="utf-8"?>
 <p:sld xmlns:a="http://schemas.openxmlformats.org/drawingml/2006/main" xmlns:r="http://schemas.openxmlformats.org/officeDocument/2006/relationships" xmlns:mc="http://schemas.openxmlformats.org/markup-compatibility/2006" xmlns:mv="urn:schemas-microsoft-com:mac:vml" xmlns:p="http://schemas.openxmlformats.org/presentationml/2006/main" xmlns:c="http://schemas.openxmlformats.org/drawingml/2006/chart" xmlns:dgm="http://schemas.openxmlformats.org/drawingml/2006/diagram" xmlns:o="urn:schemas-microsoft-com:office:office" xmlns:v="urn:schemas-microsoft-com:vml" xmlns:pvml="urn:schemas-microsoft-com:office:powerpoint" xmlns:com="http://schemas.openxmlformats.org/drawingml/2006/compatibility" xmlns:p14="http://schemas.microsoft.com/office/powerpoint/2010/main" xmlns:p15="http://schemas.microsoft.com/office/powerpoint/2012/main" xmlns:ahyp="http://schemas.microsoft.com/office/drawing/2018/hyperlinkcolor">
   <p:cSld>
     <p:spTree>
       <p:nvGrpSpPr>
-        <p:cNvPr id="165" name="Shape 165"/>
+        <p:cNvPr id="177" name="Shape 177"/>
         <p:cNvGrpSpPr/>
         <p:nvPr/>
       </p:nvGrpSpPr>
@@ -13331,7 +14353,7 @@
       </p:grpSpPr>
       <p:sp>
         <p:nvSpPr>
-          <p:cNvPr id="166" name="Google Shape;166;p18"/>
+          <p:cNvPr id="178" name="Google Shape;178;p20"/>
           <p:cNvSpPr txBox="1"/>
           <p:nvPr>
             <p:ph type="title"/>
@@ -13371,7 +14393,7 @@
       </p:sp>
       <p:sp>
         <p:nvSpPr>
-          <p:cNvPr id="167" name="Google Shape;167;p18"/>
+          <p:cNvPr id="179" name="Google Shape;179;p20"/>
           <p:cNvSpPr txBox="1"/>
           <p:nvPr>
             <p:ph idx="1" type="body"/>
@@ -13495,7 +14517,7 @@
       </p:sp>
       <p:sp>
         <p:nvSpPr>
-          <p:cNvPr id="168" name="Google Shape;168;p18"/>
+          <p:cNvPr id="180" name="Google Shape;180;p20"/>
           <p:cNvSpPr txBox="1"/>
           <p:nvPr>
             <p:ph idx="2" type="body"/>
@@ -13548,374 +14570,6 @@
               <a:t>Number of epochs: 10</a:t>
             </a:r>
             <a:endParaRPr/>
-          </a:p>
-        </p:txBody>
-      </p:sp>
-    </p:spTree>
-  </p:cSld>
-  <p:clrMapOvr>
-    <a:masterClrMapping/>
-  </p:clrMapOvr>
-</p:sld>
-</file>
-
-<file path=ppt/slides/slide7.xml><?xml version="1.0" encoding="utf-8"?>
-<p:sld xmlns:a="http://schemas.openxmlformats.org/drawingml/2006/main" xmlns:r="http://schemas.openxmlformats.org/officeDocument/2006/relationships" xmlns:mc="http://schemas.openxmlformats.org/markup-compatibility/2006" xmlns:mv="urn:schemas-microsoft-com:mac:vml" xmlns:p="http://schemas.openxmlformats.org/presentationml/2006/main" xmlns:c="http://schemas.openxmlformats.org/drawingml/2006/chart" xmlns:dgm="http://schemas.openxmlformats.org/drawingml/2006/diagram" xmlns:o="urn:schemas-microsoft-com:office:office" xmlns:v="urn:schemas-microsoft-com:vml" xmlns:pvml="urn:schemas-microsoft-com:office:powerpoint" xmlns:com="http://schemas.openxmlformats.org/drawingml/2006/compatibility" xmlns:p14="http://schemas.microsoft.com/office/powerpoint/2010/main" xmlns:p15="http://schemas.microsoft.com/office/powerpoint/2012/main" xmlns:ahyp="http://schemas.microsoft.com/office/drawing/2018/hyperlinkcolor">
-  <p:cSld>
-    <p:spTree>
-      <p:nvGrpSpPr>
-        <p:cNvPr id="172" name="Shape 172"/>
-        <p:cNvGrpSpPr/>
-        <p:nvPr/>
-      </p:nvGrpSpPr>
-      <p:grpSpPr>
-        <a:xfrm>
-          <a:off x="0" y="0"/>
-          <a:ext cx="0" cy="0"/>
-          <a:chOff x="0" y="0"/>
-          <a:chExt cx="0" cy="0"/>
-        </a:xfrm>
-      </p:grpSpPr>
-      <p:sp>
-        <p:nvSpPr>
-          <p:cNvPr id="173" name="Google Shape;173;p19"/>
-          <p:cNvSpPr txBox="1"/>
-          <p:nvPr>
-            <p:ph type="title"/>
-          </p:nvPr>
-        </p:nvSpPr>
-        <p:spPr>
-          <a:xfrm>
-            <a:off x="1297500" y="393750"/>
-            <a:ext cx="7038900" cy="914100"/>
-          </a:xfrm>
-          <a:prstGeom prst="rect">
-            <a:avLst/>
-          </a:prstGeom>
-        </p:spPr>
-        <p:txBody>
-          <a:bodyPr anchorCtr="0" anchor="t" bIns="91425" lIns="91425" spcFirstLastPara="1" rIns="91425" wrap="square" tIns="91425">
-            <a:normAutofit/>
-          </a:bodyPr>
-          <a:lstStyle/>
-          <a:p>
-            <a:pPr indent="0" lvl="0" marL="0" rtl="0" algn="l">
-              <a:spcBef>
-                <a:spcPts val="0"/>
-              </a:spcBef>
-              <a:spcAft>
-                <a:spcPts val="0"/>
-              </a:spcAft>
-              <a:buNone/>
-            </a:pPr>
-            <a:r>
-              <a:rPr lang="en" sz="3000"/>
-              <a:t>Vehicle Sensors</a:t>
-            </a:r>
-            <a:endParaRPr sz="3000"/>
-          </a:p>
-        </p:txBody>
-      </p:sp>
-      <p:sp>
-        <p:nvSpPr>
-          <p:cNvPr id="174" name="Google Shape;174;p19"/>
-          <p:cNvSpPr txBox="1"/>
-          <p:nvPr>
-            <p:ph idx="1" type="body"/>
-          </p:nvPr>
-        </p:nvSpPr>
-        <p:spPr>
-          <a:xfrm>
-            <a:off x="1297500" y="1567550"/>
-            <a:ext cx="7038900" cy="2911200"/>
-          </a:xfrm>
-          <a:prstGeom prst="rect">
-            <a:avLst/>
-          </a:prstGeom>
-        </p:spPr>
-        <p:txBody>
-          <a:bodyPr anchorCtr="0" anchor="t" bIns="91425" lIns="91425" spcFirstLastPara="1" rIns="91425" wrap="square" tIns="91425">
-            <a:normAutofit/>
-          </a:bodyPr>
-          <a:lstStyle/>
-          <a:p>
-            <a:pPr indent="0" lvl="0" marL="0" rtl="0" algn="l">
-              <a:spcBef>
-                <a:spcPts val="0"/>
-              </a:spcBef>
-              <a:spcAft>
-                <a:spcPts val="0"/>
-              </a:spcAft>
-              <a:buNone/>
-            </a:pPr>
-            <a:r>
-              <a:rPr lang="en" sz="1800"/>
-              <a:t>I</a:t>
-            </a:r>
-            <a:r>
-              <a:rPr lang="en" sz="1800"/>
-              <a:t>mages are converted into greyscale.</a:t>
-            </a:r>
-            <a:endParaRPr sz="1800"/>
-          </a:p>
-          <a:p>
-            <a:pPr indent="-342900" lvl="0" marL="457200" rtl="0" algn="l">
-              <a:spcBef>
-                <a:spcPts val="1200"/>
-              </a:spcBef>
-              <a:spcAft>
-                <a:spcPts val="0"/>
-              </a:spcAft>
-              <a:buSzPts val="1800"/>
-              <a:buChar char="●"/>
-            </a:pPr>
-            <a:r>
-              <a:rPr lang="en" sz="1800"/>
-              <a:t>Camera</a:t>
-            </a:r>
-            <a:endParaRPr sz="1800"/>
-          </a:p>
-          <a:p>
-            <a:pPr indent="-342900" lvl="1" marL="914400" rtl="0" algn="l">
-              <a:spcBef>
-                <a:spcPts val="0"/>
-              </a:spcBef>
-              <a:spcAft>
-                <a:spcPts val="0"/>
-              </a:spcAft>
-              <a:buSzPts val="1800"/>
-              <a:buChar char="○"/>
-            </a:pPr>
-            <a:r>
-              <a:rPr lang="en" sz="1800"/>
-              <a:t>lowest cost sensor solution</a:t>
-            </a:r>
-            <a:endParaRPr sz="1800"/>
-          </a:p>
-          <a:p>
-            <a:pPr indent="-342900" lvl="0" marL="457200" rtl="0" algn="l">
-              <a:spcBef>
-                <a:spcPts val="0"/>
-              </a:spcBef>
-              <a:spcAft>
-                <a:spcPts val="0"/>
-              </a:spcAft>
-              <a:buSzPts val="1800"/>
-              <a:buChar char="●"/>
-            </a:pPr>
-            <a:r>
-              <a:rPr lang="en" sz="1800"/>
-              <a:t>Stereo camera</a:t>
-            </a:r>
-            <a:endParaRPr sz="1800"/>
-          </a:p>
-          <a:p>
-            <a:pPr indent="-342900" lvl="1" marL="914400" rtl="0" algn="l">
-              <a:spcBef>
-                <a:spcPts val="0"/>
-              </a:spcBef>
-              <a:spcAft>
-                <a:spcPts val="0"/>
-              </a:spcAft>
-              <a:buSzPts val="1800"/>
-              <a:buChar char="○"/>
-            </a:pPr>
-            <a:r>
-              <a:rPr lang="en" sz="1800"/>
-              <a:t>can generate depth information of objects on track</a:t>
-            </a:r>
-            <a:endParaRPr sz="1800"/>
-          </a:p>
-          <a:p>
-            <a:pPr indent="-342900" lvl="0" marL="457200" rtl="0" algn="l">
-              <a:spcBef>
-                <a:spcPts val="0"/>
-              </a:spcBef>
-              <a:spcAft>
-                <a:spcPts val="0"/>
-              </a:spcAft>
-              <a:buSzPts val="1800"/>
-              <a:buChar char="●"/>
-            </a:pPr>
-            <a:r>
-              <a:rPr lang="en" sz="1800"/>
-              <a:t>LIDAR sensor</a:t>
-            </a:r>
-            <a:endParaRPr sz="1800"/>
-          </a:p>
-          <a:p>
-            <a:pPr indent="-342900" lvl="1" marL="914400" rtl="0" algn="l">
-              <a:spcBef>
-                <a:spcPts val="0"/>
-              </a:spcBef>
-              <a:spcAft>
-                <a:spcPts val="0"/>
-              </a:spcAft>
-              <a:buSzPts val="1800"/>
-              <a:buChar char="○"/>
-            </a:pPr>
-            <a:r>
-              <a:rPr lang="en" sz="1800"/>
-              <a:t>light detection and ranging sensor</a:t>
-            </a:r>
-            <a:endParaRPr sz="1800"/>
-          </a:p>
-          <a:p>
-            <a:pPr indent="-342900" lvl="1" marL="914400" rtl="0" algn="l">
-              <a:spcBef>
-                <a:spcPts val="0"/>
-              </a:spcBef>
-              <a:spcAft>
-                <a:spcPts val="0"/>
-              </a:spcAft>
-              <a:buSzPts val="1800"/>
-              <a:buChar char="○"/>
-            </a:pPr>
-            <a:r>
-              <a:rPr lang="en" sz="1800"/>
-              <a:t>continuous visibility</a:t>
-            </a:r>
-            <a:endParaRPr sz="1800"/>
-          </a:p>
-        </p:txBody>
-      </p:sp>
-    </p:spTree>
-  </p:cSld>
-  <p:clrMapOvr>
-    <a:masterClrMapping/>
-  </p:clrMapOvr>
-</p:sld>
-</file>
-
-<file path=ppt/slides/slide8.xml><?xml version="1.0" encoding="utf-8"?>
-<p:sld xmlns:a="http://schemas.openxmlformats.org/drawingml/2006/main" xmlns:r="http://schemas.openxmlformats.org/officeDocument/2006/relationships" xmlns:mc="http://schemas.openxmlformats.org/markup-compatibility/2006" xmlns:mv="urn:schemas-microsoft-com:mac:vml" xmlns:p="http://schemas.openxmlformats.org/presentationml/2006/main" xmlns:c="http://schemas.openxmlformats.org/drawingml/2006/chart" xmlns:dgm="http://schemas.openxmlformats.org/drawingml/2006/diagram" xmlns:o="urn:schemas-microsoft-com:office:office" xmlns:v="urn:schemas-microsoft-com:vml" xmlns:pvml="urn:schemas-microsoft-com:office:powerpoint" xmlns:com="http://schemas.openxmlformats.org/drawingml/2006/compatibility" xmlns:p14="http://schemas.microsoft.com/office/powerpoint/2010/main" xmlns:p15="http://schemas.microsoft.com/office/powerpoint/2012/main" xmlns:ahyp="http://schemas.microsoft.com/office/drawing/2018/hyperlinkcolor">
-  <p:cSld>
-    <p:spTree>
-      <p:nvGrpSpPr>
-        <p:cNvPr id="178" name="Shape 178"/>
-        <p:cNvGrpSpPr/>
-        <p:nvPr/>
-      </p:nvGrpSpPr>
-      <p:grpSpPr>
-        <a:xfrm>
-          <a:off x="0" y="0"/>
-          <a:ext cx="0" cy="0"/>
-          <a:chOff x="0" y="0"/>
-          <a:chExt cx="0" cy="0"/>
-        </a:xfrm>
-      </p:grpSpPr>
-      <p:sp>
-        <p:nvSpPr>
-          <p:cNvPr id="179" name="Google Shape;179;p20"/>
-          <p:cNvSpPr txBox="1"/>
-          <p:nvPr>
-            <p:ph type="title"/>
-          </p:nvPr>
-        </p:nvSpPr>
-        <p:spPr>
-          <a:xfrm>
-            <a:off x="1297500" y="393750"/>
-            <a:ext cx="7038900" cy="914100"/>
-          </a:xfrm>
-          <a:prstGeom prst="rect">
-            <a:avLst/>
-          </a:prstGeom>
-        </p:spPr>
-        <p:txBody>
-          <a:bodyPr anchorCtr="0" anchor="t" bIns="91425" lIns="91425" spcFirstLastPara="1" rIns="91425" wrap="square" tIns="91425">
-            <a:normAutofit/>
-          </a:bodyPr>
-          <a:lstStyle/>
-          <a:p>
-            <a:pPr indent="0" lvl="0" marL="0" rtl="0" algn="l">
-              <a:spcBef>
-                <a:spcPts val="0"/>
-              </a:spcBef>
-              <a:spcAft>
-                <a:spcPts val="0"/>
-              </a:spcAft>
-              <a:buNone/>
-            </a:pPr>
-            <a:r>
-              <a:rPr lang="en" sz="3000"/>
-              <a:t>Reward Functions</a:t>
-            </a:r>
-            <a:endParaRPr sz="3000"/>
-          </a:p>
-        </p:txBody>
-      </p:sp>
-      <p:sp>
-        <p:nvSpPr>
-          <p:cNvPr id="180" name="Google Shape;180;p20"/>
-          <p:cNvSpPr txBox="1"/>
-          <p:nvPr>
-            <p:ph idx="1" type="body"/>
-          </p:nvPr>
-        </p:nvSpPr>
-        <p:spPr>
-          <a:xfrm>
-            <a:off x="1297500" y="1567550"/>
-            <a:ext cx="7038900" cy="2911200"/>
-          </a:xfrm>
-          <a:prstGeom prst="rect">
-            <a:avLst/>
-          </a:prstGeom>
-        </p:spPr>
-        <p:txBody>
-          <a:bodyPr anchorCtr="0" anchor="t" bIns="91425" lIns="91425" spcFirstLastPara="1" rIns="91425" wrap="square" tIns="91425">
-            <a:normAutofit/>
-          </a:bodyPr>
-          <a:lstStyle/>
-          <a:p>
-            <a:pPr indent="-342900" lvl="0" marL="457200" rtl="0" algn="l">
-              <a:spcBef>
-                <a:spcPts val="0"/>
-              </a:spcBef>
-              <a:spcAft>
-                <a:spcPts val="0"/>
-              </a:spcAft>
-              <a:buSzPts val="1800"/>
-              <a:buChar char="●"/>
-            </a:pPr>
-            <a:r>
-              <a:rPr lang="en" sz="1800"/>
-              <a:t>Lambda functions written in Python</a:t>
-            </a:r>
-            <a:endParaRPr sz="1800"/>
-          </a:p>
-          <a:p>
-            <a:pPr indent="-342900" lvl="0" marL="457200" rtl="0" algn="l">
-              <a:spcBef>
-                <a:spcPts val="0"/>
-              </a:spcBef>
-              <a:spcAft>
-                <a:spcPts val="0"/>
-              </a:spcAft>
-              <a:buSzPts val="1800"/>
-              <a:buChar char="●"/>
-            </a:pPr>
-            <a:r>
-              <a:rPr lang="en" sz="1800"/>
-              <a:t>Used several to train the different models</a:t>
-            </a:r>
-            <a:endParaRPr sz="1800"/>
-          </a:p>
-          <a:p>
-            <a:pPr indent="-342900" lvl="0" marL="457200" rtl="0" algn="l">
-              <a:spcBef>
-                <a:spcPts val="0"/>
-              </a:spcBef>
-              <a:spcAft>
-                <a:spcPts val="0"/>
-              </a:spcAft>
-              <a:buSzPts val="1800"/>
-              <a:buChar char="●"/>
-            </a:pPr>
-            <a:r>
-              <a:rPr lang="en" sz="1800"/>
-              <a:t>The best performing model combined multiple examples</a:t>
-            </a:r>
-            <a:endParaRPr sz="1800"/>
           </a:p>
         </p:txBody>
       </p:sp>
@@ -13978,7 +14632,7 @@
             </a:pPr>
             <a:r>
               <a:rPr lang="en" sz="3000"/>
-              <a:t>Input Parameters</a:t>
+              <a:t>Vehicle Sensors</a:t>
             </a:r>
             <a:endParaRPr sz="3000"/>
           </a:p>
@@ -13995,7 +14649,7 @@
         <p:spPr>
           <a:xfrm>
             <a:off x="1297500" y="1567550"/>
-            <a:ext cx="3403200" cy="2911200"/>
+            <a:ext cx="7038900" cy="2911200"/>
           </a:xfrm>
           <a:prstGeom prst="rect">
             <a:avLst/>
@@ -14007,9 +14661,29 @@
           </a:bodyPr>
           <a:lstStyle/>
           <a:p>
+            <a:pPr indent="0" lvl="0" marL="0" rtl="0" algn="l">
+              <a:spcBef>
+                <a:spcPts val="0"/>
+              </a:spcBef>
+              <a:spcAft>
+                <a:spcPts val="0"/>
+              </a:spcAft>
+              <a:buNone/>
+            </a:pPr>
+            <a:r>
+              <a:rPr lang="en" sz="1800"/>
+              <a:t>I</a:t>
+            </a:r>
+            <a:r>
+              <a:rPr lang="en" sz="1800"/>
+              <a:t>mages are converted into greyscale.</a:t>
+            </a:r>
+            <a:endParaRPr sz="1800"/>
+          </a:p>
+          <a:p>
             <a:pPr indent="-342900" lvl="0" marL="457200" rtl="0" algn="l">
               <a:spcBef>
-                <a:spcPts val="0"/>
+                <a:spcPts val="1200"/>
               </a:spcBef>
               <a:spcAft>
                 <a:spcPts val="0"/>
@@ -14019,7 +14693,24 @@
             </a:pPr>
             <a:r>
               <a:rPr lang="en" sz="1800"/>
-              <a:t>all_wheels_on_track</a:t>
+              <a:t>Camera</a:t>
+            </a:r>
+            <a:endParaRPr sz="1800"/>
+          </a:p>
+          <a:p>
+            <a:pPr indent="-342900" lvl="1" marL="914400" rtl="0" algn="l">
+              <a:spcBef>
+                <a:spcPts val="0"/>
+              </a:spcBef>
+              <a:spcAft>
+                <a:spcPts val="0"/>
+              </a:spcAft>
+              <a:buSzPts val="1800"/>
+              <a:buChar char="○"/>
+            </a:pPr>
+            <a:r>
+              <a:rPr lang="en" sz="1800"/>
+              <a:t>lowest cost sensor solution</a:t>
             </a:r>
             <a:endParaRPr sz="1800"/>
           </a:p>
@@ -14036,7 +14727,24 @@
             </a:pPr>
             <a:r>
               <a:rPr lang="en" sz="1800"/>
-              <a:t>closest_objects</a:t>
+              <a:t>Stereo camera</a:t>
+            </a:r>
+            <a:endParaRPr sz="1800"/>
+          </a:p>
+          <a:p>
+            <a:pPr indent="-342900" lvl="1" marL="914400" rtl="0" algn="l">
+              <a:spcBef>
+                <a:spcPts val="0"/>
+              </a:spcBef>
+              <a:spcAft>
+                <a:spcPts val="0"/>
+              </a:spcAft>
+              <a:buSzPts val="1800"/>
+              <a:buChar char="○"/>
+            </a:pPr>
+            <a:r>
+              <a:rPr lang="en" sz="1800"/>
+              <a:t>can generate depth information of objects on track</a:t>
             </a:r>
             <a:endParaRPr sz="1800"/>
           </a:p>
@@ -14053,12 +14761,12 @@
             </a:pPr>
             <a:r>
               <a:rPr lang="en" sz="1800"/>
-              <a:t>distance_from_center</a:t>
+              <a:t>LIDAR sensor</a:t>
             </a:r>
             <a:endParaRPr sz="1800"/>
           </a:p>
           <a:p>
-            <a:pPr indent="-342900" lvl="0" marL="457200" rtl="0" algn="l">
+            <a:pPr indent="-342900" lvl="1" marL="914400" rtl="0" algn="l">
               <a:spcBef>
                 <a:spcPts val="0"/>
               </a:spcBef>
@@ -14066,16 +14774,16 @@
                 <a:spcPts val="0"/>
               </a:spcAft>
               <a:buSzPts val="1800"/>
-              <a:buChar char="●"/>
+              <a:buChar char="○"/>
             </a:pPr>
             <a:r>
               <a:rPr lang="en" sz="1800"/>
-              <a:t>heading</a:t>
+              <a:t>light detection and ranging sensor</a:t>
             </a:r>
             <a:endParaRPr sz="1800"/>
           </a:p>
           <a:p>
-            <a:pPr indent="-342900" lvl="0" marL="457200" rtl="0" algn="l">
+            <a:pPr indent="-342900" lvl="1" marL="914400" rtl="0" algn="l">
               <a:spcBef>
                 <a:spcPts val="0"/>
               </a:spcBef>
@@ -14083,188 +14791,11 @@
                 <a:spcPts val="0"/>
               </a:spcAft>
               <a:buSzPts val="1800"/>
-              <a:buChar char="●"/>
+              <a:buChar char="○"/>
             </a:pPr>
             <a:r>
               <a:rPr lang="en" sz="1800"/>
-              <a:t>is_left_of_center</a:t>
-            </a:r>
-            <a:endParaRPr sz="1800"/>
-          </a:p>
-          <a:p>
-            <a:pPr indent="-342900" lvl="0" marL="457200" rtl="0" algn="l">
-              <a:spcBef>
-                <a:spcPts val="0"/>
-              </a:spcBef>
-              <a:spcAft>
-                <a:spcPts val="0"/>
-              </a:spcAft>
-              <a:buSzPts val="1800"/>
-              <a:buChar char="●"/>
-            </a:pPr>
-            <a:r>
-              <a:rPr lang="en" sz="1800"/>
-              <a:t>is_reversed</a:t>
-            </a:r>
-            <a:endParaRPr sz="1800"/>
-          </a:p>
-          <a:p>
-            <a:pPr indent="-342900" lvl="0" marL="457200" rtl="0" algn="l">
-              <a:spcBef>
-                <a:spcPts val="0"/>
-              </a:spcBef>
-              <a:spcAft>
-                <a:spcPts val="0"/>
-              </a:spcAft>
-              <a:buSzPts val="1800"/>
-              <a:buChar char="●"/>
-            </a:pPr>
-            <a:r>
-              <a:rPr lang="en" sz="1800"/>
-              <a:t>objects_location</a:t>
-            </a:r>
-            <a:endParaRPr sz="1800"/>
-          </a:p>
-        </p:txBody>
-      </p:sp>
-      <p:sp>
-        <p:nvSpPr>
-          <p:cNvPr id="187" name="Google Shape;187;p21"/>
-          <p:cNvSpPr txBox="1"/>
-          <p:nvPr>
-            <p:ph idx="2" type="body"/>
-          </p:nvPr>
-        </p:nvSpPr>
-        <p:spPr>
-          <a:xfrm>
-            <a:off x="4933221" y="1567550"/>
-            <a:ext cx="3403200" cy="2911200"/>
-          </a:xfrm>
-          <a:prstGeom prst="rect">
-            <a:avLst/>
-          </a:prstGeom>
-        </p:spPr>
-        <p:txBody>
-          <a:bodyPr anchorCtr="0" anchor="t" bIns="91425" lIns="91425" spcFirstLastPara="1" rIns="91425" wrap="square" tIns="91425">
-            <a:normAutofit/>
-          </a:bodyPr>
-          <a:lstStyle/>
-          <a:p>
-            <a:pPr indent="-342900" lvl="0" marL="457200" rtl="0" algn="l">
-              <a:spcBef>
-                <a:spcPts val="0"/>
-              </a:spcBef>
-              <a:spcAft>
-                <a:spcPts val="0"/>
-              </a:spcAft>
-              <a:buSzPts val="1800"/>
-              <a:buChar char="●"/>
-            </a:pPr>
-            <a:r>
-              <a:rPr lang="en" sz="1800"/>
-              <a:t>objects_left_of_center</a:t>
-            </a:r>
-            <a:endParaRPr sz="1800"/>
-          </a:p>
-          <a:p>
-            <a:pPr indent="-342900" lvl="0" marL="457200" rtl="0" algn="l">
-              <a:spcBef>
-                <a:spcPts val="0"/>
-              </a:spcBef>
-              <a:spcAft>
-                <a:spcPts val="0"/>
-              </a:spcAft>
-              <a:buSzPts val="1800"/>
-              <a:buChar char="●"/>
-            </a:pPr>
-            <a:r>
-              <a:rPr lang="en" sz="1800"/>
-              <a:t>progress</a:t>
-            </a:r>
-            <a:endParaRPr sz="1800"/>
-          </a:p>
-          <a:p>
-            <a:pPr indent="-342900" lvl="0" marL="457200" rtl="0" algn="l">
-              <a:spcBef>
-                <a:spcPts val="0"/>
-              </a:spcBef>
-              <a:spcAft>
-                <a:spcPts val="0"/>
-              </a:spcAft>
-              <a:buSzPts val="1800"/>
-              <a:buChar char="●"/>
-            </a:pPr>
-            <a:r>
-              <a:rPr lang="en" sz="1800"/>
-              <a:t>steering_angle</a:t>
-            </a:r>
-            <a:endParaRPr sz="1800"/>
-          </a:p>
-          <a:p>
-            <a:pPr indent="-342900" lvl="0" marL="457200" rtl="0" algn="l">
-              <a:spcBef>
-                <a:spcPts val="0"/>
-              </a:spcBef>
-              <a:spcAft>
-                <a:spcPts val="0"/>
-              </a:spcAft>
-              <a:buSzPts val="1800"/>
-              <a:buChar char="●"/>
-            </a:pPr>
-            <a:r>
-              <a:rPr lang="en" sz="1800"/>
-              <a:t>track_width</a:t>
-            </a:r>
-            <a:endParaRPr sz="1800"/>
-          </a:p>
-          <a:p>
-            <a:pPr indent="-342900" lvl="0" marL="457200" rtl="0" algn="l">
-              <a:spcBef>
-                <a:spcPts val="0"/>
-              </a:spcBef>
-              <a:spcAft>
-                <a:spcPts val="0"/>
-              </a:spcAft>
-              <a:buSzPts val="1800"/>
-              <a:buChar char="●"/>
-            </a:pPr>
-            <a:r>
-              <a:rPr lang="en" sz="1800"/>
-              <a:t>waypoints</a:t>
-            </a:r>
-            <a:endParaRPr sz="1800"/>
-          </a:p>
-          <a:p>
-            <a:pPr indent="-342900" lvl="0" marL="457200" rtl="0" algn="l">
-              <a:spcBef>
-                <a:spcPts val="0"/>
-              </a:spcBef>
-              <a:spcAft>
-                <a:spcPts val="0"/>
-              </a:spcAft>
-              <a:buSzPts val="1800"/>
-              <a:buChar char="●"/>
-            </a:pPr>
-            <a:r>
-              <a:rPr lang="en" sz="1800"/>
-              <a:t>x</a:t>
-            </a:r>
-            <a:endParaRPr sz="1800"/>
-          </a:p>
-          <a:p>
-            <a:pPr indent="-342900" lvl="0" marL="457200" rtl="0" algn="l">
-              <a:spcBef>
-                <a:spcPts val="0"/>
-              </a:spcBef>
-              <a:spcAft>
-                <a:spcPts val="0"/>
-              </a:spcAft>
-              <a:buSzPts val="1800"/>
-              <a:buChar char="●"/>
-            </a:pPr>
-            <a:r>
-              <a:rPr lang="en" sz="1800"/>
-              <a:t>y</a:t>
+              <a:t>continuous visibility</a:t>
             </a:r>
             <a:endParaRPr sz="1800"/>
           </a:p>

</xml_diff>

<commit_message>
Update presentation and report from feedback
</commit_message>
<xml_diff>
--- a/AWS DeepRacer Presentation.pptx
+++ b/AWS DeepRacer Presentation.pptx
@@ -2,50 +2,51 @@
 <file path=ppt/presentation.xml><?xml version="1.0" encoding="utf-8"?>
 <p:presentation xmlns:a="http://schemas.openxmlformats.org/drawingml/2006/main" xmlns:r="http://schemas.openxmlformats.org/officeDocument/2006/relationships" xmlns:mc="http://schemas.openxmlformats.org/markup-compatibility/2006" xmlns:mv="urn:schemas-microsoft-com:mac:vml" xmlns:p="http://schemas.openxmlformats.org/presentationml/2006/main" xmlns:c="http://schemas.openxmlformats.org/drawingml/2006/chart" xmlns:dgm="http://schemas.openxmlformats.org/drawingml/2006/diagram" xmlns:o="urn:schemas-microsoft-com:office:office" xmlns:v="urn:schemas-microsoft-com:vml" xmlns:pvml="urn:schemas-microsoft-com:office:powerpoint" xmlns:com="http://schemas.openxmlformats.org/drawingml/2006/compatibility" xmlns:p14="http://schemas.microsoft.com/office/powerpoint/2010/main" xmlns:p15="http://schemas.microsoft.com/office/powerpoint/2012/main" xmlns:ahyp="http://schemas.microsoft.com/office/drawing/2018/hyperlinkcolor" autoCompressPictures="0" embedTrueTypeFonts="1" strictFirstAndLastChars="0" saveSubsetFonts="1">
   <p:sldMasterIdLst>
-    <p:sldMasterId id="2147483659" r:id="rId4"/>
+    <p:sldMasterId id="2147483659" r:id="rId5"/>
   </p:sldMasterIdLst>
   <p:notesMasterIdLst>
-    <p:notesMasterId r:id="rId5"/>
+    <p:notesMasterId r:id="rId6"/>
   </p:notesMasterIdLst>
   <p:sldIdLst>
-    <p:sldId id="256" r:id="rId6"/>
-    <p:sldId id="257" r:id="rId7"/>
-    <p:sldId id="258" r:id="rId8"/>
-    <p:sldId id="259" r:id="rId9"/>
-    <p:sldId id="260" r:id="rId10"/>
-    <p:sldId id="261" r:id="rId11"/>
-    <p:sldId id="262" r:id="rId12"/>
-    <p:sldId id="263" r:id="rId13"/>
-    <p:sldId id="264" r:id="rId14"/>
-    <p:sldId id="265" r:id="rId15"/>
-    <p:sldId id="266" r:id="rId16"/>
-    <p:sldId id="267" r:id="rId17"/>
-    <p:sldId id="268" r:id="rId18"/>
-    <p:sldId id="269" r:id="rId19"/>
-    <p:sldId id="270" r:id="rId20"/>
-    <p:sldId id="271" r:id="rId21"/>
-    <p:sldId id="272" r:id="rId22"/>
-    <p:sldId id="273" r:id="rId23"/>
-    <p:sldId id="274" r:id="rId24"/>
-    <p:sldId id="275" r:id="rId25"/>
-    <p:sldId id="276" r:id="rId26"/>
+    <p:sldId id="256" r:id="rId7"/>
+    <p:sldId id="257" r:id="rId8"/>
+    <p:sldId id="258" r:id="rId9"/>
+    <p:sldId id="259" r:id="rId10"/>
+    <p:sldId id="260" r:id="rId11"/>
+    <p:sldId id="261" r:id="rId12"/>
+    <p:sldId id="262" r:id="rId13"/>
+    <p:sldId id="263" r:id="rId14"/>
+    <p:sldId id="264" r:id="rId15"/>
+    <p:sldId id="265" r:id="rId16"/>
+    <p:sldId id="266" r:id="rId17"/>
+    <p:sldId id="267" r:id="rId18"/>
+    <p:sldId id="268" r:id="rId19"/>
+    <p:sldId id="269" r:id="rId20"/>
+    <p:sldId id="270" r:id="rId21"/>
+    <p:sldId id="271" r:id="rId22"/>
+    <p:sldId id="272" r:id="rId23"/>
+    <p:sldId id="273" r:id="rId24"/>
+    <p:sldId id="274" r:id="rId25"/>
+    <p:sldId id="275" r:id="rId26"/>
+    <p:sldId id="276" r:id="rId27"/>
+    <p:sldId id="277" r:id="rId28"/>
   </p:sldIdLst>
   <p:sldSz cy="5143500" cx="9144000"/>
   <p:notesSz cx="6858000" cy="9144000"/>
   <p:embeddedFontLst>
     <p:embeddedFont>
       <p:font typeface="Montserrat"/>
-      <p:regular r:id="rId27"/>
-      <p:bold r:id="rId28"/>
-      <p:italic r:id="rId29"/>
-      <p:boldItalic r:id="rId30"/>
+      <p:regular r:id="rId29"/>
+      <p:bold r:id="rId30"/>
+      <p:italic r:id="rId31"/>
+      <p:boldItalic r:id="rId32"/>
     </p:embeddedFont>
     <p:embeddedFont>
       <p:font typeface="Lato"/>
-      <p:regular r:id="rId31"/>
-      <p:bold r:id="rId32"/>
-      <p:italic r:id="rId33"/>
-      <p:boldItalic r:id="rId34"/>
+      <p:regular r:id="rId33"/>
+      <p:bold r:id="rId34"/>
+      <p:italic r:id="rId35"/>
+      <p:boldItalic r:id="rId36"/>
     </p:embeddedFont>
   </p:embeddedFontLst>
   <p:defaultTextStyle>
@@ -826,7 +827,7 @@
   <p:cSld>
     <p:spTree>
       <p:nvGrpSpPr>
-        <p:cNvPr id="187" name="Shape 187"/>
+        <p:cNvPr id="189" name="Shape 189"/>
         <p:cNvGrpSpPr/>
         <p:nvPr/>
       </p:nvGrpSpPr>
@@ -840,7 +841,7 @@
       </p:grpSpPr>
       <p:sp>
         <p:nvSpPr>
-          <p:cNvPr id="188" name="Google Shape;188;gec05b96b1f_0_209:notes"/>
+          <p:cNvPr id="190" name="Google Shape;190;gec05b96b1f_0_193:notes"/>
           <p:cNvSpPr/>
           <p:nvPr>
             <p:ph idx="2" type="sldImg"/>
@@ -875,7 +876,7 @@
       </p:sp>
       <p:sp>
         <p:nvSpPr>
-          <p:cNvPr id="189" name="Google Shape;189;gec05b96b1f_0_209:notes"/>
+          <p:cNvPr id="191" name="Google Shape;191;gec05b96b1f_0_193:notes"/>
           <p:cNvSpPr txBox="1"/>
           <p:nvPr>
             <p:ph idx="1" type="body"/>
@@ -925,7 +926,7 @@
   <p:cSld>
     <p:spTree>
       <p:nvGrpSpPr>
-        <p:cNvPr id="193" name="Shape 193"/>
+        <p:cNvPr id="195" name="Shape 195"/>
         <p:cNvGrpSpPr/>
         <p:nvPr/>
       </p:nvGrpSpPr>
@@ -939,7 +940,7 @@
       </p:grpSpPr>
       <p:sp>
         <p:nvSpPr>
-          <p:cNvPr id="194" name="Google Shape;194;gec05b96b1f_0_220:notes"/>
+          <p:cNvPr id="196" name="Google Shape;196;gec05b96b1f_0_209:notes"/>
           <p:cNvSpPr/>
           <p:nvPr>
             <p:ph idx="2" type="sldImg"/>
@@ -974,7 +975,7 @@
       </p:sp>
       <p:sp>
         <p:nvSpPr>
-          <p:cNvPr id="195" name="Google Shape;195;gec05b96b1f_0_220:notes"/>
+          <p:cNvPr id="197" name="Google Shape;197;gec05b96b1f_0_209:notes"/>
           <p:cNvSpPr txBox="1"/>
           <p:nvPr>
             <p:ph idx="1" type="body"/>
@@ -1024,7 +1025,7 @@
   <p:cSld>
     <p:spTree>
       <p:nvGrpSpPr>
-        <p:cNvPr id="200" name="Shape 200"/>
+        <p:cNvPr id="201" name="Shape 201"/>
         <p:cNvGrpSpPr/>
         <p:nvPr/>
       </p:nvGrpSpPr>
@@ -1038,7 +1039,7 @@
       </p:grpSpPr>
       <p:sp>
         <p:nvSpPr>
-          <p:cNvPr id="201" name="Google Shape;201;gec05b96b1f_0_152:notes"/>
+          <p:cNvPr id="202" name="Google Shape;202;gec05b96b1f_0_220:notes"/>
           <p:cNvSpPr/>
           <p:nvPr>
             <p:ph idx="2" type="sldImg"/>
@@ -1073,7 +1074,7 @@
       </p:sp>
       <p:sp>
         <p:nvSpPr>
-          <p:cNvPr id="202" name="Google Shape;202;gec05b96b1f_0_152:notes"/>
+          <p:cNvPr id="203" name="Google Shape;203;gec05b96b1f_0_220:notes"/>
           <p:cNvSpPr txBox="1"/>
           <p:nvPr>
             <p:ph idx="1" type="body"/>
@@ -1123,7 +1124,7 @@
   <p:cSld>
     <p:spTree>
       <p:nvGrpSpPr>
-        <p:cNvPr id="206" name="Shape 206"/>
+        <p:cNvPr id="208" name="Shape 208"/>
         <p:cNvGrpSpPr/>
         <p:nvPr/>
       </p:nvGrpSpPr>
@@ -1137,7 +1138,7 @@
       </p:grpSpPr>
       <p:sp>
         <p:nvSpPr>
-          <p:cNvPr id="207" name="Google Shape;207;gec05b96b1f_0_158:notes"/>
+          <p:cNvPr id="209" name="Google Shape;209;gec05b96b1f_0_152:notes"/>
           <p:cNvSpPr/>
           <p:nvPr>
             <p:ph idx="2" type="sldImg"/>
@@ -1172,7 +1173,7 @@
       </p:sp>
       <p:sp>
         <p:nvSpPr>
-          <p:cNvPr id="208" name="Google Shape;208;gec05b96b1f_0_158:notes"/>
+          <p:cNvPr id="210" name="Google Shape;210;gec05b96b1f_0_152:notes"/>
           <p:cNvSpPr txBox="1"/>
           <p:nvPr>
             <p:ph idx="1" type="body"/>
@@ -1236,7 +1237,7 @@
       </p:grpSpPr>
       <p:sp>
         <p:nvSpPr>
-          <p:cNvPr id="215" name="Google Shape;215;gec05b96b1f_0_174:notes"/>
+          <p:cNvPr id="215" name="Google Shape;215;gec05b96b1f_0_158:notes"/>
           <p:cNvSpPr/>
           <p:nvPr>
             <p:ph idx="2" type="sldImg"/>
@@ -1271,7 +1272,7 @@
       </p:sp>
       <p:sp>
         <p:nvSpPr>
-          <p:cNvPr id="216" name="Google Shape;216;gec05b96b1f_0_174:notes"/>
+          <p:cNvPr id="216" name="Google Shape;216;gec05b96b1f_0_158:notes"/>
           <p:cNvSpPr txBox="1"/>
           <p:nvPr>
             <p:ph idx="1" type="body"/>
@@ -1335,7 +1336,7 @@
       </p:grpSpPr>
       <p:sp>
         <p:nvSpPr>
-          <p:cNvPr id="223" name="Google Shape;223;gec05b96b1f_0_182:notes"/>
+          <p:cNvPr id="223" name="Google Shape;223;gec05b96b1f_0_174:notes"/>
           <p:cNvSpPr/>
           <p:nvPr>
             <p:ph idx="2" type="sldImg"/>
@@ -1370,7 +1371,7 @@
       </p:sp>
       <p:sp>
         <p:nvSpPr>
-          <p:cNvPr id="224" name="Google Shape;224;gec05b96b1f_0_182:notes"/>
+          <p:cNvPr id="224" name="Google Shape;224;gec05b96b1f_0_174:notes"/>
           <p:cNvSpPr txBox="1"/>
           <p:nvPr>
             <p:ph idx="1" type="body"/>
@@ -1434,7 +1435,7 @@
       </p:grpSpPr>
       <p:sp>
         <p:nvSpPr>
-          <p:cNvPr id="231" name="Google Shape;231;gec05b96b1f_0_243:notes"/>
+          <p:cNvPr id="231" name="Google Shape;231;gec05b96b1f_0_182:notes"/>
           <p:cNvSpPr/>
           <p:nvPr>
             <p:ph idx="2" type="sldImg"/>
@@ -1469,7 +1470,7 @@
       </p:sp>
       <p:sp>
         <p:nvSpPr>
-          <p:cNvPr id="232" name="Google Shape;232;gec05b96b1f_0_243:notes"/>
+          <p:cNvPr id="232" name="Google Shape;232;gec05b96b1f_0_182:notes"/>
           <p:cNvSpPr txBox="1"/>
           <p:nvPr>
             <p:ph idx="1" type="body"/>
@@ -1519,7 +1520,7 @@
   <p:cSld>
     <p:spTree>
       <p:nvGrpSpPr>
-        <p:cNvPr id="237" name="Shape 237"/>
+        <p:cNvPr id="238" name="Shape 238"/>
         <p:cNvGrpSpPr/>
         <p:nvPr/>
       </p:nvGrpSpPr>
@@ -1533,7 +1534,7 @@
       </p:grpSpPr>
       <p:sp>
         <p:nvSpPr>
-          <p:cNvPr id="238" name="Google Shape;238;gec05b96b1f_0_146:notes"/>
+          <p:cNvPr id="239" name="Google Shape;239;gec05b96b1f_0_165:notes"/>
           <p:cNvSpPr/>
           <p:nvPr>
             <p:ph idx="2" type="sldImg"/>
@@ -1568,7 +1569,7 @@
       </p:sp>
       <p:sp>
         <p:nvSpPr>
-          <p:cNvPr id="239" name="Google Shape;239;gec05b96b1f_0_146:notes"/>
+          <p:cNvPr id="240" name="Google Shape;240;gec05b96b1f_0_165:notes"/>
           <p:cNvSpPr txBox="1"/>
           <p:nvPr>
             <p:ph idx="1" type="body"/>
@@ -1618,7 +1619,7 @@
   <p:cSld>
     <p:spTree>
       <p:nvGrpSpPr>
-        <p:cNvPr id="243" name="Shape 243"/>
+        <p:cNvPr id="245" name="Shape 245"/>
         <p:cNvGrpSpPr/>
         <p:nvPr/>
       </p:nvGrpSpPr>
@@ -1632,7 +1633,7 @@
       </p:grpSpPr>
       <p:sp>
         <p:nvSpPr>
-          <p:cNvPr id="244" name="Google Shape;244;gec05b96b1f_0_165:notes"/>
+          <p:cNvPr id="246" name="Google Shape;246;gec05b96b1f_0_146:notes"/>
           <p:cNvSpPr/>
           <p:nvPr>
             <p:ph idx="2" type="sldImg"/>
@@ -1667,7 +1668,7 @@
       </p:sp>
       <p:sp>
         <p:nvSpPr>
-          <p:cNvPr id="245" name="Google Shape;245;gec05b96b1f_0_165:notes"/>
+          <p:cNvPr id="247" name="Google Shape;247;gec05b96b1f_0_146:notes"/>
           <p:cNvSpPr txBox="1"/>
           <p:nvPr>
             <p:ph idx="1" type="body"/>
@@ -1717,7 +1718,7 @@
   <p:cSld>
     <p:spTree>
       <p:nvGrpSpPr>
-        <p:cNvPr id="250" name="Shape 250"/>
+        <p:cNvPr id="252" name="Shape 252"/>
         <p:cNvGrpSpPr/>
         <p:nvPr/>
       </p:nvGrpSpPr>
@@ -1731,7 +1732,7 @@
       </p:grpSpPr>
       <p:sp>
         <p:nvSpPr>
-          <p:cNvPr id="251" name="Google Shape;251;gec05b96b1f_0_130:notes"/>
+          <p:cNvPr id="253" name="Google Shape;253;gf0d84514ff_0_3:notes"/>
           <p:cNvSpPr/>
           <p:nvPr>
             <p:ph idx="2" type="sldImg"/>
@@ -1766,7 +1767,7 @@
       </p:sp>
       <p:sp>
         <p:nvSpPr>
-          <p:cNvPr id="252" name="Google Shape;252;gec05b96b1f_0_130:notes"/>
+          <p:cNvPr id="254" name="Google Shape;254;gf0d84514ff_0_3:notes"/>
           <p:cNvSpPr txBox="1"/>
           <p:nvPr>
             <p:ph idx="1" type="body"/>
@@ -1915,7 +1916,7 @@
   <p:cSld>
     <p:spTree>
       <p:nvGrpSpPr>
-        <p:cNvPr id="256" name="Shape 256"/>
+        <p:cNvPr id="258" name="Shape 258"/>
         <p:cNvGrpSpPr/>
         <p:nvPr/>
       </p:nvGrpSpPr>
@@ -1929,7 +1930,7 @@
       </p:grpSpPr>
       <p:sp>
         <p:nvSpPr>
-          <p:cNvPr id="257" name="Google Shape;257;gec05b96b1f_0_135:notes"/>
+          <p:cNvPr id="259" name="Google Shape;259;gec05b96b1f_0_130:notes"/>
           <p:cNvSpPr/>
           <p:nvPr>
             <p:ph idx="2" type="sldImg"/>
@@ -1964,7 +1965,7 @@
       </p:sp>
       <p:sp>
         <p:nvSpPr>
-          <p:cNvPr id="258" name="Google Shape;258;gec05b96b1f_0_135:notes"/>
+          <p:cNvPr id="260" name="Google Shape;260;gec05b96b1f_0_130:notes"/>
           <p:cNvSpPr txBox="1"/>
           <p:nvPr>
             <p:ph idx="1" type="body"/>
@@ -2014,7 +2015,7 @@
   <p:cSld>
     <p:spTree>
       <p:nvGrpSpPr>
-        <p:cNvPr id="262" name="Shape 262"/>
+        <p:cNvPr id="264" name="Shape 264"/>
         <p:cNvGrpSpPr/>
         <p:nvPr/>
       </p:nvGrpSpPr>
@@ -2028,7 +2029,7 @@
       </p:grpSpPr>
       <p:sp>
         <p:nvSpPr>
-          <p:cNvPr id="263" name="Google Shape;263;gec05b96b1f_0_199:notes"/>
+          <p:cNvPr id="265" name="Google Shape;265;gec05b96b1f_0_135:notes"/>
           <p:cNvSpPr/>
           <p:nvPr>
             <p:ph idx="2" type="sldImg"/>
@@ -2063,7 +2064,106 @@
       </p:sp>
       <p:sp>
         <p:nvSpPr>
-          <p:cNvPr id="264" name="Google Shape;264;gec05b96b1f_0_199:notes"/>
+          <p:cNvPr id="266" name="Google Shape;266;gec05b96b1f_0_135:notes"/>
+          <p:cNvSpPr txBox="1"/>
+          <p:nvPr>
+            <p:ph idx="1" type="body"/>
+          </p:nvPr>
+        </p:nvSpPr>
+        <p:spPr>
+          <a:xfrm>
+            <a:off x="685800" y="4343400"/>
+            <a:ext cx="5486400" cy="4114800"/>
+          </a:xfrm>
+          <a:prstGeom prst="rect">
+            <a:avLst/>
+          </a:prstGeom>
+        </p:spPr>
+        <p:txBody>
+          <a:bodyPr anchorCtr="0" anchor="t" bIns="91425" lIns="91425" spcFirstLastPara="1" rIns="91425" wrap="square" tIns="91425">
+            <a:noAutofit/>
+          </a:bodyPr>
+          <a:lstStyle/>
+          <a:p>
+            <a:pPr indent="0" lvl="0" marL="0" rtl="0" algn="l">
+              <a:spcBef>
+                <a:spcPts val="0"/>
+              </a:spcBef>
+              <a:spcAft>
+                <a:spcPts val="0"/>
+              </a:spcAft>
+              <a:buNone/>
+            </a:pPr>
+            <a:r>
+              <a:t/>
+            </a:r>
+            <a:endParaRPr/>
+          </a:p>
+        </p:txBody>
+      </p:sp>
+    </p:spTree>
+  </p:cSld>
+  <p:clrMapOvr>
+    <a:masterClrMapping/>
+  </p:clrMapOvr>
+</p:notes>
+</file>
+
+<file path=ppt/notesSlides/notesSlide22.xml><?xml version="1.0" encoding="utf-8"?>
+<p:notes xmlns:a="http://schemas.openxmlformats.org/drawingml/2006/main" xmlns:r="http://schemas.openxmlformats.org/officeDocument/2006/relationships" xmlns:mc="http://schemas.openxmlformats.org/markup-compatibility/2006" xmlns:mv="urn:schemas-microsoft-com:mac:vml" xmlns:p="http://schemas.openxmlformats.org/presentationml/2006/main" xmlns:c="http://schemas.openxmlformats.org/drawingml/2006/chart" xmlns:dgm="http://schemas.openxmlformats.org/drawingml/2006/diagram" xmlns:o="urn:schemas-microsoft-com:office:office" xmlns:v="urn:schemas-microsoft-com:vml" xmlns:pvml="urn:schemas-microsoft-com:office:powerpoint" xmlns:com="http://schemas.openxmlformats.org/drawingml/2006/compatibility" xmlns:p14="http://schemas.microsoft.com/office/powerpoint/2010/main" xmlns:p15="http://schemas.microsoft.com/office/powerpoint/2012/main" xmlns:ahyp="http://schemas.microsoft.com/office/drawing/2018/hyperlinkcolor" showMasterPhAnim="0" showMasterSp="0">
+  <p:cSld>
+    <p:spTree>
+      <p:nvGrpSpPr>
+        <p:cNvPr id="270" name="Shape 270"/>
+        <p:cNvGrpSpPr/>
+        <p:nvPr/>
+      </p:nvGrpSpPr>
+      <p:grpSpPr>
+        <a:xfrm>
+          <a:off x="0" y="0"/>
+          <a:ext cx="0" cy="0"/>
+          <a:chOff x="0" y="0"/>
+          <a:chExt cx="0" cy="0"/>
+        </a:xfrm>
+      </p:grpSpPr>
+      <p:sp>
+        <p:nvSpPr>
+          <p:cNvPr id="271" name="Google Shape;271;gec05b96b1f_0_199:notes"/>
+          <p:cNvSpPr/>
+          <p:nvPr>
+            <p:ph idx="2" type="sldImg"/>
+          </p:nvPr>
+        </p:nvSpPr>
+        <p:spPr>
+          <a:xfrm>
+            <a:off x="381300" y="685800"/>
+            <a:ext cx="6096000" cy="3429000"/>
+          </a:xfrm>
+          <a:custGeom>
+            <a:rect b="b" l="l" r="r" t="t"/>
+            <a:pathLst>
+              <a:path extrusionOk="0" h="120000" w="120000">
+                <a:moveTo>
+                  <a:pt x="0" y="0"/>
+                </a:moveTo>
+                <a:lnTo>
+                  <a:pt x="120000" y="0"/>
+                </a:lnTo>
+                <a:lnTo>
+                  <a:pt x="120000" y="120000"/>
+                </a:lnTo>
+                <a:lnTo>
+                  <a:pt x="0" y="120000"/>
+                </a:lnTo>
+                <a:close/>
+              </a:path>
+            </a:pathLst>
+          </a:custGeom>
+        </p:spPr>
+      </p:sp>
+      <p:sp>
+        <p:nvSpPr>
+          <p:cNvPr id="272" name="Google Shape;272;gec05b96b1f_0_199:notes"/>
           <p:cNvSpPr txBox="1"/>
           <p:nvPr>
             <p:ph idx="1" type="body"/>
@@ -2424,7 +2524,7 @@
       </p:grpSpPr>
       <p:sp>
         <p:nvSpPr>
-          <p:cNvPr id="162" name="Google Shape;162;gec05b96b1f_0_204:notes"/>
+          <p:cNvPr id="162" name="Google Shape;162;gec05b96b1f_0_243:notes"/>
           <p:cNvSpPr/>
           <p:nvPr>
             <p:ph idx="2" type="sldImg"/>
@@ -2459,7 +2559,7 @@
       </p:sp>
       <p:sp>
         <p:nvSpPr>
-          <p:cNvPr id="163" name="Google Shape;163;gec05b96b1f_0_204:notes"/>
+          <p:cNvPr id="163" name="Google Shape;163;gec05b96b1f_0_243:notes"/>
           <p:cNvSpPr txBox="1"/>
           <p:nvPr>
             <p:ph idx="1" type="body"/>
@@ -2509,7 +2609,7 @@
   <p:cSld>
     <p:spTree>
       <p:nvGrpSpPr>
-        <p:cNvPr id="167" name="Shape 167"/>
+        <p:cNvPr id="168" name="Shape 168"/>
         <p:cNvGrpSpPr/>
         <p:nvPr/>
       </p:nvGrpSpPr>
@@ -2523,7 +2623,7 @@
       </p:grpSpPr>
       <p:sp>
         <p:nvSpPr>
-          <p:cNvPr id="168" name="Google Shape;168;gec05b96b1f_0_228:notes"/>
+          <p:cNvPr id="169" name="Google Shape;169;gec05b96b1f_0_204:notes"/>
           <p:cNvSpPr/>
           <p:nvPr>
             <p:ph idx="2" type="sldImg"/>
@@ -2558,7 +2658,7 @@
       </p:sp>
       <p:sp>
         <p:nvSpPr>
-          <p:cNvPr id="169" name="Google Shape;169;gec05b96b1f_0_228:notes"/>
+          <p:cNvPr id="170" name="Google Shape;170;gec05b96b1f_0_204:notes"/>
           <p:cNvSpPr txBox="1"/>
           <p:nvPr>
             <p:ph idx="1" type="body"/>
@@ -2622,7 +2722,7 @@
       </p:grpSpPr>
       <p:sp>
         <p:nvSpPr>
-          <p:cNvPr id="175" name="Google Shape;175;gec05b96b1f_0_214:notes"/>
+          <p:cNvPr id="175" name="Google Shape;175;gec05b96b1f_0_228:notes"/>
           <p:cNvSpPr/>
           <p:nvPr>
             <p:ph idx="2" type="sldImg"/>
@@ -2657,7 +2757,7 @@
       </p:sp>
       <p:sp>
         <p:nvSpPr>
-          <p:cNvPr id="176" name="Google Shape;176;gec05b96b1f_0_214:notes"/>
+          <p:cNvPr id="176" name="Google Shape;176;gec05b96b1f_0_228:notes"/>
           <p:cNvSpPr txBox="1"/>
           <p:nvPr>
             <p:ph idx="1" type="body"/>
@@ -2721,7 +2821,7 @@
       </p:grpSpPr>
       <p:sp>
         <p:nvSpPr>
-          <p:cNvPr id="182" name="Google Shape;182;gec05b96b1f_0_193:notes"/>
+          <p:cNvPr id="182" name="Google Shape;182;gec05b96b1f_0_214:notes"/>
           <p:cNvSpPr/>
           <p:nvPr>
             <p:ph idx="2" type="sldImg"/>
@@ -2756,7 +2856,7 @@
       </p:sp>
       <p:sp>
         <p:nvSpPr>
-          <p:cNvPr id="183" name="Google Shape;183;gec05b96b1f_0_193:notes"/>
+          <p:cNvPr id="183" name="Google Shape;183;gec05b96b1f_0_214:notes"/>
           <p:cNvSpPr txBox="1"/>
           <p:nvPr>
             <p:ph idx="1" type="body"/>
@@ -11110,7 +11210,7 @@
   <p:cSld>
     <p:spTree>
       <p:nvGrpSpPr>
-        <p:cNvPr id="190" name="Shape 190"/>
+        <p:cNvPr id="192" name="Shape 192"/>
         <p:cNvGrpSpPr/>
         <p:nvPr/>
       </p:nvGrpSpPr>
@@ -11124,7 +11224,7 @@
       </p:grpSpPr>
       <p:sp>
         <p:nvSpPr>
-          <p:cNvPr id="191" name="Google Shape;191;p22"/>
+          <p:cNvPr id="193" name="Google Shape;193;p22"/>
           <p:cNvSpPr txBox="1"/>
           <p:nvPr>
             <p:ph type="title"/>
@@ -11156,6 +11256,234 @@
             </a:pPr>
             <a:r>
               <a:rPr lang="en" sz="3000"/>
+              <a:t>Vehicle Sensors</a:t>
+            </a:r>
+            <a:endParaRPr sz="3000"/>
+          </a:p>
+        </p:txBody>
+      </p:sp>
+      <p:sp>
+        <p:nvSpPr>
+          <p:cNvPr id="194" name="Google Shape;194;p22"/>
+          <p:cNvSpPr txBox="1"/>
+          <p:nvPr>
+            <p:ph idx="1" type="body"/>
+          </p:nvPr>
+        </p:nvSpPr>
+        <p:spPr>
+          <a:xfrm>
+            <a:off x="1297500" y="1264125"/>
+            <a:ext cx="7038900" cy="2911200"/>
+          </a:xfrm>
+          <a:prstGeom prst="rect">
+            <a:avLst/>
+          </a:prstGeom>
+        </p:spPr>
+        <p:txBody>
+          <a:bodyPr anchorCtr="0" anchor="t" bIns="91425" lIns="91425" spcFirstLastPara="1" rIns="91425" wrap="square" tIns="91425">
+            <a:normAutofit/>
+          </a:bodyPr>
+          <a:lstStyle/>
+          <a:p>
+            <a:pPr indent="0" lvl="0" marL="0" rtl="0" algn="l">
+              <a:spcBef>
+                <a:spcPts val="0"/>
+              </a:spcBef>
+              <a:spcAft>
+                <a:spcPts val="0"/>
+              </a:spcAft>
+              <a:buNone/>
+            </a:pPr>
+            <a:r>
+              <a:rPr lang="en" sz="1800"/>
+              <a:t>I</a:t>
+            </a:r>
+            <a:r>
+              <a:rPr lang="en" sz="1800"/>
+              <a:t>mages are converted into grayscale.</a:t>
+            </a:r>
+            <a:endParaRPr sz="1800"/>
+          </a:p>
+          <a:p>
+            <a:pPr indent="-342900" lvl="0" marL="457200" rtl="0" algn="l">
+              <a:spcBef>
+                <a:spcPts val="1200"/>
+              </a:spcBef>
+              <a:spcAft>
+                <a:spcPts val="0"/>
+              </a:spcAft>
+              <a:buSzPts val="1800"/>
+              <a:buChar char="●"/>
+            </a:pPr>
+            <a:r>
+              <a:rPr lang="en" sz="1800"/>
+              <a:t>Camera</a:t>
+            </a:r>
+            <a:endParaRPr sz="1800"/>
+          </a:p>
+          <a:p>
+            <a:pPr indent="-342900" lvl="1" marL="914400" rtl="0" algn="l">
+              <a:spcBef>
+                <a:spcPts val="0"/>
+              </a:spcBef>
+              <a:spcAft>
+                <a:spcPts val="0"/>
+              </a:spcAft>
+              <a:buSzPts val="1800"/>
+              <a:buChar char="○"/>
+            </a:pPr>
+            <a:r>
+              <a:rPr lang="en" sz="1800"/>
+              <a:t>lowest cost sensor solution</a:t>
+            </a:r>
+            <a:endParaRPr sz="1800"/>
+          </a:p>
+          <a:p>
+            <a:pPr indent="-342900" lvl="0" marL="457200" rtl="0" algn="l">
+              <a:spcBef>
+                <a:spcPts val="0"/>
+              </a:spcBef>
+              <a:spcAft>
+                <a:spcPts val="0"/>
+              </a:spcAft>
+              <a:buSzPts val="1800"/>
+              <a:buChar char="●"/>
+            </a:pPr>
+            <a:r>
+              <a:rPr lang="en" sz="1800"/>
+              <a:t>Stereo camera</a:t>
+            </a:r>
+            <a:endParaRPr sz="1800"/>
+          </a:p>
+          <a:p>
+            <a:pPr indent="-342900" lvl="1" marL="914400" rtl="0" algn="l">
+              <a:spcBef>
+                <a:spcPts val="0"/>
+              </a:spcBef>
+              <a:spcAft>
+                <a:spcPts val="0"/>
+              </a:spcAft>
+              <a:buSzPts val="1800"/>
+              <a:buChar char="○"/>
+            </a:pPr>
+            <a:r>
+              <a:rPr lang="en" sz="1800"/>
+              <a:t>can generate depth information of objects on track</a:t>
+            </a:r>
+            <a:endParaRPr sz="1800"/>
+          </a:p>
+          <a:p>
+            <a:pPr indent="-342900" lvl="0" marL="457200" rtl="0" algn="l">
+              <a:spcBef>
+                <a:spcPts val="0"/>
+              </a:spcBef>
+              <a:spcAft>
+                <a:spcPts val="0"/>
+              </a:spcAft>
+              <a:buSzPts val="1800"/>
+              <a:buChar char="●"/>
+            </a:pPr>
+            <a:r>
+              <a:rPr lang="en" sz="1800"/>
+              <a:t>LIDAR sensor</a:t>
+            </a:r>
+            <a:endParaRPr sz="1800"/>
+          </a:p>
+          <a:p>
+            <a:pPr indent="-342900" lvl="1" marL="914400" rtl="0" algn="l">
+              <a:spcBef>
+                <a:spcPts val="0"/>
+              </a:spcBef>
+              <a:spcAft>
+                <a:spcPts val="0"/>
+              </a:spcAft>
+              <a:buSzPts val="1800"/>
+              <a:buChar char="○"/>
+            </a:pPr>
+            <a:r>
+              <a:rPr lang="en" sz="1800"/>
+              <a:t>light detection and ranging sensor</a:t>
+            </a:r>
+            <a:endParaRPr sz="1800"/>
+          </a:p>
+          <a:p>
+            <a:pPr indent="-342900" lvl="1" marL="914400" rtl="0" algn="l">
+              <a:spcBef>
+                <a:spcPts val="0"/>
+              </a:spcBef>
+              <a:spcAft>
+                <a:spcPts val="0"/>
+              </a:spcAft>
+              <a:buSzPts val="1800"/>
+              <a:buChar char="○"/>
+            </a:pPr>
+            <a:r>
+              <a:rPr lang="en" sz="1800"/>
+              <a:t>continuous visibility</a:t>
+            </a:r>
+            <a:endParaRPr sz="1800"/>
+          </a:p>
+        </p:txBody>
+      </p:sp>
+    </p:spTree>
+  </p:cSld>
+  <p:clrMapOvr>
+    <a:masterClrMapping/>
+  </p:clrMapOvr>
+</p:sld>
+</file>
+
+<file path=ppt/slides/slide11.xml><?xml version="1.0" encoding="utf-8"?>
+<p:sld xmlns:a="http://schemas.openxmlformats.org/drawingml/2006/main" xmlns:r="http://schemas.openxmlformats.org/officeDocument/2006/relationships" xmlns:mc="http://schemas.openxmlformats.org/markup-compatibility/2006" xmlns:mv="urn:schemas-microsoft-com:mac:vml" xmlns:p="http://schemas.openxmlformats.org/presentationml/2006/main" xmlns:c="http://schemas.openxmlformats.org/drawingml/2006/chart" xmlns:dgm="http://schemas.openxmlformats.org/drawingml/2006/diagram" xmlns:o="urn:schemas-microsoft-com:office:office" xmlns:v="urn:schemas-microsoft-com:vml" xmlns:pvml="urn:schemas-microsoft-com:office:powerpoint" xmlns:com="http://schemas.openxmlformats.org/drawingml/2006/compatibility" xmlns:p14="http://schemas.microsoft.com/office/powerpoint/2010/main" xmlns:p15="http://schemas.microsoft.com/office/powerpoint/2012/main" xmlns:ahyp="http://schemas.microsoft.com/office/drawing/2018/hyperlinkcolor">
+  <p:cSld>
+    <p:spTree>
+      <p:nvGrpSpPr>
+        <p:cNvPr id="198" name="Shape 198"/>
+        <p:cNvGrpSpPr/>
+        <p:nvPr/>
+      </p:nvGrpSpPr>
+      <p:grpSpPr>
+        <a:xfrm>
+          <a:off x="0" y="0"/>
+          <a:ext cx="0" cy="0"/>
+          <a:chOff x="0" y="0"/>
+          <a:chExt cx="0" cy="0"/>
+        </a:xfrm>
+      </p:grpSpPr>
+      <p:sp>
+        <p:nvSpPr>
+          <p:cNvPr id="199" name="Google Shape;199;p23"/>
+          <p:cNvSpPr txBox="1"/>
+          <p:nvPr>
+            <p:ph type="title"/>
+          </p:nvPr>
+        </p:nvSpPr>
+        <p:spPr>
+          <a:xfrm>
+            <a:off x="1297500" y="393750"/>
+            <a:ext cx="7038900" cy="914100"/>
+          </a:xfrm>
+          <a:prstGeom prst="rect">
+            <a:avLst/>
+          </a:prstGeom>
+        </p:spPr>
+        <p:txBody>
+          <a:bodyPr anchorCtr="0" anchor="t" bIns="91425" lIns="91425" spcFirstLastPara="1" rIns="91425" wrap="square" tIns="91425">
+            <a:normAutofit/>
+          </a:bodyPr>
+          <a:lstStyle/>
+          <a:p>
+            <a:pPr indent="0" lvl="0" marL="0" rtl="0" algn="l">
+              <a:spcBef>
+                <a:spcPts val="0"/>
+              </a:spcBef>
+              <a:spcAft>
+                <a:spcPts val="0"/>
+              </a:spcAft>
+              <a:buNone/>
+            </a:pPr>
+            <a:r>
+              <a:rPr lang="en" sz="3000"/>
               <a:t>Reward Functions</a:t>
             </a:r>
             <a:endParaRPr sz="3000"/>
@@ -11164,7 +11492,7 @@
       </p:sp>
       <p:sp>
         <p:nvSpPr>
-          <p:cNvPr id="192" name="Google Shape;192;p22"/>
+          <p:cNvPr id="200" name="Google Shape;200;p23"/>
           <p:cNvSpPr txBox="1"/>
           <p:nvPr>
             <p:ph idx="1" type="body"/>
@@ -11197,6 +11525,23 @@
             </a:pPr>
             <a:r>
               <a:rPr lang="en" sz="1800"/>
+              <a:t>Used to incentivize car (agent) to take specific actions as it explores the track (environment).</a:t>
+            </a:r>
+            <a:endParaRPr sz="1800"/>
+          </a:p>
+          <a:p>
+            <a:pPr indent="-342900" lvl="0" marL="457200" rtl="0" algn="l">
+              <a:spcBef>
+                <a:spcPts val="0"/>
+              </a:spcBef>
+              <a:spcAft>
+                <a:spcPts val="0"/>
+              </a:spcAft>
+              <a:buSzPts val="1800"/>
+              <a:buChar char="●"/>
+            </a:pPr>
+            <a:r>
+              <a:rPr lang="en" sz="1800"/>
               <a:t>Lambda functions written in Python</a:t>
             </a:r>
             <a:endParaRPr sz="1800"/>
@@ -11245,12 +11590,12 @@
 </p:sld>
 </file>
 
-<file path=ppt/slides/slide11.xml><?xml version="1.0" encoding="utf-8"?>
+<file path=ppt/slides/slide12.xml><?xml version="1.0" encoding="utf-8"?>
 <p:sld xmlns:a="http://schemas.openxmlformats.org/drawingml/2006/main" xmlns:r="http://schemas.openxmlformats.org/officeDocument/2006/relationships" xmlns:mc="http://schemas.openxmlformats.org/markup-compatibility/2006" xmlns:mv="urn:schemas-microsoft-com:mac:vml" xmlns:p="http://schemas.openxmlformats.org/presentationml/2006/main" xmlns:c="http://schemas.openxmlformats.org/drawingml/2006/chart" xmlns:dgm="http://schemas.openxmlformats.org/drawingml/2006/diagram" xmlns:o="urn:schemas-microsoft-com:office:office" xmlns:v="urn:schemas-microsoft-com:vml" xmlns:pvml="urn:schemas-microsoft-com:office:powerpoint" xmlns:com="http://schemas.openxmlformats.org/drawingml/2006/compatibility" xmlns:p14="http://schemas.microsoft.com/office/powerpoint/2010/main" xmlns:p15="http://schemas.microsoft.com/office/powerpoint/2012/main" xmlns:ahyp="http://schemas.microsoft.com/office/drawing/2018/hyperlinkcolor">
   <p:cSld>
     <p:spTree>
       <p:nvGrpSpPr>
-        <p:cNvPr id="196" name="Shape 196"/>
+        <p:cNvPr id="204" name="Shape 204"/>
         <p:cNvGrpSpPr/>
         <p:nvPr/>
       </p:nvGrpSpPr>
@@ -11264,7 +11609,7 @@
       </p:grpSpPr>
       <p:sp>
         <p:nvSpPr>
-          <p:cNvPr id="197" name="Google Shape;197;p23"/>
+          <p:cNvPr id="205" name="Google Shape;205;p24"/>
           <p:cNvSpPr txBox="1"/>
           <p:nvPr>
             <p:ph type="title"/>
@@ -11304,7 +11649,7 @@
       </p:sp>
       <p:sp>
         <p:nvSpPr>
-          <p:cNvPr id="198" name="Google Shape;198;p23"/>
+          <p:cNvPr id="206" name="Google Shape;206;p24"/>
           <p:cNvSpPr txBox="1"/>
           <p:nvPr>
             <p:ph idx="1" type="body"/>
@@ -11447,7 +11792,7 @@
       </p:sp>
       <p:sp>
         <p:nvSpPr>
-          <p:cNvPr id="199" name="Google Shape;199;p23"/>
+          <p:cNvPr id="207" name="Google Shape;207;p24"/>
           <p:cNvSpPr txBox="1"/>
           <p:nvPr>
             <p:ph idx="2" type="body"/>
@@ -11596,12 +11941,12 @@
 </p:sld>
 </file>
 
-<file path=ppt/slides/slide12.xml><?xml version="1.0" encoding="utf-8"?>
+<file path=ppt/slides/slide13.xml><?xml version="1.0" encoding="utf-8"?>
 <p:sld xmlns:a="http://schemas.openxmlformats.org/drawingml/2006/main" xmlns:r="http://schemas.openxmlformats.org/officeDocument/2006/relationships" xmlns:mc="http://schemas.openxmlformats.org/markup-compatibility/2006" xmlns:mv="urn:schemas-microsoft-com:mac:vml" xmlns:p="http://schemas.openxmlformats.org/presentationml/2006/main" xmlns:c="http://schemas.openxmlformats.org/drawingml/2006/chart" xmlns:dgm="http://schemas.openxmlformats.org/drawingml/2006/diagram" xmlns:o="urn:schemas-microsoft-com:office:office" xmlns:v="urn:schemas-microsoft-com:vml" xmlns:pvml="urn:schemas-microsoft-com:office:powerpoint" xmlns:com="http://schemas.openxmlformats.org/drawingml/2006/compatibility" xmlns:p14="http://schemas.microsoft.com/office/powerpoint/2010/main" xmlns:p15="http://schemas.microsoft.com/office/powerpoint/2012/main" xmlns:ahyp="http://schemas.microsoft.com/office/drawing/2018/hyperlinkcolor">
   <p:cSld>
     <p:spTree>
       <p:nvGrpSpPr>
-        <p:cNvPr id="203" name="Shape 203"/>
+        <p:cNvPr id="211" name="Shape 211"/>
         <p:cNvGrpSpPr/>
         <p:nvPr/>
       </p:nvGrpSpPr>
@@ -11615,7 +11960,7 @@
       </p:grpSpPr>
       <p:sp>
         <p:nvSpPr>
-          <p:cNvPr id="204" name="Google Shape;204;p24"/>
+          <p:cNvPr id="212" name="Google Shape;212;p25"/>
           <p:cNvSpPr txBox="1"/>
           <p:nvPr>
             <p:ph type="title"/>
@@ -11655,7 +12000,7 @@
       </p:sp>
       <p:pic>
         <p:nvPicPr>
-          <p:cNvPr id="205" name="Google Shape;205;p24"/>
+          <p:cNvPr id="213" name="Google Shape;213;p25"/>
           <p:cNvPicPr preferRelativeResize="0"/>
           <p:nvPr/>
         </p:nvPicPr>
@@ -11671,155 +12016,6 @@
           <a:xfrm>
             <a:off x="1232675" y="1419950"/>
             <a:ext cx="7048500" cy="3200400"/>
-          </a:xfrm>
-          <a:prstGeom prst="rect">
-            <a:avLst/>
-          </a:prstGeom>
-          <a:noFill/>
-          <a:ln>
-            <a:noFill/>
-          </a:ln>
-        </p:spPr>
-      </p:pic>
-    </p:spTree>
-  </p:cSld>
-  <p:clrMapOvr>
-    <a:masterClrMapping/>
-  </p:clrMapOvr>
-</p:sld>
-</file>
-
-<file path=ppt/slides/slide13.xml><?xml version="1.0" encoding="utf-8"?>
-<p:sld xmlns:a="http://schemas.openxmlformats.org/drawingml/2006/main" xmlns:r="http://schemas.openxmlformats.org/officeDocument/2006/relationships" xmlns:mc="http://schemas.openxmlformats.org/markup-compatibility/2006" xmlns:mv="urn:schemas-microsoft-com:mac:vml" xmlns:p="http://schemas.openxmlformats.org/presentationml/2006/main" xmlns:c="http://schemas.openxmlformats.org/drawingml/2006/chart" xmlns:dgm="http://schemas.openxmlformats.org/drawingml/2006/diagram" xmlns:o="urn:schemas-microsoft-com:office:office" xmlns:v="urn:schemas-microsoft-com:vml" xmlns:pvml="urn:schemas-microsoft-com:office:powerpoint" xmlns:com="http://schemas.openxmlformats.org/drawingml/2006/compatibility" xmlns:p14="http://schemas.microsoft.com/office/powerpoint/2010/main" xmlns:p15="http://schemas.microsoft.com/office/powerpoint/2012/main" xmlns:ahyp="http://schemas.microsoft.com/office/drawing/2018/hyperlinkcolor">
-  <p:cSld>
-    <p:spTree>
-      <p:nvGrpSpPr>
-        <p:cNvPr id="209" name="Shape 209"/>
-        <p:cNvGrpSpPr/>
-        <p:nvPr/>
-      </p:nvGrpSpPr>
-      <p:grpSpPr>
-        <a:xfrm>
-          <a:off x="0" y="0"/>
-          <a:ext cx="0" cy="0"/>
-          <a:chOff x="0" y="0"/>
-          <a:chExt cx="0" cy="0"/>
-        </a:xfrm>
-      </p:grpSpPr>
-      <p:sp>
-        <p:nvSpPr>
-          <p:cNvPr id="210" name="Google Shape;210;p25"/>
-          <p:cNvSpPr txBox="1"/>
-          <p:nvPr>
-            <p:ph type="title"/>
-          </p:nvPr>
-        </p:nvSpPr>
-        <p:spPr>
-          <a:xfrm>
-            <a:off x="1297500" y="393750"/>
-            <a:ext cx="7038900" cy="914100"/>
-          </a:xfrm>
-          <a:prstGeom prst="rect">
-            <a:avLst/>
-          </a:prstGeom>
-        </p:spPr>
-        <p:txBody>
-          <a:bodyPr anchorCtr="0" anchor="t" bIns="91425" lIns="91425" spcFirstLastPara="1" rIns="91425" wrap="square" tIns="91425">
-            <a:normAutofit/>
-          </a:bodyPr>
-          <a:lstStyle/>
-          <a:p>
-            <a:pPr indent="0" lvl="0" marL="0" rtl="0" algn="l">
-              <a:spcBef>
-                <a:spcPts val="0"/>
-              </a:spcBef>
-              <a:spcAft>
-                <a:spcPts val="0"/>
-              </a:spcAft>
-              <a:buNone/>
-            </a:pPr>
-            <a:r>
-              <a:rPr lang="en" sz="3000"/>
-              <a:t>Positive Training</a:t>
-            </a:r>
-            <a:endParaRPr sz="3000"/>
-          </a:p>
-        </p:txBody>
-      </p:sp>
-      <p:pic>
-        <p:nvPicPr>
-          <p:cNvPr id="211" name="Google Shape;211;p25"/>
-          <p:cNvPicPr preferRelativeResize="0"/>
-          <p:nvPr/>
-        </p:nvPicPr>
-        <p:blipFill>
-          <a:blip r:embed="rId3">
-            <a:alphaModFix/>
-          </a:blip>
-          <a:stretch>
-            <a:fillRect/>
-          </a:stretch>
-        </p:blipFill>
-        <p:spPr>
-          <a:xfrm>
-            <a:off x="521700" y="1521800"/>
-            <a:ext cx="3915725" cy="3150041"/>
-          </a:xfrm>
-          <a:prstGeom prst="rect">
-            <a:avLst/>
-          </a:prstGeom>
-          <a:noFill/>
-          <a:ln>
-            <a:noFill/>
-          </a:ln>
-        </p:spPr>
-      </p:pic>
-      <p:pic>
-        <p:nvPicPr>
-          <p:cNvPr id="212" name="Google Shape;212;p25"/>
-          <p:cNvPicPr preferRelativeResize="0"/>
-          <p:nvPr/>
-        </p:nvPicPr>
-        <p:blipFill>
-          <a:blip r:embed="rId4">
-            <a:alphaModFix/>
-          </a:blip>
-          <a:stretch>
-            <a:fillRect/>
-          </a:stretch>
-        </p:blipFill>
-        <p:spPr>
-          <a:xfrm>
-            <a:off x="4712650" y="294000"/>
-            <a:ext cx="3970024" cy="1113575"/>
-          </a:xfrm>
-          <a:prstGeom prst="rect">
-            <a:avLst/>
-          </a:prstGeom>
-          <a:noFill/>
-          <a:ln>
-            <a:noFill/>
-          </a:ln>
-        </p:spPr>
-      </p:pic>
-      <p:pic>
-        <p:nvPicPr>
-          <p:cNvPr id="213" name="Google Shape;213;p25"/>
-          <p:cNvPicPr preferRelativeResize="0"/>
-          <p:nvPr/>
-        </p:nvPicPr>
-        <p:blipFill>
-          <a:blip r:embed="rId5">
-            <a:alphaModFix/>
-          </a:blip>
-          <a:stretch>
-            <a:fillRect/>
-          </a:stretch>
-        </p:blipFill>
-        <p:spPr>
-          <a:xfrm>
-            <a:off x="4712650" y="1521800"/>
-            <a:ext cx="3970017" cy="3150050"/>
           </a:xfrm>
           <a:prstGeom prst="rect">
             <a:avLst/>
@@ -11889,11 +12085,7 @@
             </a:pPr>
             <a:r>
               <a:rPr lang="en" sz="3000"/>
-              <a:t>Slower</a:t>
-            </a:r>
-            <a:r>
-              <a:rPr lang="en" sz="3000"/>
-              <a:t> Training</a:t>
+              <a:t>Positive Training</a:t>
             </a:r>
             <a:endParaRPr sz="3000"/>
           </a:p>
@@ -11915,8 +12107,8 @@
         </p:blipFill>
         <p:spPr>
           <a:xfrm>
-            <a:off x="4766950" y="294022"/>
-            <a:ext cx="3915725" cy="1113575"/>
+            <a:off x="521700" y="1521800"/>
+            <a:ext cx="3915725" cy="3150041"/>
           </a:xfrm>
           <a:prstGeom prst="rect">
             <a:avLst/>
@@ -11943,8 +12135,8 @@
         </p:blipFill>
         <p:spPr>
           <a:xfrm>
-            <a:off x="4766950" y="1521800"/>
-            <a:ext cx="3915725" cy="3155677"/>
+            <a:off x="4712650" y="294000"/>
+            <a:ext cx="3970024" cy="1113575"/>
           </a:xfrm>
           <a:prstGeom prst="rect">
             <a:avLst/>
@@ -11971,8 +12163,8 @@
         </p:blipFill>
         <p:spPr>
           <a:xfrm>
-            <a:off x="489250" y="1521800"/>
-            <a:ext cx="4082832" cy="3186450"/>
+            <a:off x="4712650" y="1521800"/>
+            <a:ext cx="3970017" cy="3150050"/>
           </a:xfrm>
           <a:prstGeom prst="rect">
             <a:avLst/>
@@ -12042,15 +12234,11 @@
             </a:pPr>
             <a:r>
               <a:rPr lang="en" sz="3000"/>
-              <a:t>Negative</a:t>
+              <a:t>Slower</a:t>
             </a:r>
             <a:r>
               <a:rPr lang="en" sz="3000"/>
-              <a:t> </a:t>
-            </a:r>
-            <a:r>
-              <a:rPr lang="en" sz="3000"/>
-              <a:t>Training</a:t>
+              <a:t> Training</a:t>
             </a:r>
             <a:endParaRPr sz="3000"/>
           </a:p>
@@ -12072,7 +12260,7 @@
         </p:blipFill>
         <p:spPr>
           <a:xfrm>
-            <a:off x="4928200" y="294010"/>
+            <a:off x="4766950" y="294022"/>
             <a:ext cx="3915725" cy="1113575"/>
           </a:xfrm>
           <a:prstGeom prst="rect">
@@ -12100,8 +12288,8 @@
         </p:blipFill>
         <p:spPr>
           <a:xfrm>
-            <a:off x="817525" y="1508625"/>
-            <a:ext cx="3882188" cy="3131224"/>
+            <a:off x="4766950" y="1521800"/>
+            <a:ext cx="3915725" cy="3155677"/>
           </a:xfrm>
           <a:prstGeom prst="rect">
             <a:avLst/>
@@ -12128,8 +12316,8 @@
         </p:blipFill>
         <p:spPr>
           <a:xfrm>
-            <a:off x="4928201" y="1508625"/>
-            <a:ext cx="3915725" cy="3131230"/>
+            <a:off x="489250" y="1521800"/>
+            <a:ext cx="4082832" cy="3186450"/>
           </a:xfrm>
           <a:prstGeom prst="rect">
             <a:avLst/>
@@ -12199,145 +12387,23 @@
             </a:pPr>
             <a:r>
               <a:rPr lang="en" sz="3000"/>
-              <a:t>Project’s </a:t>
+              <a:t>Negative</a:t>
             </a:r>
             <a:r>
               <a:rPr lang="en" sz="3000"/>
-              <a:t>Budget</a:t>
+              <a:t> </a:t>
+            </a:r>
+            <a:r>
+              <a:rPr lang="en" sz="3000"/>
+              <a:t>Training</a:t>
             </a:r>
             <a:endParaRPr sz="3000"/>
           </a:p>
         </p:txBody>
       </p:sp>
-      <p:sp>
-        <p:nvSpPr>
-          <p:cNvPr id="235" name="Google Shape;235;p28"/>
-          <p:cNvSpPr txBox="1"/>
-          <p:nvPr>
-            <p:ph idx="1" type="body"/>
-          </p:nvPr>
-        </p:nvSpPr>
-        <p:spPr>
-          <a:xfrm>
-            <a:off x="1297500" y="1201250"/>
-            <a:ext cx="7416900" cy="2229300"/>
-          </a:xfrm>
-          <a:prstGeom prst="rect">
-            <a:avLst/>
-          </a:prstGeom>
-        </p:spPr>
-        <p:txBody>
-          <a:bodyPr anchorCtr="0" anchor="t" bIns="91425" lIns="91425" spcFirstLastPara="1" rIns="91425" wrap="square" tIns="91425">
-            <a:normAutofit/>
-          </a:bodyPr>
-          <a:lstStyle/>
-          <a:p>
-            <a:pPr indent="-342900" lvl="0" marL="457200" rtl="0" algn="l">
-              <a:spcBef>
-                <a:spcPts val="0"/>
-              </a:spcBef>
-              <a:spcAft>
-                <a:spcPts val="0"/>
-              </a:spcAft>
-              <a:buSzPts val="1800"/>
-              <a:buChar char="●"/>
-            </a:pPr>
-            <a:r>
-              <a:rPr lang="en" sz="1800"/>
-              <a:t>$100</a:t>
-            </a:r>
-            <a:endParaRPr sz="1800"/>
-          </a:p>
-          <a:p>
-            <a:pPr indent="-342900" lvl="0" marL="457200" rtl="0" algn="l">
-              <a:spcBef>
-                <a:spcPts val="0"/>
-              </a:spcBef>
-              <a:spcAft>
-                <a:spcPts val="0"/>
-              </a:spcAft>
-              <a:buSzPts val="1800"/>
-              <a:buChar char="●"/>
-            </a:pPr>
-            <a:r>
-              <a:rPr lang="en" sz="1800"/>
-              <a:t>Evaluate progress after</a:t>
-            </a:r>
-            <a:endParaRPr sz="1800"/>
-          </a:p>
-          <a:p>
-            <a:pPr indent="-342900" lvl="1" marL="914400" rtl="0" algn="l">
-              <a:spcBef>
-                <a:spcPts val="0"/>
-              </a:spcBef>
-              <a:spcAft>
-                <a:spcPts val="0"/>
-              </a:spcAft>
-              <a:buSzPts val="1800"/>
-              <a:buChar char="○"/>
-            </a:pPr>
-            <a:r>
-              <a:rPr lang="en" sz="1800"/>
-              <a:t>Free trial had expired</a:t>
-            </a:r>
-            <a:endParaRPr sz="1800"/>
-          </a:p>
-          <a:p>
-            <a:pPr indent="-342900" lvl="1" marL="914400" rtl="0" algn="l">
-              <a:spcBef>
-                <a:spcPts val="0"/>
-              </a:spcBef>
-              <a:spcAft>
-                <a:spcPts val="0"/>
-              </a:spcAft>
-              <a:buSzPts val="1800"/>
-              <a:buChar char="○"/>
-            </a:pPr>
-            <a:r>
-              <a:rPr lang="en" sz="1800"/>
-              <a:t>Every $25</a:t>
-            </a:r>
-            <a:endParaRPr sz="1800"/>
-          </a:p>
-          <a:p>
-            <a:pPr indent="-342900" lvl="0" marL="457200" rtl="0" algn="l">
-              <a:spcBef>
-                <a:spcPts val="0"/>
-              </a:spcBef>
-              <a:spcAft>
-                <a:spcPts val="0"/>
-              </a:spcAft>
-              <a:buSzPts val="1800"/>
-              <a:buChar char="●"/>
-            </a:pPr>
-            <a:r>
-              <a:rPr lang="en" sz="1800"/>
-              <a:t>Spent $28.62 total</a:t>
-            </a:r>
-            <a:endParaRPr sz="1800"/>
-          </a:p>
-          <a:p>
-            <a:pPr indent="-342900" lvl="0" marL="457200" rtl="0" algn="l">
-              <a:spcBef>
-                <a:spcPts val="0"/>
-              </a:spcBef>
-              <a:spcAft>
-                <a:spcPts val="0"/>
-              </a:spcAft>
-              <a:buSzPts val="1800"/>
-              <a:buChar char="●"/>
-            </a:pPr>
-            <a:r>
-              <a:rPr lang="en" sz="1800"/>
-              <a:t>Some examples online would cost $10k+ to replicate</a:t>
-            </a:r>
-            <a:endParaRPr sz="1800"/>
-          </a:p>
-        </p:txBody>
-      </p:sp>
       <p:pic>
         <p:nvPicPr>
-          <p:cNvPr id="236" name="Google Shape;236;p28"/>
+          <p:cNvPr id="235" name="Google Shape;235;p28"/>
           <p:cNvPicPr preferRelativeResize="0"/>
           <p:nvPr/>
         </p:nvPicPr>
@@ -12351,8 +12417,64 @@
         </p:blipFill>
         <p:spPr>
           <a:xfrm>
-            <a:off x="1297475" y="3332026"/>
-            <a:ext cx="7416950" cy="832300"/>
+            <a:off x="4928200" y="294010"/>
+            <a:ext cx="3915725" cy="1113575"/>
+          </a:xfrm>
+          <a:prstGeom prst="rect">
+            <a:avLst/>
+          </a:prstGeom>
+          <a:noFill/>
+          <a:ln>
+            <a:noFill/>
+          </a:ln>
+        </p:spPr>
+      </p:pic>
+      <p:pic>
+        <p:nvPicPr>
+          <p:cNvPr id="236" name="Google Shape;236;p28"/>
+          <p:cNvPicPr preferRelativeResize="0"/>
+          <p:nvPr/>
+        </p:nvPicPr>
+        <p:blipFill>
+          <a:blip r:embed="rId4">
+            <a:alphaModFix/>
+          </a:blip>
+          <a:stretch>
+            <a:fillRect/>
+          </a:stretch>
+        </p:blipFill>
+        <p:spPr>
+          <a:xfrm>
+            <a:off x="817525" y="1508625"/>
+            <a:ext cx="3882188" cy="3131224"/>
+          </a:xfrm>
+          <a:prstGeom prst="rect">
+            <a:avLst/>
+          </a:prstGeom>
+          <a:noFill/>
+          <a:ln>
+            <a:noFill/>
+          </a:ln>
+        </p:spPr>
+      </p:pic>
+      <p:pic>
+        <p:nvPicPr>
+          <p:cNvPr id="237" name="Google Shape;237;p28"/>
+          <p:cNvPicPr preferRelativeResize="0"/>
+          <p:nvPr/>
+        </p:nvPicPr>
+        <p:blipFill>
+          <a:blip r:embed="rId5">
+            <a:alphaModFix/>
+          </a:blip>
+          <a:stretch>
+            <a:fillRect/>
+          </a:stretch>
+        </p:blipFill>
+        <p:spPr>
+          <a:xfrm>
+            <a:off x="4928201" y="1508625"/>
+            <a:ext cx="3915725" cy="3131230"/>
           </a:xfrm>
           <a:prstGeom prst="rect">
             <a:avLst/>
@@ -12376,7 +12498,7 @@
   <p:cSld>
     <p:spTree>
       <p:nvGrpSpPr>
-        <p:cNvPr id="240" name="Shape 240"/>
+        <p:cNvPr id="241" name="Shape 241"/>
         <p:cNvGrpSpPr/>
         <p:nvPr/>
       </p:nvGrpSpPr>
@@ -12390,100 +12512,7 @@
       </p:grpSpPr>
       <p:sp>
         <p:nvSpPr>
-          <p:cNvPr id="241" name="Google Shape;241;p29"/>
-          <p:cNvSpPr txBox="1"/>
-          <p:nvPr>
-            <p:ph type="title"/>
-          </p:nvPr>
-        </p:nvSpPr>
-        <p:spPr>
-          <a:xfrm>
-            <a:off x="1297500" y="393750"/>
-            <a:ext cx="7038900" cy="914100"/>
-          </a:xfrm>
-          <a:prstGeom prst="rect">
-            <a:avLst/>
-          </a:prstGeom>
-        </p:spPr>
-        <p:txBody>
-          <a:bodyPr anchorCtr="0" anchor="t" bIns="91425" lIns="91425" spcFirstLastPara="1" rIns="91425" wrap="square" tIns="91425">
-            <a:noAutofit/>
-          </a:bodyPr>
-          <a:lstStyle/>
-          <a:p>
-            <a:pPr indent="0" lvl="0" marL="0" rtl="0" algn="l">
-              <a:spcBef>
-                <a:spcPts val="0"/>
-              </a:spcBef>
-              <a:spcAft>
-                <a:spcPts val="0"/>
-              </a:spcAft>
-              <a:buNone/>
-            </a:pPr>
-            <a:r>
-              <a:rPr lang="en" sz="3000"/>
-              <a:t>Convolutional Neural Network</a:t>
-            </a:r>
-            <a:endParaRPr sz="3000"/>
-          </a:p>
-        </p:txBody>
-      </p:sp>
-      <p:pic>
-        <p:nvPicPr>
           <p:cNvPr id="242" name="Google Shape;242;p29"/>
-          <p:cNvPicPr preferRelativeResize="0"/>
-          <p:nvPr/>
-        </p:nvPicPr>
-        <p:blipFill>
-          <a:blip r:embed="rId3">
-            <a:alphaModFix/>
-          </a:blip>
-          <a:stretch>
-            <a:fillRect/>
-          </a:stretch>
-        </p:blipFill>
-        <p:spPr>
-          <a:xfrm>
-            <a:off x="1397525" y="1107900"/>
-            <a:ext cx="6838850" cy="3005200"/>
-          </a:xfrm>
-          <a:prstGeom prst="rect">
-            <a:avLst/>
-          </a:prstGeom>
-          <a:noFill/>
-          <a:ln>
-            <a:noFill/>
-          </a:ln>
-        </p:spPr>
-      </p:pic>
-    </p:spTree>
-  </p:cSld>
-  <p:clrMapOvr>
-    <a:masterClrMapping/>
-  </p:clrMapOvr>
-</p:sld>
-</file>
-
-<file path=ppt/slides/slide18.xml><?xml version="1.0" encoding="utf-8"?>
-<p:sld xmlns:a="http://schemas.openxmlformats.org/drawingml/2006/main" xmlns:r="http://schemas.openxmlformats.org/officeDocument/2006/relationships" xmlns:mc="http://schemas.openxmlformats.org/markup-compatibility/2006" xmlns:mv="urn:schemas-microsoft-com:mac:vml" xmlns:p="http://schemas.openxmlformats.org/presentationml/2006/main" xmlns:c="http://schemas.openxmlformats.org/drawingml/2006/chart" xmlns:dgm="http://schemas.openxmlformats.org/drawingml/2006/diagram" xmlns:o="urn:schemas-microsoft-com:office:office" xmlns:v="urn:schemas-microsoft-com:vml" xmlns:pvml="urn:schemas-microsoft-com:office:powerpoint" xmlns:com="http://schemas.openxmlformats.org/drawingml/2006/compatibility" xmlns:p14="http://schemas.microsoft.com/office/powerpoint/2010/main" xmlns:p15="http://schemas.microsoft.com/office/powerpoint/2012/main" xmlns:ahyp="http://schemas.microsoft.com/office/drawing/2018/hyperlinkcolor">
-  <p:cSld>
-    <p:spTree>
-      <p:nvGrpSpPr>
-        <p:cNvPr id="246" name="Shape 246"/>
-        <p:cNvGrpSpPr/>
-        <p:nvPr/>
-      </p:nvGrpSpPr>
-      <p:grpSpPr>
-        <a:xfrm>
-          <a:off x="0" y="0"/>
-          <a:ext cx="0" cy="0"/>
-          <a:chOff x="0" y="0"/>
-          <a:chExt cx="0" cy="0"/>
-        </a:xfrm>
-      </p:grpSpPr>
-      <p:sp>
-        <p:nvSpPr>
-          <p:cNvPr id="247" name="Google Shape;247;p30"/>
           <p:cNvSpPr txBox="1"/>
           <p:nvPr>
             <p:ph type="title"/>
@@ -12515,43 +12544,15 @@
             </a:pPr>
             <a:r>
               <a:rPr lang="en" sz="3000"/>
-              <a:t>Evaluation</a:t>
+              <a:t>Evaluating Models</a:t>
             </a:r>
             <a:endParaRPr sz="3000"/>
           </a:p>
         </p:txBody>
       </p:sp>
-      <p:pic>
-        <p:nvPicPr>
-          <p:cNvPr id="248" name="Google Shape;248;p30"/>
-          <p:cNvPicPr preferRelativeResize="0"/>
-          <p:nvPr/>
-        </p:nvPicPr>
-        <p:blipFill>
-          <a:blip r:embed="rId3">
-            <a:alphaModFix/>
-          </a:blip>
-          <a:stretch>
-            <a:fillRect/>
-          </a:stretch>
-        </p:blipFill>
-        <p:spPr>
-          <a:xfrm>
-            <a:off x="1421025" y="1935925"/>
-            <a:ext cx="6791851" cy="3014100"/>
-          </a:xfrm>
-          <a:prstGeom prst="rect">
-            <a:avLst/>
-          </a:prstGeom>
-          <a:noFill/>
-          <a:ln>
-            <a:noFill/>
-          </a:ln>
-        </p:spPr>
-      </p:pic>
       <p:sp>
         <p:nvSpPr>
-          <p:cNvPr id="249" name="Google Shape;249;p30"/>
+          <p:cNvPr id="243" name="Google Shape;243;p29"/>
           <p:cNvSpPr txBox="1"/>
           <p:nvPr/>
         </p:nvSpPr>
@@ -12589,7 +12590,7 @@
               </a:buClr>
               <a:buSzPts val="1800"/>
               <a:buFont typeface="Lato"/>
-              <a:buChar char="-"/>
+              <a:buChar char="●"/>
             </a:pPr>
             <a:r>
               <a:rPr lang="en" sz="1800">
@@ -12601,7 +12602,7 @@
                 <a:cs typeface="Lato"/>
                 <a:sym typeface="Lato"/>
               </a:rPr>
-              <a:t>4 models passed evaluation (3 laps without crashing)</a:t>
+              <a:t>4 models passed evaluation within the short time trained</a:t>
             </a:r>
             <a:endParaRPr sz="1800">
               <a:solidFill>
@@ -12629,7 +12630,7 @@
               </a:buClr>
               <a:buSzPts val="1800"/>
               <a:buFont typeface="Lato"/>
-              <a:buChar char="-"/>
+              <a:buChar char="●"/>
             </a:pPr>
             <a:r>
               <a:rPr lang="en" sz="1800">
@@ -12641,7 +12642,815 @@
                 <a:cs typeface="Lato"/>
                 <a:sym typeface="Lato"/>
               </a:rPr>
-              <a:t>Most complicated and best performing</a:t>
+              <a:t>times are in (MM:SS:mmm)</a:t>
+            </a:r>
+            <a:endParaRPr sz="1800">
+              <a:solidFill>
+                <a:schemeClr val="lt1"/>
+              </a:solidFill>
+              <a:latin typeface="Lato"/>
+              <a:ea typeface="Lato"/>
+              <a:cs typeface="Lato"/>
+              <a:sym typeface="Lato"/>
+            </a:endParaRPr>
+          </a:p>
+        </p:txBody>
+      </p:sp>
+      <p:graphicFrame>
+        <p:nvGraphicFramePr>
+          <p:cNvPr id="244" name="Google Shape;244;p29"/>
+          <p:cNvGraphicFramePr/>
+          <p:nvPr/>
+        </p:nvGraphicFramePr>
+        <p:xfrm>
+          <a:off x="671275" y="1989300"/>
+          <a:ext cx="3000000" cy="3000000"/>
+        </p:xfrm>
+        <a:graphic>
+          <a:graphicData uri="http://schemas.openxmlformats.org/drawingml/2006/table">
+            <a:tbl>
+              <a:tblPr>
+                <a:noFill/>
+                <a:tableStyleId>{5BF103AC-2D62-4942-A0C8-F533A4A80F35}</a:tableStyleId>
+              </a:tblPr>
+              <a:tblGrid>
+                <a:gridCol w="2090975"/>
+                <a:gridCol w="1809750"/>
+                <a:gridCol w="1809750"/>
+                <a:gridCol w="1809750"/>
+              </a:tblGrid>
+              <a:tr h="381000">
+                <a:tc>
+                  <a:txBody>
+                    <a:bodyPr/>
+                    <a:lstStyle/>
+                    <a:p>
+                      <a:pPr indent="0" lvl="0" marL="0" rtl="0" algn="ctr">
+                        <a:spcBef>
+                          <a:spcPts val="0"/>
+                        </a:spcBef>
+                        <a:spcAft>
+                          <a:spcPts val="0"/>
+                        </a:spcAft>
+                        <a:buNone/>
+                      </a:pPr>
+                      <a:r>
+                        <a:rPr lang="en">
+                          <a:solidFill>
+                            <a:schemeClr val="lt1"/>
+                          </a:solidFill>
+                        </a:rPr>
+                        <a:t>Model details</a:t>
+                      </a:r>
+                      <a:endParaRPr>
+                        <a:solidFill>
+                          <a:schemeClr val="lt1"/>
+                        </a:solidFill>
+                      </a:endParaRPr>
+                    </a:p>
+                  </a:txBody>
+                  <a:tcPr marT="91425" marB="91425" marR="91425" marL="91425"/>
+                </a:tc>
+                <a:tc>
+                  <a:txBody>
+                    <a:bodyPr/>
+                    <a:lstStyle/>
+                    <a:p>
+                      <a:pPr indent="0" lvl="0" marL="0" rtl="0" algn="ctr">
+                        <a:spcBef>
+                          <a:spcPts val="0"/>
+                        </a:spcBef>
+                        <a:spcAft>
+                          <a:spcPts val="0"/>
+                        </a:spcAft>
+                        <a:buNone/>
+                      </a:pPr>
+                      <a:r>
+                        <a:rPr lang="en">
+                          <a:solidFill>
+                            <a:schemeClr val="lt1"/>
+                          </a:solidFill>
+                        </a:rPr>
+                        <a:t>Lap 1 </a:t>
+                      </a:r>
+                      <a:endParaRPr>
+                        <a:solidFill>
+                          <a:schemeClr val="lt1"/>
+                        </a:solidFill>
+                      </a:endParaRPr>
+                    </a:p>
+                  </a:txBody>
+                  <a:tcPr marT="91425" marB="91425" marR="91425" marL="91425"/>
+                </a:tc>
+                <a:tc>
+                  <a:txBody>
+                    <a:bodyPr/>
+                    <a:lstStyle/>
+                    <a:p>
+                      <a:pPr indent="0" lvl="0" marL="0" rtl="0" algn="ctr">
+                        <a:spcBef>
+                          <a:spcPts val="0"/>
+                        </a:spcBef>
+                        <a:spcAft>
+                          <a:spcPts val="0"/>
+                        </a:spcAft>
+                        <a:buNone/>
+                      </a:pPr>
+                      <a:r>
+                        <a:rPr lang="en">
+                          <a:solidFill>
+                            <a:schemeClr val="lt1"/>
+                          </a:solidFill>
+                        </a:rPr>
+                        <a:t>Lap 2</a:t>
+                      </a:r>
+                      <a:endParaRPr>
+                        <a:solidFill>
+                          <a:schemeClr val="lt1"/>
+                        </a:solidFill>
+                      </a:endParaRPr>
+                    </a:p>
+                  </a:txBody>
+                  <a:tcPr marT="91425" marB="91425" marR="91425" marL="91425"/>
+                </a:tc>
+                <a:tc>
+                  <a:txBody>
+                    <a:bodyPr/>
+                    <a:lstStyle/>
+                    <a:p>
+                      <a:pPr indent="0" lvl="0" marL="0" rtl="0" algn="ctr">
+                        <a:spcBef>
+                          <a:spcPts val="0"/>
+                        </a:spcBef>
+                        <a:spcAft>
+                          <a:spcPts val="0"/>
+                        </a:spcAft>
+                        <a:buNone/>
+                      </a:pPr>
+                      <a:r>
+                        <a:rPr lang="en">
+                          <a:solidFill>
+                            <a:schemeClr val="lt1"/>
+                          </a:solidFill>
+                        </a:rPr>
+                        <a:t>Lap 3</a:t>
+                      </a:r>
+                      <a:endParaRPr>
+                        <a:solidFill>
+                          <a:schemeClr val="lt1"/>
+                        </a:solidFill>
+                      </a:endParaRPr>
+                    </a:p>
+                  </a:txBody>
+                  <a:tcPr marT="91425" marB="91425" marR="91425" marL="91425"/>
+                </a:tc>
+              </a:tr>
+              <a:tr h="381000">
+                <a:tc>
+                  <a:txBody>
+                    <a:bodyPr/>
+                    <a:lstStyle/>
+                    <a:p>
+                      <a:pPr indent="0" lvl="0" marL="0" rtl="0" algn="l">
+                        <a:spcBef>
+                          <a:spcPts val="0"/>
+                        </a:spcBef>
+                        <a:spcAft>
+                          <a:spcPts val="0"/>
+                        </a:spcAft>
+                        <a:buNone/>
+                      </a:pPr>
+                      <a:r>
+                        <a:rPr lang="en">
+                          <a:solidFill>
+                            <a:schemeClr val="lt1"/>
+                          </a:solidFill>
+                        </a:rPr>
+                        <a:t>Time trial v_1</a:t>
+                      </a:r>
+                      <a:endParaRPr>
+                        <a:solidFill>
+                          <a:schemeClr val="lt1"/>
+                        </a:solidFill>
+                      </a:endParaRPr>
+                    </a:p>
+                  </a:txBody>
+                  <a:tcPr marT="91425" marB="91425" marR="91425" marL="91425"/>
+                </a:tc>
+                <a:tc>
+                  <a:txBody>
+                    <a:bodyPr/>
+                    <a:lstStyle/>
+                    <a:p>
+                      <a:pPr indent="0" lvl="0" marL="0" rtl="0" algn="ctr">
+                        <a:spcBef>
+                          <a:spcPts val="0"/>
+                        </a:spcBef>
+                        <a:spcAft>
+                          <a:spcPts val="0"/>
+                        </a:spcAft>
+                        <a:buNone/>
+                      </a:pPr>
+                      <a:r>
+                        <a:rPr lang="en">
+                          <a:solidFill>
+                            <a:schemeClr val="lt1"/>
+                          </a:solidFill>
+                        </a:rPr>
+                        <a:t>00:26.533</a:t>
+                      </a:r>
+                      <a:endParaRPr>
+                        <a:solidFill>
+                          <a:schemeClr val="lt1"/>
+                        </a:solidFill>
+                      </a:endParaRPr>
+                    </a:p>
+                  </a:txBody>
+                  <a:tcPr marT="91425" marB="91425" marR="91425" marL="91425"/>
+                </a:tc>
+                <a:tc>
+                  <a:txBody>
+                    <a:bodyPr/>
+                    <a:lstStyle/>
+                    <a:p>
+                      <a:pPr indent="0" lvl="0" marL="0" rtl="0" algn="ctr">
+                        <a:spcBef>
+                          <a:spcPts val="0"/>
+                        </a:spcBef>
+                        <a:spcAft>
+                          <a:spcPts val="0"/>
+                        </a:spcAft>
+                        <a:buNone/>
+                      </a:pPr>
+                      <a:r>
+                        <a:rPr lang="en">
+                          <a:solidFill>
+                            <a:schemeClr val="lt1"/>
+                          </a:solidFill>
+                        </a:rPr>
+                        <a:t>00:26.034</a:t>
+                      </a:r>
+                      <a:endParaRPr>
+                        <a:solidFill>
+                          <a:schemeClr val="lt1"/>
+                        </a:solidFill>
+                      </a:endParaRPr>
+                    </a:p>
+                  </a:txBody>
+                  <a:tcPr marT="91425" marB="91425" marR="91425" marL="91425"/>
+                </a:tc>
+                <a:tc>
+                  <a:txBody>
+                    <a:bodyPr/>
+                    <a:lstStyle/>
+                    <a:p>
+                      <a:pPr indent="0" lvl="0" marL="0" rtl="0" algn="ctr">
+                        <a:spcBef>
+                          <a:spcPts val="0"/>
+                        </a:spcBef>
+                        <a:spcAft>
+                          <a:spcPts val="0"/>
+                        </a:spcAft>
+                        <a:buNone/>
+                      </a:pPr>
+                      <a:r>
+                        <a:rPr lang="en">
+                          <a:solidFill>
+                            <a:schemeClr val="lt1"/>
+                          </a:solidFill>
+                        </a:rPr>
+                        <a:t>00:26.347</a:t>
+                      </a:r>
+                      <a:endParaRPr>
+                        <a:solidFill>
+                          <a:schemeClr val="lt1"/>
+                        </a:solidFill>
+                      </a:endParaRPr>
+                    </a:p>
+                  </a:txBody>
+                  <a:tcPr marT="91425" marB="91425" marR="91425" marL="91425"/>
+                </a:tc>
+              </a:tr>
+              <a:tr h="381000">
+                <a:tc>
+                  <a:txBody>
+                    <a:bodyPr/>
+                    <a:lstStyle/>
+                    <a:p>
+                      <a:pPr indent="0" lvl="0" marL="0" rtl="0" algn="l">
+                        <a:spcBef>
+                          <a:spcPts val="0"/>
+                        </a:spcBef>
+                        <a:spcAft>
+                          <a:spcPts val="0"/>
+                        </a:spcAft>
+                        <a:buNone/>
+                      </a:pPr>
+                      <a:r>
+                        <a:rPr lang="en">
+                          <a:solidFill>
+                            <a:schemeClr val="lt1"/>
+                          </a:solidFill>
+                        </a:rPr>
+                        <a:t>Time trial v_5</a:t>
+                      </a:r>
+                      <a:endParaRPr>
+                        <a:solidFill>
+                          <a:schemeClr val="lt1"/>
+                        </a:solidFill>
+                      </a:endParaRPr>
+                    </a:p>
+                  </a:txBody>
+                  <a:tcPr marT="91425" marB="91425" marR="91425" marL="91425"/>
+                </a:tc>
+                <a:tc>
+                  <a:txBody>
+                    <a:bodyPr/>
+                    <a:lstStyle/>
+                    <a:p>
+                      <a:pPr indent="0" lvl="0" marL="0" rtl="0" algn="ctr">
+                        <a:spcBef>
+                          <a:spcPts val="0"/>
+                        </a:spcBef>
+                        <a:spcAft>
+                          <a:spcPts val="0"/>
+                        </a:spcAft>
+                        <a:buNone/>
+                      </a:pPr>
+                      <a:r>
+                        <a:rPr lang="en">
+                          <a:solidFill>
+                            <a:schemeClr val="lt1"/>
+                          </a:solidFill>
+                        </a:rPr>
+                        <a:t>00:17.592</a:t>
+                      </a:r>
+                      <a:endParaRPr>
+                        <a:solidFill>
+                          <a:schemeClr val="lt1"/>
+                        </a:solidFill>
+                      </a:endParaRPr>
+                    </a:p>
+                  </a:txBody>
+                  <a:tcPr marT="91425" marB="91425" marR="91425" marL="91425"/>
+                </a:tc>
+                <a:tc>
+                  <a:txBody>
+                    <a:bodyPr/>
+                    <a:lstStyle/>
+                    <a:p>
+                      <a:pPr indent="0" lvl="0" marL="0" rtl="0" algn="ctr">
+                        <a:spcBef>
+                          <a:spcPts val="0"/>
+                        </a:spcBef>
+                        <a:spcAft>
+                          <a:spcPts val="0"/>
+                        </a:spcAft>
+                        <a:buNone/>
+                      </a:pPr>
+                      <a:r>
+                        <a:rPr lang="en">
+                          <a:solidFill>
+                            <a:schemeClr val="lt1"/>
+                          </a:solidFill>
+                        </a:rPr>
+                        <a:t>00:17.462</a:t>
+                      </a:r>
+                      <a:endParaRPr>
+                        <a:solidFill>
+                          <a:schemeClr val="lt1"/>
+                        </a:solidFill>
+                      </a:endParaRPr>
+                    </a:p>
+                  </a:txBody>
+                  <a:tcPr marT="91425" marB="91425" marR="91425" marL="91425"/>
+                </a:tc>
+                <a:tc>
+                  <a:txBody>
+                    <a:bodyPr/>
+                    <a:lstStyle/>
+                    <a:p>
+                      <a:pPr indent="0" lvl="0" marL="0" rtl="0" algn="ctr">
+                        <a:spcBef>
+                          <a:spcPts val="0"/>
+                        </a:spcBef>
+                        <a:spcAft>
+                          <a:spcPts val="0"/>
+                        </a:spcAft>
+                        <a:buNone/>
+                      </a:pPr>
+                      <a:r>
+                        <a:rPr lang="en">
+                          <a:solidFill>
+                            <a:schemeClr val="lt1"/>
+                          </a:solidFill>
+                        </a:rPr>
+                        <a:t>00:18.210</a:t>
+                      </a:r>
+                      <a:endParaRPr>
+                        <a:solidFill>
+                          <a:schemeClr val="lt1"/>
+                        </a:solidFill>
+                      </a:endParaRPr>
+                    </a:p>
+                  </a:txBody>
+                  <a:tcPr marT="91425" marB="91425" marR="91425" marL="91425"/>
+                </a:tc>
+              </a:tr>
+              <a:tr h="381000">
+                <a:tc>
+                  <a:txBody>
+                    <a:bodyPr/>
+                    <a:lstStyle/>
+                    <a:p>
+                      <a:pPr indent="0" lvl="0" marL="0" rtl="0" algn="l">
+                        <a:spcBef>
+                          <a:spcPts val="0"/>
+                        </a:spcBef>
+                        <a:spcAft>
+                          <a:spcPts val="0"/>
+                        </a:spcAft>
+                        <a:buNone/>
+                      </a:pPr>
+                      <a:r>
+                        <a:rPr lang="en">
+                          <a:solidFill>
+                            <a:schemeClr val="lt1"/>
+                          </a:solidFill>
+                        </a:rPr>
+                        <a:t>Object avoidance v_5</a:t>
+                      </a:r>
+                      <a:endParaRPr>
+                        <a:solidFill>
+                          <a:schemeClr val="lt1"/>
+                        </a:solidFill>
+                      </a:endParaRPr>
+                    </a:p>
+                  </a:txBody>
+                  <a:tcPr marT="91425" marB="91425" marR="91425" marL="91425"/>
+                </a:tc>
+                <a:tc>
+                  <a:txBody>
+                    <a:bodyPr/>
+                    <a:lstStyle/>
+                    <a:p>
+                      <a:pPr indent="0" lvl="0" marL="0" rtl="0" algn="ctr">
+                        <a:spcBef>
+                          <a:spcPts val="0"/>
+                        </a:spcBef>
+                        <a:spcAft>
+                          <a:spcPts val="0"/>
+                        </a:spcAft>
+                        <a:buNone/>
+                      </a:pPr>
+                      <a:r>
+                        <a:rPr lang="en">
+                          <a:solidFill>
+                            <a:schemeClr val="lt1"/>
+                          </a:solidFill>
+                        </a:rPr>
+                        <a:t>00:25.400</a:t>
+                      </a:r>
+                      <a:endParaRPr>
+                        <a:solidFill>
+                          <a:schemeClr val="lt1"/>
+                        </a:solidFill>
+                      </a:endParaRPr>
+                    </a:p>
+                  </a:txBody>
+                  <a:tcPr marT="91425" marB="91425" marR="91425" marL="91425"/>
+                </a:tc>
+                <a:tc>
+                  <a:txBody>
+                    <a:bodyPr/>
+                    <a:lstStyle/>
+                    <a:p>
+                      <a:pPr indent="0" lvl="0" marL="0" rtl="0" algn="ctr">
+                        <a:spcBef>
+                          <a:spcPts val="0"/>
+                        </a:spcBef>
+                        <a:spcAft>
+                          <a:spcPts val="0"/>
+                        </a:spcAft>
+                        <a:buNone/>
+                      </a:pPr>
+                      <a:r>
+                        <a:rPr lang="en">
+                          <a:solidFill>
+                            <a:schemeClr val="lt1"/>
+                          </a:solidFill>
+                        </a:rPr>
+                        <a:t>00:24.000</a:t>
+                      </a:r>
+                      <a:endParaRPr>
+                        <a:solidFill>
+                          <a:schemeClr val="lt1"/>
+                        </a:solidFill>
+                      </a:endParaRPr>
+                    </a:p>
+                  </a:txBody>
+                  <a:tcPr marT="91425" marB="91425" marR="91425" marL="91425"/>
+                </a:tc>
+                <a:tc>
+                  <a:txBody>
+                    <a:bodyPr/>
+                    <a:lstStyle/>
+                    <a:p>
+                      <a:pPr indent="0" lvl="0" marL="0" rtl="0" algn="ctr">
+                        <a:spcBef>
+                          <a:spcPts val="0"/>
+                        </a:spcBef>
+                        <a:spcAft>
+                          <a:spcPts val="0"/>
+                        </a:spcAft>
+                        <a:buNone/>
+                      </a:pPr>
+                      <a:r>
+                        <a:rPr lang="en">
+                          <a:solidFill>
+                            <a:schemeClr val="lt1"/>
+                          </a:solidFill>
+                        </a:rPr>
+                        <a:t>00:24.668</a:t>
+                      </a:r>
+                      <a:endParaRPr>
+                        <a:solidFill>
+                          <a:schemeClr val="lt1"/>
+                        </a:solidFill>
+                      </a:endParaRPr>
+                    </a:p>
+                  </a:txBody>
+                  <a:tcPr marT="91425" marB="91425" marR="91425" marL="91425"/>
+                </a:tc>
+              </a:tr>
+              <a:tr h="381000">
+                <a:tc>
+                  <a:txBody>
+                    <a:bodyPr/>
+                    <a:lstStyle/>
+                    <a:p>
+                      <a:pPr indent="0" lvl="0" marL="0" rtl="0" algn="l">
+                        <a:spcBef>
+                          <a:spcPts val="0"/>
+                        </a:spcBef>
+                        <a:spcAft>
+                          <a:spcPts val="0"/>
+                        </a:spcAft>
+                        <a:buNone/>
+                      </a:pPr>
+                      <a:r>
+                        <a:rPr lang="en">
+                          <a:solidFill>
+                            <a:schemeClr val="lt1"/>
+                          </a:solidFill>
+                        </a:rPr>
+                        <a:t>Object avoidance v_t5.4</a:t>
+                      </a:r>
+                      <a:endParaRPr>
+                        <a:solidFill>
+                          <a:schemeClr val="lt1"/>
+                        </a:solidFill>
+                      </a:endParaRPr>
+                    </a:p>
+                  </a:txBody>
+                  <a:tcPr marT="91425" marB="91425" marR="91425" marL="91425"/>
+                </a:tc>
+                <a:tc>
+                  <a:txBody>
+                    <a:bodyPr/>
+                    <a:lstStyle/>
+                    <a:p>
+                      <a:pPr indent="0" lvl="0" marL="0" rtl="0" algn="ctr">
+                        <a:spcBef>
+                          <a:spcPts val="0"/>
+                        </a:spcBef>
+                        <a:spcAft>
+                          <a:spcPts val="0"/>
+                        </a:spcAft>
+                        <a:buNone/>
+                      </a:pPr>
+                      <a:r>
+                        <a:rPr lang="en">
+                          <a:solidFill>
+                            <a:schemeClr val="lt1"/>
+                          </a:solidFill>
+                        </a:rPr>
+                        <a:t>00:18.262</a:t>
+                      </a:r>
+                      <a:endParaRPr>
+                        <a:solidFill>
+                          <a:schemeClr val="lt1"/>
+                        </a:solidFill>
+                      </a:endParaRPr>
+                    </a:p>
+                  </a:txBody>
+                  <a:tcPr marT="91425" marB="91425" marR="91425" marL="91425"/>
+                </a:tc>
+                <a:tc>
+                  <a:txBody>
+                    <a:bodyPr/>
+                    <a:lstStyle/>
+                    <a:p>
+                      <a:pPr indent="0" lvl="0" marL="0" rtl="0" algn="ctr">
+                        <a:spcBef>
+                          <a:spcPts val="0"/>
+                        </a:spcBef>
+                        <a:spcAft>
+                          <a:spcPts val="0"/>
+                        </a:spcAft>
+                        <a:buNone/>
+                      </a:pPr>
+                      <a:r>
+                        <a:rPr lang="en">
+                          <a:solidFill>
+                            <a:schemeClr val="lt1"/>
+                          </a:solidFill>
+                        </a:rPr>
+                        <a:t>00:17.486</a:t>
+                      </a:r>
+                      <a:endParaRPr>
+                        <a:solidFill>
+                          <a:schemeClr val="lt1"/>
+                        </a:solidFill>
+                      </a:endParaRPr>
+                    </a:p>
+                  </a:txBody>
+                  <a:tcPr marT="91425" marB="91425" marR="91425" marL="91425"/>
+                </a:tc>
+                <a:tc>
+                  <a:txBody>
+                    <a:bodyPr/>
+                    <a:lstStyle/>
+                    <a:p>
+                      <a:pPr indent="0" lvl="0" marL="0" rtl="0" algn="ctr">
+                        <a:spcBef>
+                          <a:spcPts val="0"/>
+                        </a:spcBef>
+                        <a:spcAft>
+                          <a:spcPts val="0"/>
+                        </a:spcAft>
+                        <a:buNone/>
+                      </a:pPr>
+                      <a:r>
+                        <a:rPr lang="en">
+                          <a:solidFill>
+                            <a:schemeClr val="lt1"/>
+                          </a:solidFill>
+                        </a:rPr>
+                        <a:t>00:18.283</a:t>
+                      </a:r>
+                      <a:endParaRPr>
+                        <a:solidFill>
+                          <a:schemeClr val="lt1"/>
+                        </a:solidFill>
+                      </a:endParaRPr>
+                    </a:p>
+                  </a:txBody>
+                  <a:tcPr marT="91425" marB="91425" marR="91425" marL="91425"/>
+                </a:tc>
+              </a:tr>
+            </a:tbl>
+          </a:graphicData>
+        </a:graphic>
+      </p:graphicFrame>
+    </p:spTree>
+  </p:cSld>
+  <p:clrMapOvr>
+    <a:masterClrMapping/>
+  </p:clrMapOvr>
+</p:sld>
+</file>
+
+<file path=ppt/slides/slide18.xml><?xml version="1.0" encoding="utf-8"?>
+<p:sld xmlns:a="http://schemas.openxmlformats.org/drawingml/2006/main" xmlns:r="http://schemas.openxmlformats.org/officeDocument/2006/relationships" xmlns:mc="http://schemas.openxmlformats.org/markup-compatibility/2006" xmlns:mv="urn:schemas-microsoft-com:mac:vml" xmlns:p="http://schemas.openxmlformats.org/presentationml/2006/main" xmlns:c="http://schemas.openxmlformats.org/drawingml/2006/chart" xmlns:dgm="http://schemas.openxmlformats.org/drawingml/2006/diagram" xmlns:o="urn:schemas-microsoft-com:office:office" xmlns:v="urn:schemas-microsoft-com:vml" xmlns:pvml="urn:schemas-microsoft-com:office:powerpoint" xmlns:com="http://schemas.openxmlformats.org/drawingml/2006/compatibility" xmlns:p14="http://schemas.microsoft.com/office/powerpoint/2010/main" xmlns:p15="http://schemas.microsoft.com/office/powerpoint/2012/main" xmlns:ahyp="http://schemas.microsoft.com/office/drawing/2018/hyperlinkcolor">
+  <p:cSld>
+    <p:spTree>
+      <p:nvGrpSpPr>
+        <p:cNvPr id="248" name="Shape 248"/>
+        <p:cNvGrpSpPr/>
+        <p:nvPr/>
+      </p:nvGrpSpPr>
+      <p:grpSpPr>
+        <a:xfrm>
+          <a:off x="0" y="0"/>
+          <a:ext cx="0" cy="0"/>
+          <a:chOff x="0" y="0"/>
+          <a:chExt cx="0" cy="0"/>
+        </a:xfrm>
+      </p:grpSpPr>
+      <p:sp>
+        <p:nvSpPr>
+          <p:cNvPr id="249" name="Google Shape;249;p30"/>
+          <p:cNvSpPr txBox="1"/>
+          <p:nvPr>
+            <p:ph type="title"/>
+          </p:nvPr>
+        </p:nvSpPr>
+        <p:spPr>
+          <a:xfrm>
+            <a:off x="1297500" y="393750"/>
+            <a:ext cx="7038900" cy="914100"/>
+          </a:xfrm>
+          <a:prstGeom prst="rect">
+            <a:avLst/>
+          </a:prstGeom>
+        </p:spPr>
+        <p:txBody>
+          <a:bodyPr anchorCtr="0" anchor="t" bIns="91425" lIns="91425" spcFirstLastPara="1" rIns="91425" wrap="square" tIns="91425">
+            <a:noAutofit/>
+          </a:bodyPr>
+          <a:lstStyle/>
+          <a:p>
+            <a:pPr indent="0" lvl="0" marL="0" rtl="0" algn="l">
+              <a:spcBef>
+                <a:spcPts val="0"/>
+              </a:spcBef>
+              <a:spcAft>
+                <a:spcPts val="0"/>
+              </a:spcAft>
+              <a:buNone/>
+            </a:pPr>
+            <a:r>
+              <a:rPr lang="en" sz="3000"/>
+              <a:t>Convolutional Neural Network</a:t>
+            </a:r>
+            <a:endParaRPr sz="3000"/>
+          </a:p>
+        </p:txBody>
+      </p:sp>
+      <p:pic>
+        <p:nvPicPr>
+          <p:cNvPr id="250" name="Google Shape;250;p30"/>
+          <p:cNvPicPr preferRelativeResize="0"/>
+          <p:nvPr/>
+        </p:nvPicPr>
+        <p:blipFill>
+          <a:blip r:embed="rId3">
+            <a:alphaModFix/>
+          </a:blip>
+          <a:stretch>
+            <a:fillRect/>
+          </a:stretch>
+        </p:blipFill>
+        <p:spPr>
+          <a:xfrm>
+            <a:off x="1397525" y="1440925"/>
+            <a:ext cx="6838850" cy="3005200"/>
+          </a:xfrm>
+          <a:prstGeom prst="rect">
+            <a:avLst/>
+          </a:prstGeom>
+          <a:noFill/>
+          <a:ln>
+            <a:noFill/>
+          </a:ln>
+        </p:spPr>
+      </p:pic>
+      <p:sp>
+        <p:nvSpPr>
+          <p:cNvPr id="251" name="Google Shape;251;p30"/>
+          <p:cNvSpPr txBox="1"/>
+          <p:nvPr/>
+        </p:nvSpPr>
+        <p:spPr>
+          <a:xfrm>
+            <a:off x="1397525" y="1043500"/>
+            <a:ext cx="6408900" cy="461700"/>
+          </a:xfrm>
+          <a:prstGeom prst="rect">
+            <a:avLst/>
+          </a:prstGeom>
+          <a:noFill/>
+          <a:ln>
+            <a:noFill/>
+          </a:ln>
+        </p:spPr>
+        <p:txBody>
+          <a:bodyPr anchorCtr="0" anchor="t" bIns="91425" lIns="91425" spcFirstLastPara="1" rIns="91425" wrap="square" tIns="91425">
+            <a:spAutoFit/>
+          </a:bodyPr>
+          <a:lstStyle/>
+          <a:p>
+            <a:pPr indent="0" lvl="0" marL="0" rtl="0" algn="l">
+              <a:spcBef>
+                <a:spcPts val="0"/>
+              </a:spcBef>
+              <a:spcAft>
+                <a:spcPts val="0"/>
+              </a:spcAft>
+              <a:buNone/>
+            </a:pPr>
+            <a:r>
+              <a:rPr lang="en" sz="1800">
+                <a:solidFill>
+                  <a:schemeClr val="lt1"/>
+                </a:solidFill>
+                <a:latin typeface="Lato"/>
+                <a:ea typeface="Lato"/>
+                <a:cs typeface="Lato"/>
+                <a:sym typeface="Lato"/>
+              </a:rPr>
+              <a:t>Must now rely solely on sensors for image processing.</a:t>
             </a:r>
             <a:endParaRPr sz="1800">
               <a:solidFill>
@@ -12668,7 +13477,7 @@
   <p:cSld>
     <p:spTree>
       <p:nvGrpSpPr>
-        <p:cNvPr id="253" name="Shape 253"/>
+        <p:cNvPr id="255" name="Shape 255"/>
         <p:cNvGrpSpPr/>
         <p:nvPr/>
       </p:nvGrpSpPr>
@@ -12682,7 +13491,7 @@
       </p:grpSpPr>
       <p:sp>
         <p:nvSpPr>
-          <p:cNvPr id="254" name="Google Shape;254;p31"/>
+          <p:cNvPr id="256" name="Google Shape;256;p31"/>
           <p:cNvSpPr txBox="1"/>
           <p:nvPr>
             <p:ph type="title"/>
@@ -12714,187 +13523,40 @@
             </a:pPr>
             <a:r>
               <a:rPr lang="en" sz="3000"/>
-              <a:t>Conclusion</a:t>
+              <a:t>Best Performing Model</a:t>
             </a:r>
             <a:endParaRPr sz="3000"/>
           </a:p>
         </p:txBody>
       </p:sp>
-      <p:sp>
-        <p:nvSpPr>
-          <p:cNvPr id="255" name="Google Shape;255;p31"/>
-          <p:cNvSpPr txBox="1"/>
-          <p:nvPr>
-            <p:ph idx="1" type="body"/>
-          </p:nvPr>
-        </p:nvSpPr>
+      <p:pic>
+        <p:nvPicPr>
+          <p:cNvPr id="257" name="Google Shape;257;p31"/>
+          <p:cNvPicPr preferRelativeResize="0"/>
+          <p:nvPr/>
+        </p:nvPicPr>
+        <p:blipFill>
+          <a:blip r:embed="rId3">
+            <a:alphaModFix/>
+          </a:blip>
+          <a:stretch>
+            <a:fillRect/>
+          </a:stretch>
+        </p:blipFill>
         <p:spPr>
           <a:xfrm>
-            <a:off x="1297500" y="1273775"/>
-            <a:ext cx="7038900" cy="3204900"/>
+            <a:off x="1421025" y="1307850"/>
+            <a:ext cx="6791851" cy="3014100"/>
           </a:xfrm>
           <a:prstGeom prst="rect">
             <a:avLst/>
           </a:prstGeom>
+          <a:noFill/>
+          <a:ln>
+            <a:noFill/>
+          </a:ln>
         </p:spPr>
-        <p:txBody>
-          <a:bodyPr anchorCtr="0" anchor="t" bIns="91425" lIns="91425" spcFirstLastPara="1" rIns="91425" wrap="square" tIns="91425">
-            <a:normAutofit/>
-          </a:bodyPr>
-          <a:lstStyle/>
-          <a:p>
-            <a:pPr indent="-342900" lvl="0" marL="457200" rtl="0" algn="l">
-              <a:spcBef>
-                <a:spcPts val="0"/>
-              </a:spcBef>
-              <a:spcAft>
-                <a:spcPts val="0"/>
-              </a:spcAft>
-              <a:buSzPts val="1800"/>
-              <a:buChar char="●"/>
-            </a:pPr>
-            <a:r>
-              <a:rPr lang="en" sz="1800"/>
-              <a:t>4 models passed evaluation (3 laps without crashing)</a:t>
-            </a:r>
-            <a:endParaRPr sz="1800"/>
-          </a:p>
-          <a:p>
-            <a:pPr indent="-342900" lvl="1" marL="914400" rtl="0" algn="l">
-              <a:spcBef>
-                <a:spcPts val="0"/>
-              </a:spcBef>
-              <a:spcAft>
-                <a:spcPts val="0"/>
-              </a:spcAft>
-              <a:buSzPts val="1800"/>
-              <a:buChar char="○"/>
-            </a:pPr>
-            <a:r>
-              <a:rPr lang="en" sz="1800"/>
-              <a:t>2 in time trials</a:t>
-            </a:r>
-            <a:endParaRPr sz="1800"/>
-          </a:p>
-          <a:p>
-            <a:pPr indent="-342900" lvl="1" marL="914400" rtl="0" algn="l">
-              <a:spcBef>
-                <a:spcPts val="0"/>
-              </a:spcBef>
-              <a:spcAft>
-                <a:spcPts val="0"/>
-              </a:spcAft>
-              <a:buSzPts val="1800"/>
-              <a:buChar char="○"/>
-            </a:pPr>
-            <a:r>
-              <a:rPr lang="en" sz="1800"/>
-              <a:t>2 in object avoidance with 2 fixed objects</a:t>
-            </a:r>
-            <a:endParaRPr sz="1800"/>
-          </a:p>
-          <a:p>
-            <a:pPr indent="-342900" lvl="0" marL="457200" rtl="0" algn="l">
-              <a:spcBef>
-                <a:spcPts val="0"/>
-              </a:spcBef>
-              <a:spcAft>
-                <a:spcPts val="0"/>
-              </a:spcAft>
-              <a:buSzPts val="1800"/>
-              <a:buChar char="●"/>
-            </a:pPr>
-            <a:r>
-              <a:rPr lang="en" sz="1800"/>
-              <a:t>Only 29% of project’s budget was used</a:t>
-            </a:r>
-            <a:endParaRPr sz="1800"/>
-          </a:p>
-          <a:p>
-            <a:pPr indent="-342900" lvl="0" marL="457200" rtl="0" algn="l">
-              <a:spcBef>
-                <a:spcPts val="0"/>
-              </a:spcBef>
-              <a:spcAft>
-                <a:spcPts val="0"/>
-              </a:spcAft>
-              <a:buSzPts val="1800"/>
-              <a:buChar char="●"/>
-            </a:pPr>
-            <a:r>
-              <a:rPr lang="en" sz="1800"/>
-              <a:t>Important Setup</a:t>
-            </a:r>
-            <a:endParaRPr sz="1800"/>
-          </a:p>
-          <a:p>
-            <a:pPr indent="-342900" lvl="1" marL="914400" rtl="0" algn="l">
-              <a:spcBef>
-                <a:spcPts val="0"/>
-              </a:spcBef>
-              <a:spcAft>
-                <a:spcPts val="0"/>
-              </a:spcAft>
-              <a:buSzPts val="1800"/>
-              <a:buChar char="○"/>
-            </a:pPr>
-            <a:r>
-              <a:rPr lang="en" sz="1800"/>
-              <a:t>Discount factor for hyperparameters</a:t>
-            </a:r>
-            <a:endParaRPr sz="1800"/>
-          </a:p>
-          <a:p>
-            <a:pPr indent="-342900" lvl="1" marL="914400" rtl="0" algn="l">
-              <a:spcBef>
-                <a:spcPts val="0"/>
-              </a:spcBef>
-              <a:spcAft>
-                <a:spcPts val="0"/>
-              </a:spcAft>
-              <a:buSzPts val="1800"/>
-              <a:buChar char="○"/>
-            </a:pPr>
-            <a:r>
-              <a:rPr lang="en" sz="1800"/>
-              <a:t>Stereo camera for sensors</a:t>
-            </a:r>
-            <a:endParaRPr sz="1800"/>
-          </a:p>
-          <a:p>
-            <a:pPr indent="-342900" lvl="1" marL="914400" rtl="0" algn="l">
-              <a:spcBef>
-                <a:spcPts val="0"/>
-              </a:spcBef>
-              <a:spcAft>
-                <a:spcPts val="0"/>
-              </a:spcAft>
-              <a:buSzPts val="1800"/>
-              <a:buChar char="○"/>
-            </a:pPr>
-            <a:r>
-              <a:rPr lang="en" sz="1800"/>
-              <a:t>Waypoints and objects_location for parameters</a:t>
-            </a:r>
-            <a:endParaRPr sz="1800"/>
-          </a:p>
-          <a:p>
-            <a:pPr indent="0" lvl="0" marL="0" rtl="0" algn="l">
-              <a:spcBef>
-                <a:spcPts val="1200"/>
-              </a:spcBef>
-              <a:spcAft>
-                <a:spcPts val="1200"/>
-              </a:spcAft>
-              <a:buNone/>
-            </a:pPr>
-            <a:r>
-              <a:t/>
-            </a:r>
-            <a:endParaRPr sz="1800"/>
-          </a:p>
-        </p:txBody>
-      </p:sp>
+      </p:pic>
     </p:spTree>
   </p:cSld>
   <p:clrMapOvr>
@@ -12991,7 +13653,7 @@
                 <a:spcPts val="0"/>
               </a:spcAft>
               <a:buSzPts val="1800"/>
-              <a:buChar char="-"/>
+              <a:buChar char="●"/>
             </a:pPr>
             <a:r>
               <a:rPr lang="en" sz="1800"/>
@@ -13012,7 +13674,7 @@
                 <a:spcPts val="0"/>
               </a:spcAft>
               <a:buSzPts val="1800"/>
-              <a:buChar char="-"/>
+              <a:buChar char="○"/>
             </a:pPr>
             <a:r>
               <a:rPr lang="en" sz="1800"/>
@@ -13029,11 +13691,11 @@
                 <a:spcPts val="0"/>
               </a:spcAft>
               <a:buSzPts val="1800"/>
-              <a:buChar char="-"/>
+              <a:buChar char="●"/>
             </a:pPr>
             <a:r>
               <a:rPr lang="en" sz="1800"/>
-              <a:t>4 models passed evaluation (3 laps without crashing)</a:t>
+              <a:t>4 models passed evaluation</a:t>
             </a:r>
             <a:endParaRPr sz="1800"/>
           </a:p>
@@ -13046,11 +13708,11 @@
                 <a:spcPts val="0"/>
               </a:spcAft>
               <a:buSzPts val="1800"/>
-              <a:buChar char="-"/>
+              <a:buChar char="○"/>
             </a:pPr>
             <a:r>
               <a:rPr lang="en" sz="1800"/>
-              <a:t>2 in time trials</a:t>
+              <a:t>3 laps without going completely off track</a:t>
             </a:r>
             <a:endParaRPr sz="1800"/>
           </a:p>
@@ -13063,11 +13725,11 @@
                 <a:spcPts val="0"/>
               </a:spcAft>
               <a:buSzPts val="1800"/>
-              <a:buChar char="-"/>
+              <a:buChar char="○"/>
             </a:pPr>
             <a:r>
               <a:rPr lang="en" sz="1800"/>
-              <a:t>2 in object avoidance with 2 fixed objects</a:t>
+              <a:t>Some also avoided 2 fixed objects</a:t>
             </a:r>
             <a:endParaRPr sz="1800"/>
           </a:p>
@@ -13080,7 +13742,7 @@
                 <a:spcPts val="0"/>
               </a:spcAft>
               <a:buSzPts val="1800"/>
-              <a:buChar char="-"/>
+              <a:buChar char="●"/>
             </a:pPr>
             <a:r>
               <a:rPr lang="en" sz="1800"/>
@@ -13103,7 +13765,7 @@
   <p:cSld>
     <p:spTree>
       <p:nvGrpSpPr>
-        <p:cNvPr id="259" name="Shape 259"/>
+        <p:cNvPr id="261" name="Shape 261"/>
         <p:cNvGrpSpPr/>
         <p:nvPr/>
       </p:nvGrpSpPr>
@@ -13117,7 +13779,7 @@
       </p:grpSpPr>
       <p:sp>
         <p:nvSpPr>
-          <p:cNvPr id="260" name="Google Shape;260;p32"/>
+          <p:cNvPr id="262" name="Google Shape;262;p32"/>
           <p:cNvSpPr txBox="1"/>
           <p:nvPr>
             <p:ph type="title"/>
@@ -13149,6 +13811,263 @@
             </a:pPr>
             <a:r>
               <a:rPr lang="en" sz="3000"/>
+              <a:t>Conclusion</a:t>
+            </a:r>
+            <a:endParaRPr sz="3000"/>
+          </a:p>
+        </p:txBody>
+      </p:sp>
+      <p:sp>
+        <p:nvSpPr>
+          <p:cNvPr id="263" name="Google Shape;263;p32"/>
+          <p:cNvSpPr txBox="1"/>
+          <p:nvPr>
+            <p:ph idx="1" type="body"/>
+          </p:nvPr>
+        </p:nvSpPr>
+        <p:spPr>
+          <a:xfrm>
+            <a:off x="1297500" y="1273775"/>
+            <a:ext cx="7038900" cy="3536700"/>
+          </a:xfrm>
+          <a:prstGeom prst="rect">
+            <a:avLst/>
+          </a:prstGeom>
+        </p:spPr>
+        <p:txBody>
+          <a:bodyPr anchorCtr="0" anchor="t" bIns="91425" lIns="91425" spcFirstLastPara="1" rIns="91425" wrap="square" tIns="91425">
+            <a:normAutofit/>
+          </a:bodyPr>
+          <a:lstStyle/>
+          <a:p>
+            <a:pPr indent="-342900" lvl="0" marL="457200" rtl="0" algn="l">
+              <a:spcBef>
+                <a:spcPts val="0"/>
+              </a:spcBef>
+              <a:spcAft>
+                <a:spcPts val="0"/>
+              </a:spcAft>
+              <a:buSzPts val="1800"/>
+              <a:buChar char="●"/>
+            </a:pPr>
+            <a:r>
+              <a:rPr lang="en" sz="1800"/>
+              <a:t>4 models passed evaluation</a:t>
+            </a:r>
+            <a:endParaRPr sz="1800"/>
+          </a:p>
+          <a:p>
+            <a:pPr indent="-342900" lvl="1" marL="914400" rtl="0" algn="l">
+              <a:spcBef>
+                <a:spcPts val="0"/>
+              </a:spcBef>
+              <a:spcAft>
+                <a:spcPts val="0"/>
+              </a:spcAft>
+              <a:buSzPts val="1800"/>
+              <a:buChar char="○"/>
+            </a:pPr>
+            <a:r>
+              <a:rPr lang="en" sz="1800"/>
+              <a:t>2 in time trials</a:t>
+            </a:r>
+            <a:endParaRPr sz="1800"/>
+          </a:p>
+          <a:p>
+            <a:pPr indent="-342900" lvl="1" marL="914400" rtl="0" algn="l">
+              <a:spcBef>
+                <a:spcPts val="0"/>
+              </a:spcBef>
+              <a:spcAft>
+                <a:spcPts val="0"/>
+              </a:spcAft>
+              <a:buSzPts val="1800"/>
+              <a:buChar char="○"/>
+            </a:pPr>
+            <a:r>
+              <a:rPr lang="en" sz="1800"/>
+              <a:t>2 in object avoidance with 2 fixed objects</a:t>
+            </a:r>
+            <a:endParaRPr sz="1800"/>
+          </a:p>
+          <a:p>
+            <a:pPr indent="-342900" lvl="0" marL="457200" rtl="0" algn="l">
+              <a:spcBef>
+                <a:spcPts val="0"/>
+              </a:spcBef>
+              <a:spcAft>
+                <a:spcPts val="0"/>
+              </a:spcAft>
+              <a:buSzPts val="1800"/>
+              <a:buChar char="●"/>
+            </a:pPr>
+            <a:r>
+              <a:rPr lang="en" sz="1800"/>
+              <a:t>Important Setup</a:t>
+            </a:r>
+            <a:endParaRPr sz="1800"/>
+          </a:p>
+          <a:p>
+            <a:pPr indent="-342900" lvl="1" marL="914400" rtl="0" algn="l">
+              <a:spcBef>
+                <a:spcPts val="0"/>
+              </a:spcBef>
+              <a:spcAft>
+                <a:spcPts val="0"/>
+              </a:spcAft>
+              <a:buSzPts val="1800"/>
+              <a:buChar char="○"/>
+            </a:pPr>
+            <a:r>
+              <a:rPr lang="en" sz="1800"/>
+              <a:t>Discount factor for hyperparameters</a:t>
+            </a:r>
+            <a:endParaRPr sz="1800"/>
+          </a:p>
+          <a:p>
+            <a:pPr indent="-342900" lvl="1" marL="914400" rtl="0" algn="l">
+              <a:spcBef>
+                <a:spcPts val="0"/>
+              </a:spcBef>
+              <a:spcAft>
+                <a:spcPts val="0"/>
+              </a:spcAft>
+              <a:buSzPts val="1800"/>
+              <a:buChar char="○"/>
+            </a:pPr>
+            <a:r>
+              <a:rPr lang="en" sz="1800"/>
+              <a:t>Stereo camera for sensors</a:t>
+            </a:r>
+            <a:endParaRPr sz="1800"/>
+          </a:p>
+          <a:p>
+            <a:pPr indent="-342900" lvl="1" marL="914400" rtl="0" algn="l">
+              <a:spcBef>
+                <a:spcPts val="0"/>
+              </a:spcBef>
+              <a:spcAft>
+                <a:spcPts val="0"/>
+              </a:spcAft>
+              <a:buSzPts val="1800"/>
+              <a:buChar char="○"/>
+            </a:pPr>
+            <a:r>
+              <a:rPr lang="en" sz="1800"/>
+              <a:t>Waypoints and objects_location for parameters</a:t>
+            </a:r>
+            <a:endParaRPr sz="1800"/>
+          </a:p>
+          <a:p>
+            <a:pPr indent="-342900" lvl="0" marL="457200" rtl="0" algn="l">
+              <a:spcBef>
+                <a:spcPts val="0"/>
+              </a:spcBef>
+              <a:spcAft>
+                <a:spcPts val="0"/>
+              </a:spcAft>
+              <a:buSzPts val="1800"/>
+              <a:buChar char="●"/>
+            </a:pPr>
+            <a:r>
+              <a:rPr lang="en" sz="1800"/>
+              <a:t>Only 29% of project’s budget was used</a:t>
+            </a:r>
+            <a:endParaRPr sz="1800"/>
+          </a:p>
+          <a:p>
+            <a:pPr indent="-342900" lvl="0" marL="457200" rtl="0" algn="l">
+              <a:spcBef>
+                <a:spcPts val="0"/>
+              </a:spcBef>
+              <a:spcAft>
+                <a:spcPts val="0"/>
+              </a:spcAft>
+              <a:buSzPts val="1800"/>
+              <a:buChar char="●"/>
+            </a:pPr>
+            <a:r>
+              <a:rPr lang="en" sz="1800"/>
+              <a:t>Training times need to be increased for more robust results</a:t>
+            </a:r>
+            <a:endParaRPr sz="1800"/>
+          </a:p>
+          <a:p>
+            <a:pPr indent="0" lvl="0" marL="0" rtl="0" algn="l">
+              <a:spcBef>
+                <a:spcPts val="1200"/>
+              </a:spcBef>
+              <a:spcAft>
+                <a:spcPts val="1200"/>
+              </a:spcAft>
+              <a:buNone/>
+            </a:pPr>
+            <a:r>
+              <a:t/>
+            </a:r>
+            <a:endParaRPr sz="1800"/>
+          </a:p>
+        </p:txBody>
+      </p:sp>
+    </p:spTree>
+  </p:cSld>
+  <p:clrMapOvr>
+    <a:masterClrMapping/>
+  </p:clrMapOvr>
+</p:sld>
+</file>
+
+<file path=ppt/slides/slide21.xml><?xml version="1.0" encoding="utf-8"?>
+<p:sld xmlns:a="http://schemas.openxmlformats.org/drawingml/2006/main" xmlns:r="http://schemas.openxmlformats.org/officeDocument/2006/relationships" xmlns:mc="http://schemas.openxmlformats.org/markup-compatibility/2006" xmlns:mv="urn:schemas-microsoft-com:mac:vml" xmlns:p="http://schemas.openxmlformats.org/presentationml/2006/main" xmlns:c="http://schemas.openxmlformats.org/drawingml/2006/chart" xmlns:dgm="http://schemas.openxmlformats.org/drawingml/2006/diagram" xmlns:o="urn:schemas-microsoft-com:office:office" xmlns:v="urn:schemas-microsoft-com:vml" xmlns:pvml="urn:schemas-microsoft-com:office:powerpoint" xmlns:com="http://schemas.openxmlformats.org/drawingml/2006/compatibility" xmlns:p14="http://schemas.microsoft.com/office/powerpoint/2010/main" xmlns:p15="http://schemas.microsoft.com/office/powerpoint/2012/main" xmlns:ahyp="http://schemas.microsoft.com/office/drawing/2018/hyperlinkcolor">
+  <p:cSld>
+    <p:spTree>
+      <p:nvGrpSpPr>
+        <p:cNvPr id="267" name="Shape 267"/>
+        <p:cNvGrpSpPr/>
+        <p:nvPr/>
+      </p:nvGrpSpPr>
+      <p:grpSpPr>
+        <a:xfrm>
+          <a:off x="0" y="0"/>
+          <a:ext cx="0" cy="0"/>
+          <a:chOff x="0" y="0"/>
+          <a:chExt cx="0" cy="0"/>
+        </a:xfrm>
+      </p:grpSpPr>
+      <p:sp>
+        <p:nvSpPr>
+          <p:cNvPr id="268" name="Google Shape;268;p33"/>
+          <p:cNvSpPr txBox="1"/>
+          <p:nvPr>
+            <p:ph type="title"/>
+          </p:nvPr>
+        </p:nvSpPr>
+        <p:spPr>
+          <a:xfrm>
+            <a:off x="1297500" y="393750"/>
+            <a:ext cx="7038900" cy="914100"/>
+          </a:xfrm>
+          <a:prstGeom prst="rect">
+            <a:avLst/>
+          </a:prstGeom>
+        </p:spPr>
+        <p:txBody>
+          <a:bodyPr anchorCtr="0" anchor="t" bIns="91425" lIns="91425" spcFirstLastPara="1" rIns="91425" wrap="square" tIns="91425">
+            <a:normAutofit/>
+          </a:bodyPr>
+          <a:lstStyle/>
+          <a:p>
+            <a:pPr indent="0" lvl="0" marL="0" rtl="0" algn="l">
+              <a:spcBef>
+                <a:spcPts val="0"/>
+              </a:spcBef>
+              <a:spcAft>
+                <a:spcPts val="0"/>
+              </a:spcAft>
+              <a:buNone/>
+            </a:pPr>
+            <a:r>
+              <a:rPr lang="en" sz="3000"/>
               <a:t>Next Steps</a:t>
             </a:r>
             <a:endParaRPr sz="3000"/>
@@ -13157,7 +14076,7 @@
       </p:sp>
       <p:sp>
         <p:nvSpPr>
-          <p:cNvPr id="261" name="Google Shape;261;p32"/>
+          <p:cNvPr id="269" name="Google Shape;269;p33"/>
           <p:cNvSpPr txBox="1"/>
           <p:nvPr>
             <p:ph idx="1" type="body"/>
@@ -13186,7 +14105,7 @@
                 <a:spcPts val="0"/>
               </a:spcAft>
               <a:buSzPts val="1800"/>
-              <a:buChar char="-"/>
+              <a:buChar char="●"/>
             </a:pPr>
             <a:r>
               <a:rPr lang="en" sz="1800"/>
@@ -13203,7 +14122,7 @@
                 <a:spcPts val="0"/>
               </a:spcAft>
               <a:buSzPts val="1800"/>
-              <a:buChar char="-"/>
+              <a:buChar char="○"/>
             </a:pPr>
             <a:r>
               <a:rPr lang="en" sz="1800"/>
@@ -13220,7 +14139,7 @@
                 <a:spcPts val="0"/>
               </a:spcAft>
               <a:buSzPts val="1800"/>
-              <a:buChar char="-"/>
+              <a:buChar char="○"/>
             </a:pPr>
             <a:r>
               <a:rPr lang="en" sz="1800"/>
@@ -13237,7 +14156,7 @@
                 <a:spcPts val="0"/>
               </a:spcAft>
               <a:buSzPts val="1800"/>
-              <a:buChar char="-"/>
+              <a:buChar char="●"/>
             </a:pPr>
             <a:r>
               <a:rPr lang="en" sz="1800"/>
@@ -13254,7 +14173,7 @@
                 <a:spcPts val="0"/>
               </a:spcAft>
               <a:buSzPts val="1800"/>
-              <a:buChar char="-"/>
+              <a:buChar char="●"/>
             </a:pPr>
             <a:r>
               <a:rPr lang="en" sz="1800"/>
@@ -13270,6 +14189,23 @@
             </a:r>
             <a:endParaRPr sz="1800"/>
           </a:p>
+          <a:p>
+            <a:pPr indent="-342900" lvl="0" marL="457200" rtl="0" algn="l">
+              <a:spcBef>
+                <a:spcPts val="0"/>
+              </a:spcBef>
+              <a:spcAft>
+                <a:spcPts val="0"/>
+              </a:spcAft>
+              <a:buSzPts val="1800"/>
+              <a:buChar char="●"/>
+            </a:pPr>
+            <a:r>
+              <a:rPr lang="en" sz="1800"/>
+              <a:t>Compete in head-to-head races</a:t>
+            </a:r>
+            <a:endParaRPr sz="1800"/>
+          </a:p>
         </p:txBody>
       </p:sp>
     </p:spTree>
@@ -13280,12 +14216,12 @@
 </p:sld>
 </file>
 
-<file path=ppt/slides/slide21.xml><?xml version="1.0" encoding="utf-8"?>
+<file path=ppt/slides/slide22.xml><?xml version="1.0" encoding="utf-8"?>
 <p:sld xmlns:a="http://schemas.openxmlformats.org/drawingml/2006/main" xmlns:r="http://schemas.openxmlformats.org/officeDocument/2006/relationships" xmlns:mc="http://schemas.openxmlformats.org/markup-compatibility/2006" xmlns:mv="urn:schemas-microsoft-com:mac:vml" xmlns:p="http://schemas.openxmlformats.org/presentationml/2006/main" xmlns:c="http://schemas.openxmlformats.org/drawingml/2006/chart" xmlns:dgm="http://schemas.openxmlformats.org/drawingml/2006/diagram" xmlns:o="urn:schemas-microsoft-com:office:office" xmlns:v="urn:schemas-microsoft-com:vml" xmlns:pvml="urn:schemas-microsoft-com:office:powerpoint" xmlns:com="http://schemas.openxmlformats.org/drawingml/2006/compatibility" xmlns:p14="http://schemas.microsoft.com/office/powerpoint/2010/main" xmlns:p15="http://schemas.microsoft.com/office/powerpoint/2012/main" xmlns:ahyp="http://schemas.microsoft.com/office/drawing/2018/hyperlinkcolor">
   <p:cSld>
     <p:spTree>
       <p:nvGrpSpPr>
-        <p:cNvPr id="265" name="Shape 265"/>
+        <p:cNvPr id="273" name="Shape 273"/>
         <p:cNvGrpSpPr/>
         <p:nvPr/>
       </p:nvGrpSpPr>
@@ -13299,7 +14235,7 @@
       </p:grpSpPr>
       <p:sp>
         <p:nvSpPr>
-          <p:cNvPr id="266" name="Google Shape;266;p33"/>
+          <p:cNvPr id="274" name="Google Shape;274;p34"/>
           <p:cNvSpPr txBox="1"/>
           <p:nvPr>
             <p:ph type="title"/>
@@ -13339,7 +14275,7 @@
       </p:sp>
       <p:sp>
         <p:nvSpPr>
-          <p:cNvPr id="267" name="Google Shape;267;p33"/>
+          <p:cNvPr id="275" name="Google Shape;275;p34"/>
           <p:cNvSpPr txBox="1"/>
           <p:nvPr>
             <p:ph idx="1" type="body"/>
@@ -13734,7 +14670,7 @@
                 <a:spcPts val="0"/>
               </a:spcAft>
               <a:buSzPts val="1800"/>
-              <a:buChar char="-"/>
+              <a:buChar char="●"/>
             </a:pPr>
             <a:r>
               <a:rPr lang="en" sz="1800"/>
@@ -13751,7 +14687,7 @@
                 <a:spcPts val="0"/>
               </a:spcAft>
               <a:buSzPts val="1800"/>
-              <a:buChar char="-"/>
+              <a:buChar char="●"/>
             </a:pPr>
             <a:r>
               <a:rPr lang="en" sz="1800"/>
@@ -13768,7 +14704,7 @@
                 <a:spcPts val="0"/>
               </a:spcAft>
               <a:buSzPts val="1800"/>
-              <a:buChar char="-"/>
+              <a:buChar char="●"/>
             </a:pPr>
             <a:r>
               <a:rPr lang="en" sz="1800"/>
@@ -13785,7 +14721,7 @@
                 <a:spcPts val="0"/>
               </a:spcAft>
               <a:buSzPts val="1800"/>
-              <a:buChar char="-"/>
+              <a:buChar char="●"/>
             </a:pPr>
             <a:r>
               <a:rPr lang="en" sz="1800"/>
@@ -13982,6 +14918,57 @@
             </a:r>
             <a:endParaRPr sz="1800"/>
           </a:p>
+          <a:p>
+            <a:pPr indent="-342900" lvl="0" marL="457200" rtl="0" algn="l">
+              <a:spcBef>
+                <a:spcPts val="0"/>
+              </a:spcBef>
+              <a:spcAft>
+                <a:spcPts val="0"/>
+              </a:spcAft>
+              <a:buSzPts val="1800"/>
+              <a:buChar char="●"/>
+            </a:pPr>
+            <a:r>
+              <a:rPr lang="en" sz="1800"/>
+              <a:t>CloudFormation</a:t>
+            </a:r>
+            <a:endParaRPr sz="1800"/>
+          </a:p>
+          <a:p>
+            <a:pPr indent="-342900" lvl="0" marL="457200" rtl="0" algn="l">
+              <a:spcBef>
+                <a:spcPts val="0"/>
+              </a:spcBef>
+              <a:spcAft>
+                <a:spcPts val="0"/>
+              </a:spcAft>
+              <a:buSzPts val="1800"/>
+              <a:buChar char="●"/>
+            </a:pPr>
+            <a:r>
+              <a:rPr lang="en" sz="1800"/>
+              <a:t>Lambda</a:t>
+            </a:r>
+            <a:endParaRPr sz="1800"/>
+          </a:p>
+          <a:p>
+            <a:pPr indent="-342900" lvl="0" marL="457200" rtl="0" algn="l">
+              <a:spcBef>
+                <a:spcPts val="0"/>
+              </a:spcBef>
+              <a:spcAft>
+                <a:spcPts val="0"/>
+              </a:spcAft>
+              <a:buSzPts val="1800"/>
+              <a:buChar char="●"/>
+            </a:pPr>
+            <a:r>
+              <a:rPr lang="en" sz="1800"/>
+              <a:t>Tensorflow</a:t>
+            </a:r>
+            <a:endParaRPr sz="1800"/>
+          </a:p>
         </p:txBody>
       </p:sp>
     </p:spTree>
@@ -14043,7 +15030,11 @@
             </a:pPr>
             <a:r>
               <a:rPr lang="en" sz="3000"/>
-              <a:t>Tracks</a:t>
+              <a:t>Project’s </a:t>
+            </a:r>
+            <a:r>
+              <a:rPr lang="en" sz="3000"/>
+              <a:t>Budget was $100</a:t>
             </a:r>
             <a:endParaRPr sz="3000"/>
           </a:p>
@@ -14052,6 +15043,289 @@
       <p:sp>
         <p:nvSpPr>
           <p:cNvPr id="166" name="Google Shape;166;p18"/>
+          <p:cNvSpPr txBox="1"/>
+          <p:nvPr>
+            <p:ph idx="1" type="body"/>
+          </p:nvPr>
+        </p:nvSpPr>
+        <p:spPr>
+          <a:xfrm>
+            <a:off x="1297500" y="1201250"/>
+            <a:ext cx="7416900" cy="3216900"/>
+          </a:xfrm>
+          <a:prstGeom prst="rect">
+            <a:avLst/>
+          </a:prstGeom>
+        </p:spPr>
+        <p:txBody>
+          <a:bodyPr anchorCtr="0" anchor="t" bIns="91425" lIns="91425" spcFirstLastPara="1" rIns="91425" wrap="square" tIns="91425">
+            <a:normAutofit/>
+          </a:bodyPr>
+          <a:lstStyle/>
+          <a:p>
+            <a:pPr indent="-342900" lvl="0" marL="457200" rtl="0" algn="l">
+              <a:spcBef>
+                <a:spcPts val="0"/>
+              </a:spcBef>
+              <a:spcAft>
+                <a:spcPts val="0"/>
+              </a:spcAft>
+              <a:buSzPts val="1800"/>
+              <a:buChar char="●"/>
+            </a:pPr>
+            <a:r>
+              <a:rPr lang="en" sz="1800"/>
+              <a:t>Evaluated progress after:</a:t>
+            </a:r>
+            <a:endParaRPr sz="1800"/>
+          </a:p>
+          <a:p>
+            <a:pPr indent="-342900" lvl="1" marL="914400" rtl="0" algn="l">
+              <a:spcBef>
+                <a:spcPts val="0"/>
+              </a:spcBef>
+              <a:spcAft>
+                <a:spcPts val="0"/>
+              </a:spcAft>
+              <a:buSzPts val="1800"/>
+              <a:buChar char="○"/>
+            </a:pPr>
+            <a:r>
+              <a:rPr lang="en" sz="1800"/>
+              <a:t>free trial had expired</a:t>
+            </a:r>
+            <a:endParaRPr sz="1800"/>
+          </a:p>
+          <a:p>
+            <a:pPr indent="-342900" lvl="1" marL="914400" rtl="0" algn="l">
+              <a:spcBef>
+                <a:spcPts val="0"/>
+              </a:spcBef>
+              <a:spcAft>
+                <a:spcPts val="0"/>
+              </a:spcAft>
+              <a:buSzPts val="1800"/>
+              <a:buChar char="○"/>
+            </a:pPr>
+            <a:r>
+              <a:rPr lang="en" sz="1800"/>
+              <a:t>every $25</a:t>
+            </a:r>
+            <a:endParaRPr sz="1800"/>
+          </a:p>
+          <a:p>
+            <a:pPr indent="-342900" lvl="0" marL="457200" rtl="0" algn="l">
+              <a:spcBef>
+                <a:spcPts val="0"/>
+              </a:spcBef>
+              <a:spcAft>
+                <a:spcPts val="0"/>
+              </a:spcAft>
+              <a:buSzPts val="1800"/>
+              <a:buChar char="●"/>
+            </a:pPr>
+            <a:r>
+              <a:rPr lang="en" sz="1800"/>
+              <a:t>Spent $28.64 total</a:t>
+            </a:r>
+            <a:endParaRPr sz="1800"/>
+          </a:p>
+          <a:p>
+            <a:pPr indent="-342900" lvl="0" marL="457200" rtl="0" algn="l">
+              <a:spcBef>
+                <a:spcPts val="0"/>
+              </a:spcBef>
+              <a:spcAft>
+                <a:spcPts val="0"/>
+              </a:spcAft>
+              <a:buSzPts val="1800"/>
+              <a:buChar char="●"/>
+            </a:pPr>
+            <a:r>
+              <a:t/>
+            </a:r>
+            <a:endParaRPr sz="1800"/>
+          </a:p>
+          <a:p>
+            <a:pPr indent="-342900" lvl="0" marL="457200" rtl="0" algn="l">
+              <a:spcBef>
+                <a:spcPts val="0"/>
+              </a:spcBef>
+              <a:spcAft>
+                <a:spcPts val="0"/>
+              </a:spcAft>
+              <a:buSzPts val="1800"/>
+              <a:buChar char="●"/>
+            </a:pPr>
+            <a:r>
+              <a:t/>
+            </a:r>
+            <a:endParaRPr sz="1800"/>
+          </a:p>
+          <a:p>
+            <a:pPr indent="-342900" lvl="0" marL="457200" rtl="0" algn="l">
+              <a:spcBef>
+                <a:spcPts val="0"/>
+              </a:spcBef>
+              <a:spcAft>
+                <a:spcPts val="0"/>
+              </a:spcAft>
+              <a:buSzPts val="1800"/>
+              <a:buChar char="●"/>
+            </a:pPr>
+            <a:r>
+              <a:t/>
+            </a:r>
+            <a:endParaRPr sz="1800"/>
+          </a:p>
+          <a:p>
+            <a:pPr indent="-342900" lvl="0" marL="457200" rtl="0" algn="l">
+              <a:spcBef>
+                <a:spcPts val="0"/>
+              </a:spcBef>
+              <a:spcAft>
+                <a:spcPts val="0"/>
+              </a:spcAft>
+              <a:buSzPts val="1800"/>
+              <a:buChar char="●"/>
+            </a:pPr>
+            <a:r>
+              <a:rPr lang="en" sz="1800"/>
+              <a:t>Some examples online would cost $10k+ to replicate</a:t>
+            </a:r>
+            <a:endParaRPr sz="1800"/>
+          </a:p>
+          <a:p>
+            <a:pPr indent="-342900" lvl="0" marL="457200" rtl="0" algn="l">
+              <a:spcBef>
+                <a:spcPts val="0"/>
+              </a:spcBef>
+              <a:spcAft>
+                <a:spcPts val="0"/>
+              </a:spcAft>
+              <a:buSzPts val="1800"/>
+              <a:buChar char="●"/>
+            </a:pPr>
+            <a:r>
+              <a:rPr lang="en" sz="1800"/>
+              <a:t>See Next Steps slide for ways to reduce</a:t>
+            </a:r>
+            <a:endParaRPr sz="1800"/>
+          </a:p>
+        </p:txBody>
+      </p:sp>
+      <p:pic>
+        <p:nvPicPr>
+          <p:cNvPr id="167" name="Google Shape;167;p18"/>
+          <p:cNvPicPr preferRelativeResize="0"/>
+          <p:nvPr/>
+        </p:nvPicPr>
+        <p:blipFill>
+          <a:blip r:embed="rId3">
+            <a:alphaModFix/>
+          </a:blip>
+          <a:stretch>
+            <a:fillRect/>
+          </a:stretch>
+        </p:blipFill>
+        <p:spPr>
+          <a:xfrm>
+            <a:off x="1164275" y="2571751"/>
+            <a:ext cx="7416950" cy="832300"/>
+          </a:xfrm>
+          <a:prstGeom prst="rect">
+            <a:avLst/>
+          </a:prstGeom>
+          <a:noFill/>
+          <a:ln>
+            <a:noFill/>
+          </a:ln>
+        </p:spPr>
+      </p:pic>
+    </p:spTree>
+  </p:cSld>
+  <p:clrMapOvr>
+    <a:masterClrMapping/>
+  </p:clrMapOvr>
+</p:sld>
+</file>
+
+<file path=ppt/slides/slide7.xml><?xml version="1.0" encoding="utf-8"?>
+<p:sld xmlns:a="http://schemas.openxmlformats.org/drawingml/2006/main" xmlns:r="http://schemas.openxmlformats.org/officeDocument/2006/relationships" xmlns:mc="http://schemas.openxmlformats.org/markup-compatibility/2006" xmlns:mv="urn:schemas-microsoft-com:mac:vml" xmlns:p="http://schemas.openxmlformats.org/presentationml/2006/main" xmlns:c="http://schemas.openxmlformats.org/drawingml/2006/chart" xmlns:dgm="http://schemas.openxmlformats.org/drawingml/2006/diagram" xmlns:o="urn:schemas-microsoft-com:office:office" xmlns:v="urn:schemas-microsoft-com:vml" xmlns:pvml="urn:schemas-microsoft-com:office:powerpoint" xmlns:com="http://schemas.openxmlformats.org/drawingml/2006/compatibility" xmlns:p14="http://schemas.microsoft.com/office/powerpoint/2010/main" xmlns:p15="http://schemas.microsoft.com/office/powerpoint/2012/main" xmlns:ahyp="http://schemas.microsoft.com/office/drawing/2018/hyperlinkcolor">
+  <p:cSld>
+    <p:spTree>
+      <p:nvGrpSpPr>
+        <p:cNvPr id="171" name="Shape 171"/>
+        <p:cNvGrpSpPr/>
+        <p:nvPr/>
+      </p:nvGrpSpPr>
+      <p:grpSpPr>
+        <a:xfrm>
+          <a:off x="0" y="0"/>
+          <a:ext cx="0" cy="0"/>
+          <a:chOff x="0" y="0"/>
+          <a:chExt cx="0" cy="0"/>
+        </a:xfrm>
+      </p:grpSpPr>
+      <p:sp>
+        <p:nvSpPr>
+          <p:cNvPr id="172" name="Google Shape;172;p19"/>
+          <p:cNvSpPr txBox="1"/>
+          <p:nvPr>
+            <p:ph type="title"/>
+          </p:nvPr>
+        </p:nvSpPr>
+        <p:spPr>
+          <a:xfrm>
+            <a:off x="1297500" y="393750"/>
+            <a:ext cx="7038900" cy="914100"/>
+          </a:xfrm>
+          <a:prstGeom prst="rect">
+            <a:avLst/>
+          </a:prstGeom>
+        </p:spPr>
+        <p:txBody>
+          <a:bodyPr anchorCtr="0" anchor="t" bIns="91425" lIns="91425" spcFirstLastPara="1" rIns="91425" wrap="square" tIns="91425">
+            <a:normAutofit fontScale="90000"/>
+          </a:bodyPr>
+          <a:lstStyle/>
+          <a:p>
+            <a:pPr indent="0" lvl="0" marL="0" rtl="0" algn="l">
+              <a:spcBef>
+                <a:spcPts val="0"/>
+              </a:spcBef>
+              <a:spcAft>
+                <a:spcPts val="0"/>
+              </a:spcAft>
+              <a:buNone/>
+            </a:pPr>
+            <a:r>
+              <a:rPr lang="en" sz="3300"/>
+              <a:t>Setup Models</a:t>
+            </a:r>
+            <a:endParaRPr sz="3300"/>
+          </a:p>
+          <a:p>
+            <a:pPr indent="0" lvl="0" marL="0" rtl="0" algn="l">
+              <a:spcBef>
+                <a:spcPts val="0"/>
+              </a:spcBef>
+              <a:spcAft>
+                <a:spcPts val="0"/>
+              </a:spcAft>
+              <a:buNone/>
+            </a:pPr>
+            <a:r>
+              <a:rPr lang="en" sz="2650"/>
+              <a:t>Tracks</a:t>
+            </a:r>
+            <a:endParaRPr sz="2650"/>
+          </a:p>
+        </p:txBody>
+      </p:sp>
+      <p:sp>
+        <p:nvSpPr>
+          <p:cNvPr id="173" name="Google Shape;173;p19"/>
           <p:cNvSpPr txBox="1"/>
           <p:nvPr>
             <p:ph idx="1" type="body"/>
@@ -14175,157 +15449,6 @@
           </a:p>
         </p:txBody>
       </p:sp>
-    </p:spTree>
-  </p:cSld>
-  <p:clrMapOvr>
-    <a:masterClrMapping/>
-  </p:clrMapOvr>
-</p:sld>
-</file>
-
-<file path=ppt/slides/slide7.xml><?xml version="1.0" encoding="utf-8"?>
-<p:sld xmlns:a="http://schemas.openxmlformats.org/drawingml/2006/main" xmlns:r="http://schemas.openxmlformats.org/officeDocument/2006/relationships" xmlns:mc="http://schemas.openxmlformats.org/markup-compatibility/2006" xmlns:mv="urn:schemas-microsoft-com:mac:vml" xmlns:p="http://schemas.openxmlformats.org/presentationml/2006/main" xmlns:c="http://schemas.openxmlformats.org/drawingml/2006/chart" xmlns:dgm="http://schemas.openxmlformats.org/drawingml/2006/diagram" xmlns:o="urn:schemas-microsoft-com:office:office" xmlns:v="urn:schemas-microsoft-com:vml" xmlns:pvml="urn:schemas-microsoft-com:office:powerpoint" xmlns:com="http://schemas.openxmlformats.org/drawingml/2006/compatibility" xmlns:p14="http://schemas.microsoft.com/office/powerpoint/2010/main" xmlns:p15="http://schemas.microsoft.com/office/powerpoint/2012/main" xmlns:ahyp="http://schemas.microsoft.com/office/drawing/2018/hyperlinkcolor">
-  <p:cSld>
-    <p:spTree>
-      <p:nvGrpSpPr>
-        <p:cNvPr id="170" name="Shape 170"/>
-        <p:cNvGrpSpPr/>
-        <p:nvPr/>
-      </p:nvGrpSpPr>
-      <p:grpSpPr>
-        <a:xfrm>
-          <a:off x="0" y="0"/>
-          <a:ext cx="0" cy="0"/>
-          <a:chOff x="0" y="0"/>
-          <a:chExt cx="0" cy="0"/>
-        </a:xfrm>
-      </p:grpSpPr>
-      <p:sp>
-        <p:nvSpPr>
-          <p:cNvPr id="171" name="Google Shape;171;p19"/>
-          <p:cNvSpPr txBox="1"/>
-          <p:nvPr>
-            <p:ph type="title"/>
-          </p:nvPr>
-        </p:nvSpPr>
-        <p:spPr>
-          <a:xfrm>
-            <a:off x="1297500" y="393750"/>
-            <a:ext cx="7038900" cy="914100"/>
-          </a:xfrm>
-          <a:prstGeom prst="rect">
-            <a:avLst/>
-          </a:prstGeom>
-        </p:spPr>
-        <p:txBody>
-          <a:bodyPr anchorCtr="0" anchor="t" bIns="91425" lIns="91425" spcFirstLastPara="1" rIns="91425" wrap="square" tIns="91425">
-            <a:normAutofit/>
-          </a:bodyPr>
-          <a:lstStyle/>
-          <a:p>
-            <a:pPr indent="0" lvl="0" marL="0" rtl="0" algn="l">
-              <a:spcBef>
-                <a:spcPts val="0"/>
-              </a:spcBef>
-              <a:spcAft>
-                <a:spcPts val="0"/>
-              </a:spcAft>
-              <a:buNone/>
-            </a:pPr>
-            <a:r>
-              <a:rPr lang="en" sz="3000"/>
-              <a:t>Race Types</a:t>
-            </a:r>
-            <a:endParaRPr sz="3000"/>
-          </a:p>
-        </p:txBody>
-      </p:sp>
-      <p:sp>
-        <p:nvSpPr>
-          <p:cNvPr id="172" name="Google Shape;172;p19"/>
-          <p:cNvSpPr txBox="1"/>
-          <p:nvPr>
-            <p:ph idx="1" type="body"/>
-          </p:nvPr>
-        </p:nvSpPr>
-        <p:spPr>
-          <a:xfrm>
-            <a:off x="1297500" y="1567550"/>
-            <a:ext cx="7038900" cy="2911200"/>
-          </a:xfrm>
-          <a:prstGeom prst="rect">
-            <a:avLst/>
-          </a:prstGeom>
-        </p:spPr>
-        <p:txBody>
-          <a:bodyPr anchorCtr="0" anchor="t" bIns="91425" lIns="91425" spcFirstLastPara="1" rIns="91425" wrap="square" tIns="91425">
-            <a:normAutofit/>
-          </a:bodyPr>
-          <a:lstStyle/>
-          <a:p>
-            <a:pPr indent="-342900" lvl="0" marL="457200" rtl="0" algn="l">
-              <a:spcBef>
-                <a:spcPts val="0"/>
-              </a:spcBef>
-              <a:spcAft>
-                <a:spcPts val="0"/>
-              </a:spcAft>
-              <a:buSzPts val="1800"/>
-              <a:buChar char="●"/>
-            </a:pPr>
-            <a:r>
-              <a:rPr lang="en" sz="1800"/>
-              <a:t>Time trial</a:t>
-            </a:r>
-            <a:endParaRPr sz="1800"/>
-          </a:p>
-          <a:p>
-            <a:pPr indent="-342900" lvl="0" marL="457200" rtl="0" algn="l">
-              <a:spcBef>
-                <a:spcPts val="0"/>
-              </a:spcBef>
-              <a:spcAft>
-                <a:spcPts val="0"/>
-              </a:spcAft>
-              <a:buSzPts val="1800"/>
-              <a:buChar char="●"/>
-            </a:pPr>
-            <a:r>
-              <a:rPr lang="en" sz="1800"/>
-              <a:t>Object avoidance</a:t>
-            </a:r>
-            <a:endParaRPr sz="1800"/>
-          </a:p>
-        </p:txBody>
-      </p:sp>
-      <p:pic>
-        <p:nvPicPr>
-          <p:cNvPr id="173" name="Google Shape;173;p19"/>
-          <p:cNvPicPr preferRelativeResize="0"/>
-          <p:nvPr/>
-        </p:nvPicPr>
-        <p:blipFill>
-          <a:blip r:embed="rId3">
-            <a:alphaModFix/>
-          </a:blip>
-          <a:stretch>
-            <a:fillRect/>
-          </a:stretch>
-        </p:blipFill>
-        <p:spPr>
-          <a:xfrm>
-            <a:off x="3976050" y="538825"/>
-            <a:ext cx="4736125" cy="3685600"/>
-          </a:xfrm>
-          <a:prstGeom prst="rect">
-            <a:avLst/>
-          </a:prstGeom>
-          <a:noFill/>
-          <a:ln>
-            <a:noFill/>
-          </a:ln>
-        </p:spPr>
-      </p:pic>
     </p:spTree>
   </p:cSld>
   <p:clrMapOvr>
@@ -14385,7 +15508,7 @@
             </a:pPr>
             <a:r>
               <a:rPr lang="en" sz="3000"/>
-              <a:t>Hyperparameters</a:t>
+              <a:t>Race Types</a:t>
             </a:r>
             <a:endParaRPr sz="3000"/>
           </a:p>
@@ -14401,8 +15524,8 @@
         </p:nvSpPr>
         <p:spPr>
           <a:xfrm>
-            <a:off x="749750" y="1567550"/>
-            <a:ext cx="3951000" cy="2911200"/>
+            <a:off x="1297500" y="1567550"/>
+            <a:ext cx="2491800" cy="2911200"/>
           </a:xfrm>
           <a:prstGeom prst="rect">
             <a:avLst/>
@@ -14426,7 +15549,7 @@
             </a:pPr>
             <a:r>
               <a:rPr lang="en" sz="1800"/>
-              <a:t>Gradient descent batch size: 64</a:t>
+              <a:t>Time trial</a:t>
             </a:r>
             <a:endParaRPr sz="1800"/>
           </a:p>
@@ -14443,12 +15566,12 @@
             </a:pPr>
             <a:r>
               <a:rPr lang="en" sz="1800"/>
-              <a:t>Entropy: 0.01</a:t>
+              <a:t>Object avoidance</a:t>
             </a:r>
             <a:endParaRPr sz="1800"/>
           </a:p>
           <a:p>
-            <a:pPr indent="-342900" lvl="0" marL="457200" rtl="0" algn="l">
+            <a:pPr indent="-342900" lvl="1" marL="914400" rtl="0" algn="l">
               <a:spcBef>
                 <a:spcPts val="0"/>
               </a:spcBef>
@@ -14456,123 +15579,44 @@
                 <a:spcPts val="0"/>
               </a:spcAft>
               <a:buSzPts val="1800"/>
-              <a:buChar char="●"/>
+              <a:buChar char="○"/>
             </a:pPr>
             <a:r>
               <a:rPr lang="en" sz="1800"/>
-              <a:t>Discount factor: 0.5</a:t>
-            </a:r>
-            <a:endParaRPr sz="1800"/>
-          </a:p>
-          <a:p>
-            <a:pPr indent="-342900" lvl="0" marL="457200" rtl="0" algn="l">
-              <a:spcBef>
-                <a:spcPts val="0"/>
-              </a:spcBef>
-              <a:spcAft>
-                <a:spcPts val="0"/>
-              </a:spcAft>
-              <a:buSzPts val="1800"/>
-              <a:buChar char="●"/>
-            </a:pPr>
-            <a:r>
-              <a:rPr lang="en" sz="1800"/>
-              <a:t>Loss type: Huber</a:t>
-            </a:r>
-            <a:endParaRPr sz="1800"/>
-          </a:p>
-          <a:p>
-            <a:pPr indent="-342900" lvl="0" marL="457200" rtl="0" algn="l">
-              <a:spcBef>
-                <a:spcPts val="0"/>
-              </a:spcBef>
-              <a:spcAft>
-                <a:spcPts val="0"/>
-              </a:spcAft>
-              <a:buSzPts val="1800"/>
-              <a:buChar char="●"/>
-            </a:pPr>
-            <a:r>
-              <a:rPr lang="en" sz="1800"/>
-              <a:t>Learning rate: 0.0003</a:t>
-            </a:r>
-            <a:endParaRPr sz="1800"/>
-          </a:p>
-          <a:p>
-            <a:pPr indent="0" lvl="0" marL="457200" rtl="0" algn="l">
-              <a:spcBef>
-                <a:spcPts val="1200"/>
-              </a:spcBef>
-              <a:spcAft>
-                <a:spcPts val="1200"/>
-              </a:spcAft>
-              <a:buNone/>
-            </a:pPr>
-            <a:r>
-              <a:t/>
+              <a:t>1 to 4 fixed objects</a:t>
             </a:r>
             <a:endParaRPr sz="1800"/>
           </a:p>
         </p:txBody>
       </p:sp>
-      <p:sp>
-        <p:nvSpPr>
+      <p:pic>
+        <p:nvPicPr>
           <p:cNvPr id="180" name="Google Shape;180;p20"/>
-          <p:cNvSpPr txBox="1"/>
-          <p:nvPr>
-            <p:ph idx="2" type="body"/>
-          </p:nvPr>
-        </p:nvSpPr>
+          <p:cNvPicPr preferRelativeResize="0"/>
+          <p:nvPr/>
+        </p:nvPicPr>
+        <p:blipFill>
+          <a:blip r:embed="rId3">
+            <a:alphaModFix/>
+          </a:blip>
+          <a:stretch>
+            <a:fillRect/>
+          </a:stretch>
+        </p:blipFill>
         <p:spPr>
           <a:xfrm>
-            <a:off x="4933225" y="1567550"/>
-            <a:ext cx="3636600" cy="2911200"/>
+            <a:off x="3976050" y="538825"/>
+            <a:ext cx="4736125" cy="3685600"/>
           </a:xfrm>
           <a:prstGeom prst="rect">
             <a:avLst/>
           </a:prstGeom>
+          <a:noFill/>
+          <a:ln>
+            <a:noFill/>
+          </a:ln>
         </p:spPr>
-        <p:txBody>
-          <a:bodyPr anchorCtr="0" anchor="t" bIns="91425" lIns="91425" spcFirstLastPara="1" rIns="91425" wrap="square" tIns="91425">
-            <a:normAutofit/>
-          </a:bodyPr>
-          <a:lstStyle/>
-          <a:p>
-            <a:pPr indent="-342900" lvl="0" marL="457200" rtl="0" algn="l">
-              <a:spcBef>
-                <a:spcPts val="0"/>
-              </a:spcBef>
-              <a:spcAft>
-                <a:spcPts val="0"/>
-              </a:spcAft>
-              <a:buSzPts val="1800"/>
-              <a:buChar char="●"/>
-            </a:pPr>
-            <a:r>
-              <a:rPr lang="en" sz="1800"/>
-              <a:t>Number of experience episodes between each policy-updating iteration: 20</a:t>
-            </a:r>
-            <a:endParaRPr sz="1800"/>
-          </a:p>
-          <a:p>
-            <a:pPr indent="-342900" lvl="0" marL="457200" rtl="0" algn="l">
-              <a:spcBef>
-                <a:spcPts val="0"/>
-              </a:spcBef>
-              <a:spcAft>
-                <a:spcPts val="0"/>
-              </a:spcAft>
-              <a:buSzPts val="1800"/>
-              <a:buChar char="●"/>
-            </a:pPr>
-            <a:r>
-              <a:rPr lang="en" sz="1800"/>
-              <a:t>Number of epochs: 10</a:t>
-            </a:r>
-            <a:endParaRPr/>
-          </a:p>
-        </p:txBody>
-      </p:sp>
+      </p:pic>
     </p:spTree>
   </p:cSld>
   <p:clrMapOvr>
@@ -14632,7 +15676,7 @@
             </a:pPr>
             <a:r>
               <a:rPr lang="en" sz="3000"/>
-              <a:t>Vehicle Sensors</a:t>
+              <a:t>Hyperparameters</a:t>
             </a:r>
             <a:endParaRPr sz="3000"/>
           </a:p>
@@ -14648,8 +15692,8 @@
         </p:nvSpPr>
         <p:spPr>
           <a:xfrm>
-            <a:off x="1297500" y="1567550"/>
-            <a:ext cx="7038900" cy="2911200"/>
+            <a:off x="849025" y="1668025"/>
+            <a:ext cx="3951000" cy="3220800"/>
           </a:xfrm>
           <a:prstGeom prst="rect">
             <a:avLst/>
@@ -14661,29 +15705,26 @@
           </a:bodyPr>
           <a:lstStyle/>
           <a:p>
-            <a:pPr indent="0" lvl="0" marL="0" rtl="0" algn="l">
-              <a:spcBef>
-                <a:spcPts val="0"/>
-              </a:spcBef>
-              <a:spcAft>
-                <a:spcPts val="0"/>
-              </a:spcAft>
-              <a:buNone/>
+            <a:pPr indent="-342900" lvl="0" marL="457200" rtl="0" algn="l">
+              <a:spcBef>
+                <a:spcPts val="0"/>
+              </a:spcBef>
+              <a:spcAft>
+                <a:spcPts val="0"/>
+              </a:spcAft>
+              <a:buSzPts val="1800"/>
+              <a:buChar char="●"/>
             </a:pPr>
             <a:r>
               <a:rPr lang="en" sz="1800"/>
-              <a:t>I</a:t>
-            </a:r>
-            <a:r>
-              <a:rPr lang="en" sz="1800"/>
-              <a:t>mages are converted into greyscale.</a:t>
+              <a:t>Gradient descent batch size: 64</a:t>
             </a:r>
             <a:endParaRPr sz="1800"/>
           </a:p>
           <a:p>
             <a:pPr indent="-342900" lvl="0" marL="457200" rtl="0" algn="l">
               <a:spcBef>
-                <a:spcPts val="1200"/>
+                <a:spcPts val="0"/>
               </a:spcBef>
               <a:spcAft>
                 <a:spcPts val="0"/>
@@ -14693,7 +15734,24 @@
             </a:pPr>
             <a:r>
               <a:rPr lang="en" sz="1800"/>
-              <a:t>Camera</a:t>
+              <a:t>Entropy: 0.01</a:t>
+            </a:r>
+            <a:endParaRPr sz="1800"/>
+          </a:p>
+          <a:p>
+            <a:pPr indent="-342900" lvl="0" marL="457200" rtl="0" algn="l">
+              <a:spcBef>
+                <a:spcPts val="0"/>
+              </a:spcBef>
+              <a:spcAft>
+                <a:spcPts val="0"/>
+              </a:spcAft>
+              <a:buSzPts val="1800"/>
+              <a:buChar char="●"/>
+            </a:pPr>
+            <a:r>
+              <a:rPr lang="en" sz="1800"/>
+              <a:t>Loss type: Huber</a:t>
             </a:r>
             <a:endParaRPr sz="1800"/>
           </a:p>
@@ -14710,7 +15768,7 @@
             </a:pPr>
             <a:r>
               <a:rPr lang="en" sz="1800"/>
-              <a:t>lowest cost sensor solution</a:t>
+              <a:t>takes smaller increments than mean squared error</a:t>
             </a:r>
             <a:endParaRPr sz="1800"/>
           </a:p>
@@ -14727,12 +15785,36 @@
             </a:pPr>
             <a:r>
               <a:rPr lang="en" sz="1800"/>
-              <a:t>Stereo camera</a:t>
+              <a:t>Number of epochs: 10</a:t>
             </a:r>
             <a:endParaRPr sz="1800"/>
           </a:p>
+        </p:txBody>
+      </p:sp>
+      <p:sp>
+        <p:nvSpPr>
+          <p:cNvPr id="187" name="Google Shape;187;p21"/>
+          <p:cNvSpPr txBox="1"/>
+          <p:nvPr>
+            <p:ph idx="2" type="body"/>
+          </p:nvPr>
+        </p:nvSpPr>
+        <p:spPr>
+          <a:xfrm>
+            <a:off x="4844425" y="1668025"/>
+            <a:ext cx="3636600" cy="2911200"/>
+          </a:xfrm>
+          <a:prstGeom prst="rect">
+            <a:avLst/>
+          </a:prstGeom>
+        </p:spPr>
+        <p:txBody>
+          <a:bodyPr anchorCtr="0" anchor="t" bIns="91425" lIns="91425" spcFirstLastPara="1" rIns="91425" wrap="square" tIns="91425">
+            <a:normAutofit/>
+          </a:bodyPr>
+          <a:lstStyle/>
           <a:p>
-            <a:pPr indent="-342900" lvl="1" marL="914400" rtl="0" algn="l">
+            <a:pPr indent="-342900" lvl="0" marL="457200" rtl="0" algn="l">
               <a:spcBef>
                 <a:spcPts val="0"/>
               </a:spcBef>
@@ -14740,11 +15822,11 @@
                 <a:spcPts val="0"/>
               </a:spcAft>
               <a:buSzPts val="1800"/>
-              <a:buChar char="○"/>
+              <a:buChar char="●"/>
             </a:pPr>
             <a:r>
               <a:rPr lang="en" sz="1800"/>
-              <a:t>can generate depth information of objects on track</a:t>
+              <a:t>Discount factor: 0.5</a:t>
             </a:r>
             <a:endParaRPr sz="1800"/>
           </a:p>
@@ -14761,12 +15843,12 @@
             </a:pPr>
             <a:r>
               <a:rPr lang="en" sz="1800"/>
-              <a:t>LIDAR sensor</a:t>
+              <a:t>Learning rate: 0.0003</a:t>
             </a:r>
             <a:endParaRPr sz="1800"/>
           </a:p>
           <a:p>
-            <a:pPr indent="-342900" lvl="1" marL="914400" rtl="0" algn="l">
+            <a:pPr indent="-342900" lvl="0" marL="457200" rtl="0" algn="l">
               <a:spcBef>
                 <a:spcPts val="0"/>
               </a:spcBef>
@@ -14774,30 +15856,83 @@
                 <a:spcPts val="0"/>
               </a:spcAft>
               <a:buSzPts val="1800"/>
-              <a:buChar char="○"/>
+              <a:buChar char="●"/>
             </a:pPr>
             <a:r>
               <a:rPr lang="en" sz="1800"/>
-              <a:t>light detection and ranging sensor</a:t>
+              <a:t>Number of experience episodes between each policy-updating iteration: 20</a:t>
             </a:r>
             <a:endParaRPr sz="1800"/>
           </a:p>
           <a:p>
-            <a:pPr indent="-342900" lvl="1" marL="914400" rtl="0" algn="l">
-              <a:spcBef>
-                <a:spcPts val="0"/>
-              </a:spcBef>
-              <a:spcAft>
-                <a:spcPts val="0"/>
-              </a:spcAft>
-              <a:buSzPts val="1800"/>
-              <a:buChar char="○"/>
+            <a:pPr indent="0" lvl="0" marL="457200" rtl="0" algn="l">
+              <a:spcBef>
+                <a:spcPts val="1200"/>
+              </a:spcBef>
+              <a:spcAft>
+                <a:spcPts val="1200"/>
+              </a:spcAft>
+              <a:buNone/>
             </a:pPr>
             <a:r>
-              <a:rPr lang="en" sz="1800"/>
-              <a:t>continuous visibility</a:t>
+              <a:t/>
             </a:r>
-            <a:endParaRPr sz="1800"/>
+            <a:endParaRPr/>
+          </a:p>
+        </p:txBody>
+      </p:sp>
+      <p:sp>
+        <p:nvSpPr>
+          <p:cNvPr id="188" name="Google Shape;188;p21"/>
+          <p:cNvSpPr txBox="1"/>
+          <p:nvPr/>
+        </p:nvSpPr>
+        <p:spPr>
+          <a:xfrm>
+            <a:off x="1323150" y="1206325"/>
+            <a:ext cx="6497700" cy="461700"/>
+          </a:xfrm>
+          <a:prstGeom prst="rect">
+            <a:avLst/>
+          </a:prstGeom>
+          <a:noFill/>
+          <a:ln>
+            <a:noFill/>
+          </a:ln>
+        </p:spPr>
+        <p:txBody>
+          <a:bodyPr anchorCtr="0" anchor="t" bIns="91425" lIns="91425" spcFirstLastPara="1" rIns="91425" wrap="square" tIns="91425">
+            <a:spAutoFit/>
+          </a:bodyPr>
+          <a:lstStyle/>
+          <a:p>
+            <a:pPr indent="0" lvl="0" marL="0" rtl="0" algn="l">
+              <a:spcBef>
+                <a:spcPts val="0"/>
+              </a:spcBef>
+              <a:spcAft>
+                <a:spcPts val="0"/>
+              </a:spcAft>
+              <a:buNone/>
+            </a:pPr>
+            <a:r>
+              <a:rPr lang="en" sz="1800">
+                <a:solidFill>
+                  <a:schemeClr val="lt1"/>
+                </a:solidFill>
+                <a:latin typeface="Lato"/>
+                <a:ea typeface="Lato"/>
+                <a:cs typeface="Lato"/>
+                <a:sym typeface="Lato"/>
+              </a:rPr>
+              <a:t>Used default setup except for discount factor.</a:t>
+            </a:r>
+            <a:endParaRPr>
+              <a:latin typeface="Lato"/>
+              <a:ea typeface="Lato"/>
+              <a:cs typeface="Lato"/>
+              <a:sym typeface="Lato"/>
+            </a:endParaRPr>
           </a:p>
         </p:txBody>
       </p:sp>
@@ -14810,6 +15945,285 @@
 </file>
 
 <file path=ppt/theme/theme1.xml><?xml version="1.0" encoding="utf-8"?>
+<a:theme xmlns:a="http://schemas.openxmlformats.org/drawingml/2006/main" xmlns:r="http://schemas.openxmlformats.org/officeDocument/2006/relationships" name="Focus">
+  <a:themeElements>
+    <a:clrScheme name="Focus">
+      <a:dk1>
+        <a:srgbClr val="1B212C"/>
+      </a:dk1>
+      <a:lt1>
+        <a:srgbClr val="FFFFFF"/>
+      </a:lt1>
+      <a:dk2>
+        <a:srgbClr val="D9D9D9"/>
+      </a:dk2>
+      <a:lt2>
+        <a:srgbClr val="82C7A5"/>
+      </a:lt2>
+      <a:accent1>
+        <a:srgbClr val="0145AC"/>
+      </a:accent1>
+      <a:accent2>
+        <a:srgbClr val="EECE1A"/>
+      </a:accent2>
+      <a:accent3>
+        <a:srgbClr val="4E5567"/>
+      </a:accent3>
+      <a:accent4>
+        <a:srgbClr val="F4D6AD"/>
+      </a:accent4>
+      <a:accent5>
+        <a:srgbClr val="7890CD"/>
+      </a:accent5>
+      <a:accent6>
+        <a:srgbClr val="F15E22"/>
+      </a:accent6>
+      <a:hlink>
+        <a:srgbClr val="7890CD"/>
+      </a:hlink>
+      <a:folHlink>
+        <a:srgbClr val="7890CD"/>
+      </a:folHlink>
+    </a:clrScheme>
+    <a:fontScheme name="Office">
+      <a:majorFont>
+        <a:latin typeface="Arial"/>
+        <a:ea typeface=""/>
+        <a:cs typeface=""/>
+        <a:font script="Jpan" typeface="ＭＳ Ｐゴシック"/>
+        <a:font script="Hang" typeface="맑은 고딕"/>
+        <a:font script="Hans" typeface="宋体"/>
+        <a:font script="Hant" typeface="新細明體"/>
+        <a:font script="Arab" typeface="Times New Roman"/>
+        <a:font script="Hebr" typeface="Times New Roman"/>
+        <a:font script="Thai" typeface="Angsana New"/>
+        <a:font script="Ethi" typeface="Nyala"/>
+        <a:font script="Beng" typeface="Vrinda"/>
+        <a:font script="Gujr" typeface="Shruti"/>
+        <a:font script="Khmr" typeface="MoolBoran"/>
+        <a:font script="Knda" typeface="Tunga"/>
+        <a:font script="Guru" typeface="Raavi"/>
+        <a:font script="Cans" typeface="Euphemia"/>
+        <a:font script="Cher" typeface="Plantagenet Cherokee"/>
+        <a:font script="Yiii" typeface="Microsoft Yi Baiti"/>
+        <a:font script="Tibt" typeface="Microsoft Himalaya"/>
+        <a:font script="Thaa" typeface="MV Boli"/>
+        <a:font script="Deva" typeface="Mangal"/>
+        <a:font script="Telu" typeface="Gautami"/>
+        <a:font script="Taml" typeface="Latha"/>
+        <a:font script="Syrc" typeface="Estrangelo Edessa"/>
+        <a:font script="Orya" typeface="Kalinga"/>
+        <a:font script="Mlym" typeface="Kartika"/>
+        <a:font script="Laoo" typeface="DokChampa"/>
+        <a:font script="Sinh" typeface="Iskoola Pota"/>
+        <a:font script="Mong" typeface="Mongolian Baiti"/>
+        <a:font script="Viet" typeface="Times New Roman"/>
+        <a:font script="Uigh" typeface="Microsoft Uighur"/>
+        <a:font script="Geor" typeface="Sylfaen"/>
+      </a:majorFont>
+      <a:minorFont>
+        <a:latin typeface="Arial"/>
+        <a:ea typeface=""/>
+        <a:cs typeface=""/>
+        <a:font script="Jpan" typeface="ＭＳ Ｐゴシック"/>
+        <a:font script="Hang" typeface="맑은 고딕"/>
+        <a:font script="Hans" typeface="宋体"/>
+        <a:font script="Hant" typeface="新細明體"/>
+        <a:font script="Arab" typeface="Arial"/>
+        <a:font script="Hebr" typeface="Arial"/>
+        <a:font script="Thai" typeface="Cordia New"/>
+        <a:font script="Ethi" typeface="Nyala"/>
+        <a:font script="Beng" typeface="Vrinda"/>
+        <a:font script="Gujr" typeface="Shruti"/>
+        <a:font script="Khmr" typeface="DaunPenh"/>
+        <a:font script="Knda" typeface="Tunga"/>
+        <a:font script="Guru" typeface="Raavi"/>
+        <a:font script="Cans" typeface="Euphemia"/>
+        <a:font script="Cher" typeface="Plantagenet Cherokee"/>
+        <a:font script="Yiii" typeface="Microsoft Yi Baiti"/>
+        <a:font script="Tibt" typeface="Microsoft Himalaya"/>
+        <a:font script="Thaa" typeface="MV Boli"/>
+        <a:font script="Deva" typeface="Mangal"/>
+        <a:font script="Telu" typeface="Gautami"/>
+        <a:font script="Taml" typeface="Latha"/>
+        <a:font script="Syrc" typeface="Estrangelo Edessa"/>
+        <a:font script="Orya" typeface="Kalinga"/>
+        <a:font script="Mlym" typeface="Kartika"/>
+        <a:font script="Laoo" typeface="DokChampa"/>
+        <a:font script="Sinh" typeface="Iskoola Pota"/>
+        <a:font script="Mong" typeface="Mongolian Baiti"/>
+        <a:font script="Viet" typeface="Arial"/>
+        <a:font script="Uigh" typeface="Microsoft Uighur"/>
+        <a:font script="Geor" typeface="Sylfaen"/>
+      </a:minorFont>
+    </a:fontScheme>
+    <a:fmtScheme name="Office">
+      <a:fillStyleLst>
+        <a:solidFill>
+          <a:schemeClr val="phClr"/>
+        </a:solidFill>
+        <a:gradFill rotWithShape="1">
+          <a:gsLst>
+            <a:gs pos="0">
+              <a:schemeClr val="phClr">
+                <a:tint val="50000"/>
+                <a:satMod val="300000"/>
+              </a:schemeClr>
+            </a:gs>
+            <a:gs pos="35000">
+              <a:schemeClr val="phClr">
+                <a:tint val="37000"/>
+                <a:satMod val="300000"/>
+              </a:schemeClr>
+            </a:gs>
+            <a:gs pos="100000">
+              <a:schemeClr val="phClr">
+                <a:tint val="15000"/>
+                <a:satMod val="350000"/>
+              </a:schemeClr>
+            </a:gs>
+          </a:gsLst>
+          <a:lin ang="16200000" scaled="1"/>
+        </a:gradFill>
+        <a:gradFill rotWithShape="1">
+          <a:gsLst>
+            <a:gs pos="0">
+              <a:schemeClr val="phClr">
+                <a:tint val="100000"/>
+                <a:shade val="100000"/>
+                <a:satMod val="130000"/>
+              </a:schemeClr>
+            </a:gs>
+            <a:gs pos="100000">
+              <a:schemeClr val="phClr">
+                <a:tint val="50000"/>
+                <a:shade val="100000"/>
+                <a:satMod val="350000"/>
+              </a:schemeClr>
+            </a:gs>
+          </a:gsLst>
+          <a:lin ang="16200000" scaled="0"/>
+        </a:gradFill>
+      </a:fillStyleLst>
+      <a:lnStyleLst>
+        <a:ln w="9525" cap="flat" cmpd="sng" algn="ctr">
+          <a:solidFill>
+            <a:schemeClr val="phClr">
+              <a:shade val="95000"/>
+              <a:satMod val="105000"/>
+            </a:schemeClr>
+          </a:solidFill>
+          <a:prstDash val="solid"/>
+        </a:ln>
+        <a:ln w="25400" cap="flat" cmpd="sng" algn="ctr">
+          <a:solidFill>
+            <a:schemeClr val="phClr"/>
+          </a:solidFill>
+          <a:prstDash val="solid"/>
+        </a:ln>
+        <a:ln w="38100" cap="flat" cmpd="sng" algn="ctr">
+          <a:solidFill>
+            <a:schemeClr val="phClr"/>
+          </a:solidFill>
+          <a:prstDash val="solid"/>
+        </a:ln>
+      </a:lnStyleLst>
+      <a:effectStyleLst>
+        <a:effectStyle>
+          <a:effectLst>
+            <a:outerShdw blurRad="40000" dist="20000" dir="5400000" rotWithShape="0">
+              <a:srgbClr val="000000">
+                <a:alpha val="38000"/>
+              </a:srgbClr>
+            </a:outerShdw>
+          </a:effectLst>
+        </a:effectStyle>
+        <a:effectStyle>
+          <a:effectLst>
+            <a:outerShdw blurRad="40000" dist="23000" dir="5400000" rotWithShape="0">
+              <a:srgbClr val="000000">
+                <a:alpha val="35000"/>
+              </a:srgbClr>
+            </a:outerShdw>
+          </a:effectLst>
+        </a:effectStyle>
+        <a:effectStyle>
+          <a:effectLst>
+            <a:outerShdw blurRad="40000" dist="23000" dir="5400000" rotWithShape="0">
+              <a:srgbClr val="000000">
+                <a:alpha val="35000"/>
+              </a:srgbClr>
+            </a:outerShdw>
+          </a:effectLst>
+          <a:scene3d>
+            <a:camera prst="orthographicFront">
+              <a:rot lat="0" lon="0" rev="0"/>
+            </a:camera>
+            <a:lightRig rig="threePt" dir="t">
+              <a:rot lat="0" lon="0" rev="1200000"/>
+            </a:lightRig>
+          </a:scene3d>
+          <a:sp3d>
+            <a:bevelT w="63500" h="25400"/>
+          </a:sp3d>
+        </a:effectStyle>
+      </a:effectStyleLst>
+      <a:bgFillStyleLst>
+        <a:solidFill>
+          <a:schemeClr val="phClr"/>
+        </a:solidFill>
+        <a:gradFill rotWithShape="1">
+          <a:gsLst>
+            <a:gs pos="0">
+              <a:schemeClr val="phClr">
+                <a:tint val="40000"/>
+                <a:satMod val="350000"/>
+              </a:schemeClr>
+            </a:gs>
+            <a:gs pos="40000">
+              <a:schemeClr val="phClr">
+                <a:tint val="45000"/>
+                <a:shade val="99000"/>
+                <a:satMod val="350000"/>
+              </a:schemeClr>
+            </a:gs>
+            <a:gs pos="100000">
+              <a:schemeClr val="phClr">
+                <a:shade val="20000"/>
+                <a:satMod val="255000"/>
+              </a:schemeClr>
+            </a:gs>
+          </a:gsLst>
+          <a:path path="circle">
+            <a:fillToRect l="50000" t="-80000" r="50000" b="180000"/>
+          </a:path>
+        </a:gradFill>
+        <a:gradFill rotWithShape="1">
+          <a:gsLst>
+            <a:gs pos="0">
+              <a:schemeClr val="phClr">
+                <a:tint val="80000"/>
+                <a:satMod val="300000"/>
+              </a:schemeClr>
+            </a:gs>
+            <a:gs pos="100000">
+              <a:schemeClr val="phClr">
+                <a:shade val="30000"/>
+                <a:satMod val="200000"/>
+              </a:schemeClr>
+            </a:gs>
+          </a:gsLst>
+          <a:path path="circle">
+            <a:fillToRect l="50000" t="50000" r="50000" b="50000"/>
+          </a:path>
+        </a:gradFill>
+      </a:bgFillStyleLst>
+    </a:fmtScheme>
+  </a:themeElements>
+</a:theme>
+</file>
+
+<file path=ppt/theme/theme2.xml><?xml version="1.0" encoding="utf-8"?>
 <a:theme xmlns:a="http://schemas.openxmlformats.org/drawingml/2006/main" xmlns:r="http://schemas.openxmlformats.org/officeDocument/2006/relationships">
   <a:themeElements>
     <a:clrScheme name="Default">
@@ -15086,283 +16500,4 @@
     </a:fmtScheme>
   </a:themeElements>
 </a:theme>
-</file>
-
-<file path=ppt/theme/theme2.xml><?xml version="1.0" encoding="utf-8"?>
-<a:theme xmlns:a="http://schemas.openxmlformats.org/drawingml/2006/main" xmlns:r="http://schemas.openxmlformats.org/officeDocument/2006/relationships" name="Focus">
-  <a:themeElements>
-    <a:clrScheme name="Focus">
-      <a:dk1>
-        <a:srgbClr val="1B212C"/>
-      </a:dk1>
-      <a:lt1>
-        <a:srgbClr val="FFFFFF"/>
-      </a:lt1>
-      <a:dk2>
-        <a:srgbClr val="D9D9D9"/>
-      </a:dk2>
-      <a:lt2>
-        <a:srgbClr val="82C7A5"/>
-      </a:lt2>
-      <a:accent1>
-        <a:srgbClr val="0145AC"/>
-      </a:accent1>
-      <a:accent2>
-        <a:srgbClr val="EECE1A"/>
-      </a:accent2>
-      <a:accent3>
-        <a:srgbClr val="4E5567"/>
-      </a:accent3>
-      <a:accent4>
-        <a:srgbClr val="F4D6AD"/>
-      </a:accent4>
-      <a:accent5>
-        <a:srgbClr val="7890CD"/>
-      </a:accent5>
-      <a:accent6>
-        <a:srgbClr val="F15E22"/>
-      </a:accent6>
-      <a:hlink>
-        <a:srgbClr val="7890CD"/>
-      </a:hlink>
-      <a:folHlink>
-        <a:srgbClr val="7890CD"/>
-      </a:folHlink>
-    </a:clrScheme>
-    <a:fontScheme name="Office">
-      <a:majorFont>
-        <a:latin typeface="Arial"/>
-        <a:ea typeface=""/>
-        <a:cs typeface=""/>
-        <a:font script="Jpan" typeface="ＭＳ Ｐゴシック"/>
-        <a:font script="Hang" typeface="맑은 고딕"/>
-        <a:font script="Hans" typeface="宋体"/>
-        <a:font script="Hant" typeface="新細明體"/>
-        <a:font script="Arab" typeface="Times New Roman"/>
-        <a:font script="Hebr" typeface="Times New Roman"/>
-        <a:font script="Thai" typeface="Angsana New"/>
-        <a:font script="Ethi" typeface="Nyala"/>
-        <a:font script="Beng" typeface="Vrinda"/>
-        <a:font script="Gujr" typeface="Shruti"/>
-        <a:font script="Khmr" typeface="MoolBoran"/>
-        <a:font script="Knda" typeface="Tunga"/>
-        <a:font script="Guru" typeface="Raavi"/>
-        <a:font script="Cans" typeface="Euphemia"/>
-        <a:font script="Cher" typeface="Plantagenet Cherokee"/>
-        <a:font script="Yiii" typeface="Microsoft Yi Baiti"/>
-        <a:font script="Tibt" typeface="Microsoft Himalaya"/>
-        <a:font script="Thaa" typeface="MV Boli"/>
-        <a:font script="Deva" typeface="Mangal"/>
-        <a:font script="Telu" typeface="Gautami"/>
-        <a:font script="Taml" typeface="Latha"/>
-        <a:font script="Syrc" typeface="Estrangelo Edessa"/>
-        <a:font script="Orya" typeface="Kalinga"/>
-        <a:font script="Mlym" typeface="Kartika"/>
-        <a:font script="Laoo" typeface="DokChampa"/>
-        <a:font script="Sinh" typeface="Iskoola Pota"/>
-        <a:font script="Mong" typeface="Mongolian Baiti"/>
-        <a:font script="Viet" typeface="Times New Roman"/>
-        <a:font script="Uigh" typeface="Microsoft Uighur"/>
-        <a:font script="Geor" typeface="Sylfaen"/>
-      </a:majorFont>
-      <a:minorFont>
-        <a:latin typeface="Arial"/>
-        <a:ea typeface=""/>
-        <a:cs typeface=""/>
-        <a:font script="Jpan" typeface="ＭＳ Ｐゴシック"/>
-        <a:font script="Hang" typeface="맑은 고딕"/>
-        <a:font script="Hans" typeface="宋体"/>
-        <a:font script="Hant" typeface="新細明體"/>
-        <a:font script="Arab" typeface="Arial"/>
-        <a:font script="Hebr" typeface="Arial"/>
-        <a:font script="Thai" typeface="Cordia New"/>
-        <a:font script="Ethi" typeface="Nyala"/>
-        <a:font script="Beng" typeface="Vrinda"/>
-        <a:font script="Gujr" typeface="Shruti"/>
-        <a:font script="Khmr" typeface="DaunPenh"/>
-        <a:font script="Knda" typeface="Tunga"/>
-        <a:font script="Guru" typeface="Raavi"/>
-        <a:font script="Cans" typeface="Euphemia"/>
-        <a:font script="Cher" typeface="Plantagenet Cherokee"/>
-        <a:font script="Yiii" typeface="Microsoft Yi Baiti"/>
-        <a:font script="Tibt" typeface="Microsoft Himalaya"/>
-        <a:font script="Thaa" typeface="MV Boli"/>
-        <a:font script="Deva" typeface="Mangal"/>
-        <a:font script="Telu" typeface="Gautami"/>
-        <a:font script="Taml" typeface="Latha"/>
-        <a:font script="Syrc" typeface="Estrangelo Edessa"/>
-        <a:font script="Orya" typeface="Kalinga"/>
-        <a:font script="Mlym" typeface="Kartika"/>
-        <a:font script="Laoo" typeface="DokChampa"/>
-        <a:font script="Sinh" typeface="Iskoola Pota"/>
-        <a:font script="Mong" typeface="Mongolian Baiti"/>
-        <a:font script="Viet" typeface="Arial"/>
-        <a:font script="Uigh" typeface="Microsoft Uighur"/>
-        <a:font script="Geor" typeface="Sylfaen"/>
-      </a:minorFont>
-    </a:fontScheme>
-    <a:fmtScheme name="Office">
-      <a:fillStyleLst>
-        <a:solidFill>
-          <a:schemeClr val="phClr"/>
-        </a:solidFill>
-        <a:gradFill rotWithShape="1">
-          <a:gsLst>
-            <a:gs pos="0">
-              <a:schemeClr val="phClr">
-                <a:tint val="50000"/>
-                <a:satMod val="300000"/>
-              </a:schemeClr>
-            </a:gs>
-            <a:gs pos="35000">
-              <a:schemeClr val="phClr">
-                <a:tint val="37000"/>
-                <a:satMod val="300000"/>
-              </a:schemeClr>
-            </a:gs>
-            <a:gs pos="100000">
-              <a:schemeClr val="phClr">
-                <a:tint val="15000"/>
-                <a:satMod val="350000"/>
-              </a:schemeClr>
-            </a:gs>
-          </a:gsLst>
-          <a:lin ang="16200000" scaled="1"/>
-        </a:gradFill>
-        <a:gradFill rotWithShape="1">
-          <a:gsLst>
-            <a:gs pos="0">
-              <a:schemeClr val="phClr">
-                <a:tint val="100000"/>
-                <a:shade val="100000"/>
-                <a:satMod val="130000"/>
-              </a:schemeClr>
-            </a:gs>
-            <a:gs pos="100000">
-              <a:schemeClr val="phClr">
-                <a:tint val="50000"/>
-                <a:shade val="100000"/>
-                <a:satMod val="350000"/>
-              </a:schemeClr>
-            </a:gs>
-          </a:gsLst>
-          <a:lin ang="16200000" scaled="0"/>
-        </a:gradFill>
-      </a:fillStyleLst>
-      <a:lnStyleLst>
-        <a:ln w="9525" cap="flat" cmpd="sng" algn="ctr">
-          <a:solidFill>
-            <a:schemeClr val="phClr">
-              <a:shade val="95000"/>
-              <a:satMod val="105000"/>
-            </a:schemeClr>
-          </a:solidFill>
-          <a:prstDash val="solid"/>
-        </a:ln>
-        <a:ln w="25400" cap="flat" cmpd="sng" algn="ctr">
-          <a:solidFill>
-            <a:schemeClr val="phClr"/>
-          </a:solidFill>
-          <a:prstDash val="solid"/>
-        </a:ln>
-        <a:ln w="38100" cap="flat" cmpd="sng" algn="ctr">
-          <a:solidFill>
-            <a:schemeClr val="phClr"/>
-          </a:solidFill>
-          <a:prstDash val="solid"/>
-        </a:ln>
-      </a:lnStyleLst>
-      <a:effectStyleLst>
-        <a:effectStyle>
-          <a:effectLst>
-            <a:outerShdw blurRad="40000" dist="20000" dir="5400000" rotWithShape="0">
-              <a:srgbClr val="000000">
-                <a:alpha val="38000"/>
-              </a:srgbClr>
-            </a:outerShdw>
-          </a:effectLst>
-        </a:effectStyle>
-        <a:effectStyle>
-          <a:effectLst>
-            <a:outerShdw blurRad="40000" dist="23000" dir="5400000" rotWithShape="0">
-              <a:srgbClr val="000000">
-                <a:alpha val="35000"/>
-              </a:srgbClr>
-            </a:outerShdw>
-          </a:effectLst>
-        </a:effectStyle>
-        <a:effectStyle>
-          <a:effectLst>
-            <a:outerShdw blurRad="40000" dist="23000" dir="5400000" rotWithShape="0">
-              <a:srgbClr val="000000">
-                <a:alpha val="35000"/>
-              </a:srgbClr>
-            </a:outerShdw>
-          </a:effectLst>
-          <a:scene3d>
-            <a:camera prst="orthographicFront">
-              <a:rot lat="0" lon="0" rev="0"/>
-            </a:camera>
-            <a:lightRig rig="threePt" dir="t">
-              <a:rot lat="0" lon="0" rev="1200000"/>
-            </a:lightRig>
-          </a:scene3d>
-          <a:sp3d>
-            <a:bevelT w="63500" h="25400"/>
-          </a:sp3d>
-        </a:effectStyle>
-      </a:effectStyleLst>
-      <a:bgFillStyleLst>
-        <a:solidFill>
-          <a:schemeClr val="phClr"/>
-        </a:solidFill>
-        <a:gradFill rotWithShape="1">
-          <a:gsLst>
-            <a:gs pos="0">
-              <a:schemeClr val="phClr">
-                <a:tint val="40000"/>
-                <a:satMod val="350000"/>
-              </a:schemeClr>
-            </a:gs>
-            <a:gs pos="40000">
-              <a:schemeClr val="phClr">
-                <a:tint val="45000"/>
-                <a:shade val="99000"/>
-                <a:satMod val="350000"/>
-              </a:schemeClr>
-            </a:gs>
-            <a:gs pos="100000">
-              <a:schemeClr val="phClr">
-                <a:shade val="20000"/>
-                <a:satMod val="255000"/>
-              </a:schemeClr>
-            </a:gs>
-          </a:gsLst>
-          <a:path path="circle">
-            <a:fillToRect l="50000" t="-80000" r="50000" b="180000"/>
-          </a:path>
-        </a:gradFill>
-        <a:gradFill rotWithShape="1">
-          <a:gsLst>
-            <a:gs pos="0">
-              <a:schemeClr val="phClr">
-                <a:tint val="80000"/>
-                <a:satMod val="300000"/>
-              </a:schemeClr>
-            </a:gs>
-            <a:gs pos="100000">
-              <a:schemeClr val="phClr">
-                <a:shade val="30000"/>
-                <a:satMod val="200000"/>
-              </a:schemeClr>
-            </a:gs>
-          </a:gsLst>
-          <a:path path="circle">
-            <a:fillToRect l="50000" t="50000" r="50000" b="50000"/>
-          </a:path>
-        </a:gradFill>
-      </a:bgFillStyleLst>
-    </a:fmtScheme>
-  </a:themeElements>
-</a:theme>
 </file>
</xml_diff>